<commit_message>
Atualizando figura das condições de contorno com sobreescritos corretos nas condições de contorno.
</commit_message>
<xml_diff>
--- a/Outros/MestradoFiguras.pptx
+++ b/Outros/MestradoFiguras.pptx
@@ -11660,7 +11660,7 @@
           <p:cNvPr id="9" name="Conector de Seta Reta 30">
             <a:extLst>
               <a:ext uri="{FF2B5EF4-FFF2-40B4-BE49-F238E27FC236}">
-                <a16:creationId xmlns:a16="http://schemas.microsoft.com/office/drawing/2014/main" xmlns="" id="{F4E2726F-250A-244A-9FEF-08E332214A0E}"/>
+                <a16:creationId xmlns="" xmlns:a16="http://schemas.microsoft.com/office/drawing/2014/main" id="{F4E2726F-250A-244A-9FEF-08E332214A0E}"/>
               </a:ext>
             </a:extLst>
           </p:cNvPr>
@@ -11702,7 +11702,7 @@
           <p:cNvPr id="11" name="Conector de Seta Reta 31">
             <a:extLst>
               <a:ext uri="{FF2B5EF4-FFF2-40B4-BE49-F238E27FC236}">
-                <a16:creationId xmlns:a16="http://schemas.microsoft.com/office/drawing/2014/main" xmlns="" id="{58C6BB8A-40B7-1D44-841F-91C8117B7A12}"/>
+                <a16:creationId xmlns="" xmlns:a16="http://schemas.microsoft.com/office/drawing/2014/main" id="{58C6BB8A-40B7-1D44-841F-91C8117B7A12}"/>
               </a:ext>
             </a:extLst>
           </p:cNvPr>
@@ -11744,7 +11744,7 @@
           <p:cNvPr id="12" name="CaixaDeTexto 37">
             <a:extLst>
               <a:ext uri="{FF2B5EF4-FFF2-40B4-BE49-F238E27FC236}">
-                <a16:creationId xmlns:a16="http://schemas.microsoft.com/office/drawing/2014/main" xmlns="" id="{71091896-9F67-8847-9C2A-DE057411D085}"/>
+                <a16:creationId xmlns="" xmlns:a16="http://schemas.microsoft.com/office/drawing/2014/main" id="{71091896-9F67-8847-9C2A-DE057411D085}"/>
               </a:ext>
             </a:extLst>
           </p:cNvPr>
@@ -11779,7 +11779,7 @@
           <p:cNvPr id="13" name="CaixaDeTexto 38">
             <a:extLst>
               <a:ext uri="{FF2B5EF4-FFF2-40B4-BE49-F238E27FC236}">
-                <a16:creationId xmlns:a16="http://schemas.microsoft.com/office/drawing/2014/main" xmlns="" id="{76B8159C-42E2-4940-B7F6-6CFD8DA7CF7E}"/>
+                <a16:creationId xmlns="" xmlns:a16="http://schemas.microsoft.com/office/drawing/2014/main" id="{76B8159C-42E2-4940-B7F6-6CFD8DA7CF7E}"/>
               </a:ext>
             </a:extLst>
           </p:cNvPr>
@@ -11814,7 +11814,7 @@
           <p:cNvPr id="14" name="Conector de Seta Reta 31">
             <a:extLst>
               <a:ext uri="{FF2B5EF4-FFF2-40B4-BE49-F238E27FC236}">
-                <a16:creationId xmlns:a16="http://schemas.microsoft.com/office/drawing/2014/main" xmlns="" id="{6270ED07-5855-EB46-9509-DAAB56BDB6EE}"/>
+                <a16:creationId xmlns="" xmlns:a16="http://schemas.microsoft.com/office/drawing/2014/main" id="{6270ED07-5855-EB46-9509-DAAB56BDB6EE}"/>
               </a:ext>
             </a:extLst>
           </p:cNvPr>
@@ -11858,7 +11858,7 @@
           <p:cNvPr id="15" name="CaixaDeTexto 37">
             <a:extLst>
               <a:ext uri="{FF2B5EF4-FFF2-40B4-BE49-F238E27FC236}">
-                <a16:creationId xmlns:a16="http://schemas.microsoft.com/office/drawing/2014/main" xmlns="" id="{A883361E-6275-FD48-BBBB-CC236BA50F68}"/>
+                <a16:creationId xmlns="" xmlns:a16="http://schemas.microsoft.com/office/drawing/2014/main" id="{A883361E-6275-FD48-BBBB-CC236BA50F68}"/>
               </a:ext>
             </a:extLst>
           </p:cNvPr>
@@ -11894,7 +11894,7 @@
           <p:cNvPr id="4" name="Cube 3">
             <a:extLst>
               <a:ext uri="{FF2B5EF4-FFF2-40B4-BE49-F238E27FC236}">
-                <a16:creationId xmlns:a16="http://schemas.microsoft.com/office/drawing/2014/main" xmlns="" id="{91386F85-D730-BC4D-BFB6-86BD933FCE40}"/>
+                <a16:creationId xmlns="" xmlns:a16="http://schemas.microsoft.com/office/drawing/2014/main" id="{91386F85-D730-BC4D-BFB6-86BD933FCE40}"/>
               </a:ext>
             </a:extLst>
           </p:cNvPr>
@@ -11946,7 +11946,7 @@
           <p:cNvPr id="7" name="Straight Arrow Connector 6">
             <a:extLst>
               <a:ext uri="{FF2B5EF4-FFF2-40B4-BE49-F238E27FC236}">
-                <a16:creationId xmlns:a16="http://schemas.microsoft.com/office/drawing/2014/main" xmlns="" id="{FB5C299A-1052-4746-8710-63FF6CFD409E}"/>
+                <a16:creationId xmlns="" xmlns:a16="http://schemas.microsoft.com/office/drawing/2014/main" id="{FB5C299A-1052-4746-8710-63FF6CFD409E}"/>
               </a:ext>
             </a:extLst>
           </p:cNvPr>
@@ -11992,7 +11992,7 @@
               <p:cNvPr id="16" name="TextBox 15">
                 <a:extLst>
                   <a:ext uri="{FF2B5EF4-FFF2-40B4-BE49-F238E27FC236}">
-                    <a16:creationId xmlns:a16="http://schemas.microsoft.com/office/drawing/2014/main" xmlns="" id="{ADCB2C18-6EAD-5D4A-98EB-E29D64C0FCAF}"/>
+                    <a16:creationId xmlns="" xmlns:a16="http://schemas.microsoft.com/office/drawing/2014/main" id="{ADCB2C18-6EAD-5D4A-98EB-E29D64C0FCAF}"/>
                   </a:ext>
                 </a:extLst>
               </p:cNvPr>
@@ -12105,7 +12105,7 @@
           <p:cNvPr id="25" name="Straight Arrow Connector 24">
             <a:extLst>
               <a:ext uri="{FF2B5EF4-FFF2-40B4-BE49-F238E27FC236}">
-                <a16:creationId xmlns:a16="http://schemas.microsoft.com/office/drawing/2014/main" xmlns="" id="{ED64D3D5-6A3F-5A41-83A7-36085B488607}"/>
+                <a16:creationId xmlns="" xmlns:a16="http://schemas.microsoft.com/office/drawing/2014/main" id="{ED64D3D5-6A3F-5A41-83A7-36085B488607}"/>
               </a:ext>
             </a:extLst>
           </p:cNvPr>
@@ -12151,7 +12151,7 @@
               <p:cNvPr id="27" name="TextBox 26">
                 <a:extLst>
                   <a:ext uri="{FF2B5EF4-FFF2-40B4-BE49-F238E27FC236}">
-                    <a16:creationId xmlns:a16="http://schemas.microsoft.com/office/drawing/2014/main" xmlns="" id="{85C03481-1FBF-DF4E-96C2-CDB1991F1F7B}"/>
+                    <a16:creationId xmlns="" xmlns:a16="http://schemas.microsoft.com/office/drawing/2014/main" id="{85C03481-1FBF-DF4E-96C2-CDB1991F1F7B}"/>
                   </a:ext>
                 </a:extLst>
               </p:cNvPr>
@@ -12264,7 +12264,7 @@
           <p:cNvPr id="28" name="Straight Arrow Connector 27">
             <a:extLst>
               <a:ext uri="{FF2B5EF4-FFF2-40B4-BE49-F238E27FC236}">
-                <a16:creationId xmlns:a16="http://schemas.microsoft.com/office/drawing/2014/main" xmlns="" id="{12070AFC-2402-1041-8B48-36FB0348B700}"/>
+                <a16:creationId xmlns="" xmlns:a16="http://schemas.microsoft.com/office/drawing/2014/main" id="{12070AFC-2402-1041-8B48-36FB0348B700}"/>
               </a:ext>
             </a:extLst>
           </p:cNvPr>
@@ -12310,7 +12310,7 @@
               <p:cNvPr id="36" name="TextBox 35">
                 <a:extLst>
                   <a:ext uri="{FF2B5EF4-FFF2-40B4-BE49-F238E27FC236}">
-                    <a16:creationId xmlns:a16="http://schemas.microsoft.com/office/drawing/2014/main" xmlns="" id="{5FE8FBEA-ADFF-AB40-A54A-449E780BBA65}"/>
+                    <a16:creationId xmlns="" xmlns:a16="http://schemas.microsoft.com/office/drawing/2014/main" id="{5FE8FBEA-ADFF-AB40-A54A-449E780BBA65}"/>
                   </a:ext>
                 </a:extLst>
               </p:cNvPr>
@@ -12423,7 +12423,7 @@
           <p:cNvPr id="40" name="Conector de Seta Reta 30">
             <a:extLst>
               <a:ext uri="{FF2B5EF4-FFF2-40B4-BE49-F238E27FC236}">
-                <a16:creationId xmlns:a16="http://schemas.microsoft.com/office/drawing/2014/main" xmlns="" id="{BA2E9DFA-5E42-7A45-BAAF-990ADF7EA0D3}"/>
+                <a16:creationId xmlns="" xmlns:a16="http://schemas.microsoft.com/office/drawing/2014/main" id="{BA2E9DFA-5E42-7A45-BAAF-990ADF7EA0D3}"/>
               </a:ext>
             </a:extLst>
           </p:cNvPr>
@@ -12467,7 +12467,7 @@
           <p:cNvPr id="41" name="Conector de Seta Reta 31">
             <a:extLst>
               <a:ext uri="{FF2B5EF4-FFF2-40B4-BE49-F238E27FC236}">
-                <a16:creationId xmlns:a16="http://schemas.microsoft.com/office/drawing/2014/main" xmlns="" id="{E89DE250-B42E-074A-9B4B-D32C5B21682A}"/>
+                <a16:creationId xmlns="" xmlns:a16="http://schemas.microsoft.com/office/drawing/2014/main" id="{E89DE250-B42E-074A-9B4B-D32C5B21682A}"/>
               </a:ext>
             </a:extLst>
           </p:cNvPr>
@@ -12511,7 +12511,7 @@
           <p:cNvPr id="42" name="CaixaDeTexto 37">
             <a:extLst>
               <a:ext uri="{FF2B5EF4-FFF2-40B4-BE49-F238E27FC236}">
-                <a16:creationId xmlns:a16="http://schemas.microsoft.com/office/drawing/2014/main" xmlns="" id="{EB1519E0-5286-4349-B80E-C58B3668839D}"/>
+                <a16:creationId xmlns="" xmlns:a16="http://schemas.microsoft.com/office/drawing/2014/main" id="{EB1519E0-5286-4349-B80E-C58B3668839D}"/>
               </a:ext>
             </a:extLst>
           </p:cNvPr>
@@ -12546,7 +12546,7 @@
           <p:cNvPr id="44" name="Conector de Seta Reta 31">
             <a:extLst>
               <a:ext uri="{FF2B5EF4-FFF2-40B4-BE49-F238E27FC236}">
-                <a16:creationId xmlns:a16="http://schemas.microsoft.com/office/drawing/2014/main" xmlns="" id="{498F1A6C-5107-C140-BB57-1B5DC6F026FE}"/>
+                <a16:creationId xmlns="" xmlns:a16="http://schemas.microsoft.com/office/drawing/2014/main" id="{498F1A6C-5107-C140-BB57-1B5DC6F026FE}"/>
               </a:ext>
             </a:extLst>
           </p:cNvPr>
@@ -12590,7 +12590,7 @@
           <p:cNvPr id="45" name="CaixaDeTexto 37">
             <a:extLst>
               <a:ext uri="{FF2B5EF4-FFF2-40B4-BE49-F238E27FC236}">
-                <a16:creationId xmlns:a16="http://schemas.microsoft.com/office/drawing/2014/main" xmlns="" id="{B6B0C0B4-5D95-E046-8F05-DBA56B369AC9}"/>
+                <a16:creationId xmlns="" xmlns:a16="http://schemas.microsoft.com/office/drawing/2014/main" id="{B6B0C0B4-5D95-E046-8F05-DBA56B369AC9}"/>
               </a:ext>
             </a:extLst>
           </p:cNvPr>
@@ -12626,7 +12626,7 @@
           <p:cNvPr id="37" name="Cube 36">
             <a:extLst>
               <a:ext uri="{FF2B5EF4-FFF2-40B4-BE49-F238E27FC236}">
-                <a16:creationId xmlns:a16="http://schemas.microsoft.com/office/drawing/2014/main" xmlns="" id="{678A5E09-5210-8B4F-9C6E-687A6DAE997E}"/>
+                <a16:creationId xmlns="" xmlns:a16="http://schemas.microsoft.com/office/drawing/2014/main" id="{678A5E09-5210-8B4F-9C6E-687A6DAE997E}"/>
               </a:ext>
             </a:extLst>
           </p:cNvPr>
@@ -12678,7 +12678,7 @@
           <p:cNvPr id="54" name="Straight Connector 53">
             <a:extLst>
               <a:ext uri="{FF2B5EF4-FFF2-40B4-BE49-F238E27FC236}">
-                <a16:creationId xmlns:a16="http://schemas.microsoft.com/office/drawing/2014/main" xmlns="" id="{13538F5B-109E-414B-A880-6203A7899206}"/>
+                <a16:creationId xmlns="" xmlns:a16="http://schemas.microsoft.com/office/drawing/2014/main" id="{13538F5B-109E-414B-A880-6203A7899206}"/>
               </a:ext>
             </a:extLst>
           </p:cNvPr>
@@ -12720,7 +12720,7 @@
           <p:cNvPr id="55" name="Straight Connector 54">
             <a:extLst>
               <a:ext uri="{FF2B5EF4-FFF2-40B4-BE49-F238E27FC236}">
-                <a16:creationId xmlns:a16="http://schemas.microsoft.com/office/drawing/2014/main" xmlns="" id="{57FE85EB-0365-8045-A5A8-D95E80529B6A}"/>
+                <a16:creationId xmlns="" xmlns:a16="http://schemas.microsoft.com/office/drawing/2014/main" id="{57FE85EB-0365-8045-A5A8-D95E80529B6A}"/>
               </a:ext>
             </a:extLst>
           </p:cNvPr>
@@ -12764,7 +12764,7 @@
           <p:cNvPr id="59" name="Straight Connector 58">
             <a:extLst>
               <a:ext uri="{FF2B5EF4-FFF2-40B4-BE49-F238E27FC236}">
-                <a16:creationId xmlns:a16="http://schemas.microsoft.com/office/drawing/2014/main" xmlns="" id="{4C50B42D-6F2E-F143-8613-E77625FDA0C2}"/>
+                <a16:creationId xmlns="" xmlns:a16="http://schemas.microsoft.com/office/drawing/2014/main" id="{4C50B42D-6F2E-F143-8613-E77625FDA0C2}"/>
               </a:ext>
             </a:extLst>
           </p:cNvPr>
@@ -12808,7 +12808,7 @@
           <p:cNvPr id="61" name="Straight Arrow Connector 60">
             <a:extLst>
               <a:ext uri="{FF2B5EF4-FFF2-40B4-BE49-F238E27FC236}">
-                <a16:creationId xmlns:a16="http://schemas.microsoft.com/office/drawing/2014/main" xmlns="" id="{CF4E5FA0-002E-E44C-85C4-9D2B890C8F48}"/>
+                <a16:creationId xmlns="" xmlns:a16="http://schemas.microsoft.com/office/drawing/2014/main" id="{CF4E5FA0-002E-E44C-85C4-9D2B890C8F48}"/>
               </a:ext>
             </a:extLst>
           </p:cNvPr>
@@ -12854,7 +12854,7 @@
               <p:cNvPr id="64" name="TextBox 63">
                 <a:extLst>
                   <a:ext uri="{FF2B5EF4-FFF2-40B4-BE49-F238E27FC236}">
-                    <a16:creationId xmlns:a16="http://schemas.microsoft.com/office/drawing/2014/main" xmlns="" id="{D3DDB3F6-3863-8B40-8B0C-765B50556082}"/>
+                    <a16:creationId xmlns="" xmlns:a16="http://schemas.microsoft.com/office/drawing/2014/main" id="{D3DDB3F6-3863-8B40-8B0C-765B50556082}"/>
                   </a:ext>
                 </a:extLst>
               </p:cNvPr>
@@ -13007,7 +13007,7 @@
           <p:cNvPr id="66" name="Straight Arrow Connector 65">
             <a:extLst>
               <a:ext uri="{FF2B5EF4-FFF2-40B4-BE49-F238E27FC236}">
-                <a16:creationId xmlns:a16="http://schemas.microsoft.com/office/drawing/2014/main" xmlns="" id="{754DC28D-02DE-074B-A64E-37E346FFDEAB}"/>
+                <a16:creationId xmlns="" xmlns:a16="http://schemas.microsoft.com/office/drawing/2014/main" id="{754DC28D-02DE-074B-A64E-37E346FFDEAB}"/>
               </a:ext>
             </a:extLst>
           </p:cNvPr>
@@ -13054,7 +13054,7 @@
               <p:cNvPr id="68" name="Rectangle 67">
                 <a:extLst>
                   <a:ext uri="{FF2B5EF4-FFF2-40B4-BE49-F238E27FC236}">
-                    <a16:creationId xmlns:a16="http://schemas.microsoft.com/office/drawing/2014/main" xmlns="" id="{FE8B028E-C93E-E548-AF4F-0A464D80D063}"/>
+                    <a16:creationId xmlns="" xmlns:a16="http://schemas.microsoft.com/office/drawing/2014/main" id="{FE8B028E-C93E-E548-AF4F-0A464D80D063}"/>
                   </a:ext>
                 </a:extLst>
               </p:cNvPr>
@@ -13169,7 +13169,7 @@
           <p:cNvPr id="69" name="Straight Arrow Connector 68">
             <a:extLst>
               <a:ext uri="{FF2B5EF4-FFF2-40B4-BE49-F238E27FC236}">
-                <a16:creationId xmlns:a16="http://schemas.microsoft.com/office/drawing/2014/main" xmlns="" id="{BE0D7074-2E41-6946-A7C8-8B995652278D}"/>
+                <a16:creationId xmlns="" xmlns:a16="http://schemas.microsoft.com/office/drawing/2014/main" id="{BE0D7074-2E41-6946-A7C8-8B995652278D}"/>
               </a:ext>
             </a:extLst>
           </p:cNvPr>
@@ -13215,7 +13215,7 @@
               <p:cNvPr id="71" name="Rectangle 70">
                 <a:extLst>
                   <a:ext uri="{FF2B5EF4-FFF2-40B4-BE49-F238E27FC236}">
-                    <a16:creationId xmlns:a16="http://schemas.microsoft.com/office/drawing/2014/main" xmlns="" id="{40CC5FCB-F480-2645-BAD0-61FA0E7FE5ED}"/>
+                    <a16:creationId xmlns="" xmlns:a16="http://schemas.microsoft.com/office/drawing/2014/main" id="{40CC5FCB-F480-2645-BAD0-61FA0E7FE5ED}"/>
                   </a:ext>
                 </a:extLst>
               </p:cNvPr>
@@ -13381,7 +13381,7 @@
               <p:cNvPr id="72" name="Rectangle 71">
                 <a:extLst>
                   <a:ext uri="{FF2B5EF4-FFF2-40B4-BE49-F238E27FC236}">
-                    <a16:creationId xmlns:a16="http://schemas.microsoft.com/office/drawing/2014/main" xmlns="" id="{23629297-22E7-7441-81D1-749C3AD58B54}"/>
+                    <a16:creationId xmlns="" xmlns:a16="http://schemas.microsoft.com/office/drawing/2014/main" id="{23629297-22E7-7441-81D1-749C3AD58B54}"/>
                   </a:ext>
                 </a:extLst>
               </p:cNvPr>
@@ -13493,7 +13493,7 @@
           <p:cNvPr id="73" name="Straight Arrow Connector 72">
             <a:extLst>
               <a:ext uri="{FF2B5EF4-FFF2-40B4-BE49-F238E27FC236}">
-                <a16:creationId xmlns:a16="http://schemas.microsoft.com/office/drawing/2014/main" xmlns="" id="{46F78AF6-5B3C-564C-8FAE-8D1FD83E19D9}"/>
+                <a16:creationId xmlns="" xmlns:a16="http://schemas.microsoft.com/office/drawing/2014/main" id="{46F78AF6-5B3C-564C-8FAE-8D1FD83E19D9}"/>
               </a:ext>
             </a:extLst>
           </p:cNvPr>
@@ -13538,7 +13538,7 @@
           <p:cNvPr id="74" name="Straight Arrow Connector 73">
             <a:extLst>
               <a:ext uri="{FF2B5EF4-FFF2-40B4-BE49-F238E27FC236}">
-                <a16:creationId xmlns:a16="http://schemas.microsoft.com/office/drawing/2014/main" xmlns="" id="{DE12505A-7235-6448-B5C6-FE671E3F8A22}"/>
+                <a16:creationId xmlns="" xmlns:a16="http://schemas.microsoft.com/office/drawing/2014/main" id="{DE12505A-7235-6448-B5C6-FE671E3F8A22}"/>
               </a:ext>
             </a:extLst>
           </p:cNvPr>
@@ -13584,7 +13584,7 @@
               <p:cNvPr id="75" name="TextBox 74">
                 <a:extLst>
                   <a:ext uri="{FF2B5EF4-FFF2-40B4-BE49-F238E27FC236}">
-                    <a16:creationId xmlns:a16="http://schemas.microsoft.com/office/drawing/2014/main" xmlns="" id="{71F8CD0D-BA76-8E46-9CCA-A28143CAAB39}"/>
+                    <a16:creationId xmlns="" xmlns:a16="http://schemas.microsoft.com/office/drawing/2014/main" id="{71F8CD0D-BA76-8E46-9CCA-A28143CAAB39}"/>
                   </a:ext>
                 </a:extLst>
               </p:cNvPr>
@@ -13743,7 +13743,7 @@
           <p:cNvPr id="83" name="CaixaDeTexto 37">
             <a:extLst>
               <a:ext uri="{FF2B5EF4-FFF2-40B4-BE49-F238E27FC236}">
-                <a16:creationId xmlns:a16="http://schemas.microsoft.com/office/drawing/2014/main" xmlns="" id="{82977875-7FA0-AA40-AFC9-85EBA228660F}"/>
+                <a16:creationId xmlns="" xmlns:a16="http://schemas.microsoft.com/office/drawing/2014/main" id="{82977875-7FA0-AA40-AFC9-85EBA228660F}"/>
               </a:ext>
             </a:extLst>
           </p:cNvPr>
@@ -13778,7 +13778,7 @@
           <p:cNvPr id="84" name="Straight Arrow Connector 83">
             <a:extLst>
               <a:ext uri="{FF2B5EF4-FFF2-40B4-BE49-F238E27FC236}">
-                <a16:creationId xmlns:a16="http://schemas.microsoft.com/office/drawing/2014/main" xmlns="" id="{7B2A7D30-80F5-E04E-AF2E-46549DA5001A}"/>
+                <a16:creationId xmlns="" xmlns:a16="http://schemas.microsoft.com/office/drawing/2014/main" id="{7B2A7D30-80F5-E04E-AF2E-46549DA5001A}"/>
               </a:ext>
             </a:extLst>
           </p:cNvPr>
@@ -13824,7 +13824,7 @@
               <p:cNvPr id="85" name="TextBox 84">
                 <a:extLst>
                   <a:ext uri="{FF2B5EF4-FFF2-40B4-BE49-F238E27FC236}">
-                    <a16:creationId xmlns:a16="http://schemas.microsoft.com/office/drawing/2014/main" xmlns="" id="{9EA20542-1E02-FB4B-8965-FFAFE1DDEE71}"/>
+                    <a16:creationId xmlns="" xmlns:a16="http://schemas.microsoft.com/office/drawing/2014/main" id="{9EA20542-1E02-FB4B-8965-FFAFE1DDEE71}"/>
                   </a:ext>
                 </a:extLst>
               </p:cNvPr>
@@ -13937,7 +13937,7 @@
           <p:cNvPr id="29" name="Group 28">
             <a:extLst>
               <a:ext uri="{FF2B5EF4-FFF2-40B4-BE49-F238E27FC236}">
-                <a16:creationId xmlns:a16="http://schemas.microsoft.com/office/drawing/2014/main" xmlns="" id="{3490477F-763A-4F4D-9169-63E295F28330}"/>
+                <a16:creationId xmlns="" xmlns:a16="http://schemas.microsoft.com/office/drawing/2014/main" id="{3490477F-763A-4F4D-9169-63E295F28330}"/>
               </a:ext>
             </a:extLst>
           </p:cNvPr>
@@ -13957,7 +13957,7 @@
             <p:cNvPr id="2" name="Rectangle 1">
               <a:extLst>
                 <a:ext uri="{FF2B5EF4-FFF2-40B4-BE49-F238E27FC236}">
-                  <a16:creationId xmlns:a16="http://schemas.microsoft.com/office/drawing/2014/main" xmlns="" id="{44D1A702-3EFD-7147-9604-63E809BECA89}"/>
+                  <a16:creationId xmlns="" xmlns:a16="http://schemas.microsoft.com/office/drawing/2014/main" id="{44D1A702-3EFD-7147-9604-63E809BECA89}"/>
                 </a:ext>
               </a:extLst>
             </p:cNvPr>
@@ -14014,7 +14014,7 @@
             <p:cNvPr id="3" name="Freeform 2">
               <a:extLst>
                 <a:ext uri="{FF2B5EF4-FFF2-40B4-BE49-F238E27FC236}">
-                  <a16:creationId xmlns:a16="http://schemas.microsoft.com/office/drawing/2014/main" xmlns="" id="{B8C752B6-8936-584E-9D03-0B78FBF9796E}"/>
+                  <a16:creationId xmlns="" xmlns:a16="http://schemas.microsoft.com/office/drawing/2014/main" id="{B8C752B6-8936-584E-9D03-0B78FBF9796E}"/>
                 </a:ext>
               </a:extLst>
             </p:cNvPr>
@@ -14400,7 +14400,7 @@
             <p:cNvPr id="6" name="Oval 5">
               <a:extLst>
                 <a:ext uri="{FF2B5EF4-FFF2-40B4-BE49-F238E27FC236}">
-                  <a16:creationId xmlns:a16="http://schemas.microsoft.com/office/drawing/2014/main" xmlns="" id="{957036A3-CE44-3948-9771-2A025BF838D5}"/>
+                  <a16:creationId xmlns="" xmlns:a16="http://schemas.microsoft.com/office/drawing/2014/main" id="{957036A3-CE44-3948-9771-2A025BF838D5}"/>
                 </a:ext>
               </a:extLst>
             </p:cNvPr>
@@ -14457,7 +14457,7 @@
             <p:cNvPr id="8" name="Freeform 7">
               <a:extLst>
                 <a:ext uri="{FF2B5EF4-FFF2-40B4-BE49-F238E27FC236}">
-                  <a16:creationId xmlns:a16="http://schemas.microsoft.com/office/drawing/2014/main" xmlns="" id="{B9218790-1900-2742-B907-060A7FD7EF9D}"/>
+                  <a16:creationId xmlns="" xmlns:a16="http://schemas.microsoft.com/office/drawing/2014/main" id="{B9218790-1900-2742-B907-060A7FD7EF9D}"/>
                 </a:ext>
               </a:extLst>
             </p:cNvPr>
@@ -14787,7 +14787,7 @@
             <p:cNvPr id="17" name="Freeform 16">
               <a:extLst>
                 <a:ext uri="{FF2B5EF4-FFF2-40B4-BE49-F238E27FC236}">
-                  <a16:creationId xmlns:a16="http://schemas.microsoft.com/office/drawing/2014/main" xmlns="" id="{983FDBFF-E7D3-4A4D-9B1C-35CBBDDED5F6}"/>
+                  <a16:creationId xmlns="" xmlns:a16="http://schemas.microsoft.com/office/drawing/2014/main" id="{983FDBFF-E7D3-4A4D-9B1C-35CBBDDED5F6}"/>
                 </a:ext>
               </a:extLst>
             </p:cNvPr>
@@ -15175,7 +15175,7 @@
             <p:cNvPr id="18" name="Freeform 17">
               <a:extLst>
                 <a:ext uri="{FF2B5EF4-FFF2-40B4-BE49-F238E27FC236}">
-                  <a16:creationId xmlns:a16="http://schemas.microsoft.com/office/drawing/2014/main" xmlns="" id="{351E04E1-FCD0-664D-A440-E67F5F4D328D}"/>
+                  <a16:creationId xmlns="" xmlns:a16="http://schemas.microsoft.com/office/drawing/2014/main" id="{351E04E1-FCD0-664D-A440-E67F5F4D328D}"/>
                 </a:ext>
               </a:extLst>
             </p:cNvPr>
@@ -15397,7 +15397,7 @@
             <p:cNvPr id="20" name="Freeform 19">
               <a:extLst>
                 <a:ext uri="{FF2B5EF4-FFF2-40B4-BE49-F238E27FC236}">
-                  <a16:creationId xmlns:a16="http://schemas.microsoft.com/office/drawing/2014/main" xmlns="" id="{8DC4F329-D01C-094D-ABC3-C4DA25596C37}"/>
+                  <a16:creationId xmlns="" xmlns:a16="http://schemas.microsoft.com/office/drawing/2014/main" id="{8DC4F329-D01C-094D-ABC3-C4DA25596C37}"/>
                 </a:ext>
               </a:extLst>
             </p:cNvPr>
@@ -15647,7 +15647,7 @@
             <p:cNvPr id="22" name="Freeform 21">
               <a:extLst>
                 <a:ext uri="{FF2B5EF4-FFF2-40B4-BE49-F238E27FC236}">
-                  <a16:creationId xmlns:a16="http://schemas.microsoft.com/office/drawing/2014/main" xmlns="" id="{7E04F2F1-51C6-6A47-91BE-CA28F302B4A9}"/>
+                  <a16:creationId xmlns="" xmlns:a16="http://schemas.microsoft.com/office/drawing/2014/main" id="{7E04F2F1-51C6-6A47-91BE-CA28F302B4A9}"/>
                 </a:ext>
               </a:extLst>
             </p:cNvPr>
@@ -15891,7 +15891,7 @@
             <p:cNvPr id="53" name="Freeform 52">
               <a:extLst>
                 <a:ext uri="{FF2B5EF4-FFF2-40B4-BE49-F238E27FC236}">
-                  <a16:creationId xmlns:a16="http://schemas.microsoft.com/office/drawing/2014/main" xmlns="" id="{0147C010-60C8-9843-8796-B13BD5EB5C78}"/>
+                  <a16:creationId xmlns="" xmlns:a16="http://schemas.microsoft.com/office/drawing/2014/main" id="{0147C010-60C8-9843-8796-B13BD5EB5C78}"/>
                 </a:ext>
               </a:extLst>
             </p:cNvPr>
@@ -16279,7 +16279,7 @@
             <p:cNvPr id="56" name="Freeform 55">
               <a:extLst>
                 <a:ext uri="{FF2B5EF4-FFF2-40B4-BE49-F238E27FC236}">
-                  <a16:creationId xmlns:a16="http://schemas.microsoft.com/office/drawing/2014/main" xmlns="" id="{F0095C1D-22F3-BB4B-B94A-E1418D8828E8}"/>
+                  <a16:creationId xmlns="" xmlns:a16="http://schemas.microsoft.com/office/drawing/2014/main" id="{F0095C1D-22F3-BB4B-B94A-E1418D8828E8}"/>
                 </a:ext>
               </a:extLst>
             </p:cNvPr>
@@ -16665,7 +16665,7 @@
             <p:cNvPr id="57" name="Freeform 56">
               <a:extLst>
                 <a:ext uri="{FF2B5EF4-FFF2-40B4-BE49-F238E27FC236}">
-                  <a16:creationId xmlns:a16="http://schemas.microsoft.com/office/drawing/2014/main" xmlns="" id="{47A790B9-35EB-B644-B261-B2582C621B1A}"/>
+                  <a16:creationId xmlns="" xmlns:a16="http://schemas.microsoft.com/office/drawing/2014/main" id="{47A790B9-35EB-B644-B261-B2582C621B1A}"/>
                 </a:ext>
               </a:extLst>
             </p:cNvPr>
@@ -16915,7 +16915,7 @@
             <p:cNvPr id="58" name="Freeform 57">
               <a:extLst>
                 <a:ext uri="{FF2B5EF4-FFF2-40B4-BE49-F238E27FC236}">
-                  <a16:creationId xmlns:a16="http://schemas.microsoft.com/office/drawing/2014/main" xmlns="" id="{72AB0C17-E2D7-9E4A-8F06-5AA42B43D956}"/>
+                  <a16:creationId xmlns="" xmlns:a16="http://schemas.microsoft.com/office/drawing/2014/main" id="{72AB0C17-E2D7-9E4A-8F06-5AA42B43D956}"/>
                 </a:ext>
               </a:extLst>
             </p:cNvPr>
@@ -17301,7 +17301,7 @@
             <p:cNvPr id="60" name="Freeform 59">
               <a:extLst>
                 <a:ext uri="{FF2B5EF4-FFF2-40B4-BE49-F238E27FC236}">
-                  <a16:creationId xmlns:a16="http://schemas.microsoft.com/office/drawing/2014/main" xmlns="" id="{F8FBCBA5-8772-9141-A68A-733CD1CE40F4}"/>
+                  <a16:creationId xmlns="" xmlns:a16="http://schemas.microsoft.com/office/drawing/2014/main" id="{F8FBCBA5-8772-9141-A68A-733CD1CE40F4}"/>
                 </a:ext>
               </a:extLst>
             </p:cNvPr>
@@ -17687,7 +17687,7 @@
             <p:cNvPr id="62" name="Freeform 61">
               <a:extLst>
                 <a:ext uri="{FF2B5EF4-FFF2-40B4-BE49-F238E27FC236}">
-                  <a16:creationId xmlns:a16="http://schemas.microsoft.com/office/drawing/2014/main" xmlns="" id="{81F5B2E2-D515-5449-8565-69EB2D19B507}"/>
+                  <a16:creationId xmlns="" xmlns:a16="http://schemas.microsoft.com/office/drawing/2014/main" id="{81F5B2E2-D515-5449-8565-69EB2D19B507}"/>
                 </a:ext>
               </a:extLst>
             </p:cNvPr>
@@ -17909,7 +17909,7 @@
             <p:cNvPr id="63" name="Freeform 62">
               <a:extLst>
                 <a:ext uri="{FF2B5EF4-FFF2-40B4-BE49-F238E27FC236}">
-                  <a16:creationId xmlns:a16="http://schemas.microsoft.com/office/drawing/2014/main" xmlns="" id="{86706AD3-955C-8C40-A242-3B2625A36FDC}"/>
+                  <a16:creationId xmlns="" xmlns:a16="http://schemas.microsoft.com/office/drawing/2014/main" id="{86706AD3-955C-8C40-A242-3B2625A36FDC}"/>
                 </a:ext>
               </a:extLst>
             </p:cNvPr>
@@ -18239,7 +18239,7 @@
             <p:cNvPr id="65" name="Freeform 64">
               <a:extLst>
                 <a:ext uri="{FF2B5EF4-FFF2-40B4-BE49-F238E27FC236}">
-                  <a16:creationId xmlns:a16="http://schemas.microsoft.com/office/drawing/2014/main" xmlns="" id="{392ED72B-B593-E94B-8E3A-47A57F4EFA28}"/>
+                  <a16:creationId xmlns="" xmlns:a16="http://schemas.microsoft.com/office/drawing/2014/main" id="{392ED72B-B593-E94B-8E3A-47A57F4EFA28}"/>
                 </a:ext>
               </a:extLst>
             </p:cNvPr>
@@ -18625,7 +18625,7 @@
             <p:cNvPr id="67" name="Freeform 66">
               <a:extLst>
                 <a:ext uri="{FF2B5EF4-FFF2-40B4-BE49-F238E27FC236}">
-                  <a16:creationId xmlns:a16="http://schemas.microsoft.com/office/drawing/2014/main" xmlns="" id="{863BAA95-54EC-6648-A2E4-B92D02F843F9}"/>
+                  <a16:creationId xmlns="" xmlns:a16="http://schemas.microsoft.com/office/drawing/2014/main" id="{863BAA95-54EC-6648-A2E4-B92D02F843F9}"/>
                 </a:ext>
               </a:extLst>
             </p:cNvPr>
@@ -18847,7 +18847,7 @@
             <p:cNvPr id="70" name="Straight Arrow Connector 69">
               <a:extLst>
                 <a:ext uri="{FF2B5EF4-FFF2-40B4-BE49-F238E27FC236}">
-                  <a16:creationId xmlns:a16="http://schemas.microsoft.com/office/drawing/2014/main" xmlns="" id="{37CB2550-0B63-614F-A657-CA0C3BAD55B1}"/>
+                  <a16:creationId xmlns="" xmlns:a16="http://schemas.microsoft.com/office/drawing/2014/main" id="{37CB2550-0B63-614F-A657-CA0C3BAD55B1}"/>
                 </a:ext>
               </a:extLst>
             </p:cNvPr>
@@ -18893,7 +18893,7 @@
                 <p:cNvPr id="76" name="TextBox 75">
                   <a:extLst>
                     <a:ext uri="{FF2B5EF4-FFF2-40B4-BE49-F238E27FC236}">
-                      <a16:creationId xmlns:a16="http://schemas.microsoft.com/office/drawing/2014/main" xmlns="" id="{9855CA9B-1AE1-6F48-B19D-C1DCCFD013A6}"/>
+                      <a16:creationId xmlns="" xmlns:a16="http://schemas.microsoft.com/office/drawing/2014/main" id="{9855CA9B-1AE1-6F48-B19D-C1DCCFD013A6}"/>
                     </a:ext>
                   </a:extLst>
                 </p:cNvPr>
@@ -19006,7 +19006,7 @@
             <p:cNvPr id="79" name="Straight Arrow Connector 78">
               <a:extLst>
                 <a:ext uri="{FF2B5EF4-FFF2-40B4-BE49-F238E27FC236}">
-                  <a16:creationId xmlns:a16="http://schemas.microsoft.com/office/drawing/2014/main" xmlns="" id="{55665669-207C-A24A-BA6F-7BBB58EA34B9}"/>
+                  <a16:creationId xmlns="" xmlns:a16="http://schemas.microsoft.com/office/drawing/2014/main" id="{55665669-207C-A24A-BA6F-7BBB58EA34B9}"/>
                 </a:ext>
               </a:extLst>
             </p:cNvPr>
@@ -19052,7 +19052,7 @@
                 <p:cNvPr id="80" name="TextBox 79">
                   <a:extLst>
                     <a:ext uri="{FF2B5EF4-FFF2-40B4-BE49-F238E27FC236}">
-                      <a16:creationId xmlns:a16="http://schemas.microsoft.com/office/drawing/2014/main" xmlns="" id="{34A6CB74-D772-554F-8A10-ABD6AFE1BFFE}"/>
+                      <a16:creationId xmlns="" xmlns:a16="http://schemas.microsoft.com/office/drawing/2014/main" id="{34A6CB74-D772-554F-8A10-ABD6AFE1BFFE}"/>
                     </a:ext>
                   </a:extLst>
                 </p:cNvPr>
@@ -19165,7 +19165,7 @@
             <p:cNvPr id="81" name="Straight Arrow Connector 80">
               <a:extLst>
                 <a:ext uri="{FF2B5EF4-FFF2-40B4-BE49-F238E27FC236}">
-                  <a16:creationId xmlns:a16="http://schemas.microsoft.com/office/drawing/2014/main" xmlns="" id="{FDFE2E75-8803-D645-962C-55BE74228762}"/>
+                  <a16:creationId xmlns="" xmlns:a16="http://schemas.microsoft.com/office/drawing/2014/main" id="{FDFE2E75-8803-D645-962C-55BE74228762}"/>
                 </a:ext>
               </a:extLst>
             </p:cNvPr>
@@ -19209,7 +19209,7 @@
             <p:cNvPr id="86" name="Straight Arrow Connector 85">
               <a:extLst>
                 <a:ext uri="{FF2B5EF4-FFF2-40B4-BE49-F238E27FC236}">
-                  <a16:creationId xmlns:a16="http://schemas.microsoft.com/office/drawing/2014/main" xmlns="" id="{93DD0A17-02BB-484C-A585-78064B5351E9}"/>
+                  <a16:creationId xmlns="" xmlns:a16="http://schemas.microsoft.com/office/drawing/2014/main" id="{93DD0A17-02BB-484C-A585-78064B5351E9}"/>
                 </a:ext>
               </a:extLst>
             </p:cNvPr>
@@ -19255,7 +19255,7 @@
                 <p:cNvPr id="87" name="TextBox 86">
                   <a:extLst>
                     <a:ext uri="{FF2B5EF4-FFF2-40B4-BE49-F238E27FC236}">
-                      <a16:creationId xmlns:a16="http://schemas.microsoft.com/office/drawing/2014/main" xmlns="" id="{99094E6F-4903-FA41-A682-767C00BC8280}"/>
+                      <a16:creationId xmlns="" xmlns:a16="http://schemas.microsoft.com/office/drawing/2014/main" id="{99094E6F-4903-FA41-A682-767C00BC8280}"/>
                     </a:ext>
                   </a:extLst>
                 </p:cNvPr>
@@ -19370,7 +19370,7 @@
                 <p:cNvPr id="88" name="TextBox 87">
                   <a:extLst>
                     <a:ext uri="{FF2B5EF4-FFF2-40B4-BE49-F238E27FC236}">
-                      <a16:creationId xmlns:a16="http://schemas.microsoft.com/office/drawing/2014/main" xmlns="" id="{CA81FD42-A571-FD45-A4BD-D662E0F8144C}"/>
+                      <a16:creationId xmlns="" xmlns:a16="http://schemas.microsoft.com/office/drawing/2014/main" id="{CA81FD42-A571-FD45-A4BD-D662E0F8144C}"/>
                     </a:ext>
                   </a:extLst>
                 </p:cNvPr>
@@ -19514,7 +19514,7 @@
           <p:cNvPr id="4" name="Picture 3">
             <a:extLst>
               <a:ext uri="{FF2B5EF4-FFF2-40B4-BE49-F238E27FC236}">
-                <a16:creationId xmlns:a16="http://schemas.microsoft.com/office/drawing/2014/main" xmlns="" id="{1F46FB23-65FB-9049-9C50-43B5B6AD9EA8}"/>
+                <a16:creationId xmlns="" xmlns:a16="http://schemas.microsoft.com/office/drawing/2014/main" id="{1F46FB23-65FB-9049-9C50-43B5B6AD9EA8}"/>
               </a:ext>
             </a:extLst>
           </p:cNvPr>
@@ -19544,7 +19544,7 @@
           <p:cNvPr id="6" name="Straight Connector 5">
             <a:extLst>
               <a:ext uri="{FF2B5EF4-FFF2-40B4-BE49-F238E27FC236}">
-                <a16:creationId xmlns:a16="http://schemas.microsoft.com/office/drawing/2014/main" xmlns="" id="{3E621B72-9657-FE4E-9C41-001E2A069FE3}"/>
+                <a16:creationId xmlns="" xmlns:a16="http://schemas.microsoft.com/office/drawing/2014/main" id="{3E621B72-9657-FE4E-9C41-001E2A069FE3}"/>
               </a:ext>
             </a:extLst>
           </p:cNvPr>
@@ -21111,8 +21111,8 @@
             </a:p>
           </p:txBody>
         </p:sp>
-        <mc:AlternateContent xmlns:mc="http://schemas.openxmlformats.org/markup-compatibility/2006" xmlns:a14="http://schemas.microsoft.com/office/drawing/2010/main">
-          <mc:Choice Requires="a14">
+        <mc:AlternateContent xmlns:mc="http://schemas.openxmlformats.org/markup-compatibility/2006">
+          <mc:Choice xmlns:a14="http://schemas.microsoft.com/office/drawing/2010/main" Requires="a14">
             <p:sp>
               <p:nvSpPr>
                 <p:cNvPr id="71" name="CaixaDeTexto 70"/>
@@ -21122,7 +21122,7 @@
               <p:spPr>
                 <a:xfrm>
                   <a:off x="5623451" y="5223391"/>
-                  <a:ext cx="1025220" cy="281744"/>
+                  <a:ext cx="1025220" cy="306431"/>
                 </a:xfrm>
                 <a:prstGeom prst="rect">
                   <a:avLst/>
@@ -21165,24 +21165,40 @@
                             </m:r>
                           </m:e>
                           <m:sub>
-                            <m:r>
-                              <a:rPr lang="pt-BR" b="0" i="1" smtClean="0">
-                                <a:solidFill>
-                                  <a:srgbClr val="00B050"/>
-                                </a:solidFill>
-                                <a:latin typeface="Cambria Math" panose="02040503050406030204" pitchFamily="18" charset="0"/>
-                              </a:rPr>
-                              <m:t>𝑒</m:t>
-                            </m:r>
-                            <m:r>
-                              <a:rPr lang="pt-BR" b="0" i="1" smtClean="0">
-                                <a:solidFill>
-                                  <a:srgbClr val="00B050"/>
-                                </a:solidFill>
-                                <a:latin typeface="Cambria Math" panose="02040503050406030204" pitchFamily="18" charset="0"/>
-                              </a:rPr>
-                              <m:t>1</m:t>
-                            </m:r>
+                            <m:sSub>
+                              <m:sSubPr>
+                                <m:ctrlPr>
+                                  <a:rPr lang="pt-BR" b="0" i="1" smtClean="0">
+                                    <a:solidFill>
+                                      <a:srgbClr val="00B050"/>
+                                    </a:solidFill>
+                                    <a:latin typeface="Cambria Math" panose="02040503050406030204" pitchFamily="18" charset="0"/>
+                                  </a:rPr>
+                                </m:ctrlPr>
+                              </m:sSubPr>
+                              <m:e>
+                                <m:r>
+                                  <a:rPr lang="pt-BR" b="0" i="1" smtClean="0">
+                                    <a:solidFill>
+                                      <a:srgbClr val="00B050"/>
+                                    </a:solidFill>
+                                    <a:latin typeface="Cambria Math" panose="02040503050406030204" pitchFamily="18" charset="0"/>
+                                  </a:rPr>
+                                  <m:t>𝑒</m:t>
+                                </m:r>
+                              </m:e>
+                              <m:sub>
+                                <m:r>
+                                  <a:rPr lang="pt-BR" b="0" i="1" smtClean="0">
+                                    <a:solidFill>
+                                      <a:srgbClr val="00B050"/>
+                                    </a:solidFill>
+                                    <a:latin typeface="Cambria Math" panose="02040503050406030204" pitchFamily="18" charset="0"/>
+                                  </a:rPr>
+                                  <m:t>1</m:t>
+                                </m:r>
+                              </m:sub>
+                            </m:sSub>
                           </m:sub>
                           <m:sup>
                             <m:r>
@@ -21228,24 +21244,40 @@
                             </m:r>
                           </m:e>
                           <m:sub>
-                            <m:r>
-                              <a:rPr lang="pt-BR" i="1">
-                                <a:solidFill>
-                                  <a:srgbClr val="FF0000"/>
-                                </a:solidFill>
-                                <a:latin typeface="Cambria Math" panose="02040503050406030204" pitchFamily="18" charset="0"/>
-                              </a:rPr>
-                              <m:t>𝑒</m:t>
-                            </m:r>
-                            <m:r>
-                              <a:rPr lang="pt-BR" i="1">
-                                <a:solidFill>
-                                  <a:srgbClr val="FF0000"/>
-                                </a:solidFill>
-                                <a:latin typeface="Cambria Math" panose="02040503050406030204" pitchFamily="18" charset="0"/>
-                              </a:rPr>
-                              <m:t>2</m:t>
-                            </m:r>
+                            <m:sSub>
+                              <m:sSubPr>
+                                <m:ctrlPr>
+                                  <a:rPr lang="pt-BR" b="0" i="1" smtClean="0">
+                                    <a:solidFill>
+                                      <a:srgbClr val="FF0000"/>
+                                    </a:solidFill>
+                                    <a:latin typeface="Cambria Math" panose="02040503050406030204" pitchFamily="18" charset="0"/>
+                                  </a:rPr>
+                                </m:ctrlPr>
+                              </m:sSubPr>
+                              <m:e>
+                                <m:r>
+                                  <a:rPr lang="pt-BR" i="1">
+                                    <a:solidFill>
+                                      <a:srgbClr val="FF0000"/>
+                                    </a:solidFill>
+                                    <a:latin typeface="Cambria Math" panose="02040503050406030204" pitchFamily="18" charset="0"/>
+                                  </a:rPr>
+                                  <m:t>𝑒</m:t>
+                                </m:r>
+                              </m:e>
+                              <m:sub>
+                                <m:r>
+                                  <a:rPr lang="pt-BR" b="0" i="1" smtClean="0">
+                                    <a:solidFill>
+                                      <a:srgbClr val="FF0000"/>
+                                    </a:solidFill>
+                                    <a:latin typeface="Cambria Math" panose="02040503050406030204" pitchFamily="18" charset="0"/>
+                                  </a:rPr>
+                                  <m:t>2</m:t>
+                                </m:r>
+                              </m:sub>
+                            </m:sSub>
                           </m:sub>
                           <m:sup>
                             <m:r>
@@ -21271,7 +21303,7 @@
               </p:txBody>
             </p:sp>
           </mc:Choice>
-          <mc:Fallback xmlns="">
+          <mc:Fallback>
             <p:sp>
               <p:nvSpPr>
                 <p:cNvPr id="71" name="CaixaDeTexto 70"/>
@@ -21283,7 +21315,7 @@
               <p:spPr>
                 <a:xfrm>
                   <a:off x="5623451" y="5223391"/>
-                  <a:ext cx="1025220" cy="281744"/>
+                  <a:ext cx="1025220" cy="306431"/>
                 </a:xfrm>
                 <a:prstGeom prst="rect">
                   <a:avLst/>
@@ -21291,7 +21323,7 @@
                 <a:blipFill rotWithShape="0">
                   <a:blip r:embed="rId6"/>
                   <a:stretch>
-                    <a:fillRect t="-2174" b="-17391"/>
+                    <a:fillRect b="-16000"/>
                   </a:stretch>
                 </a:blipFill>
               </p:spPr>
@@ -21555,8 +21587,8 @@
             </a:fontRef>
           </p:style>
         </p:cxnSp>
-        <mc:AlternateContent xmlns:mc="http://schemas.openxmlformats.org/markup-compatibility/2006" xmlns:a14="http://schemas.microsoft.com/office/drawing/2010/main">
-          <mc:Choice Requires="a14">
+        <mc:AlternateContent xmlns:mc="http://schemas.openxmlformats.org/markup-compatibility/2006">
+          <mc:Choice xmlns:a14="http://schemas.microsoft.com/office/drawing/2010/main" Requires="a14">
             <p:sp>
               <p:nvSpPr>
                 <p:cNvPr id="79" name="CaixaDeTexto 78"/>
@@ -21566,7 +21598,7 @@
               <p:spPr>
                 <a:xfrm>
                   <a:off x="8579295" y="4872445"/>
-                  <a:ext cx="1025220" cy="281744"/>
+                  <a:ext cx="1025220" cy="311496"/>
                 </a:xfrm>
                 <a:prstGeom prst="rect">
                   <a:avLst/>
@@ -21609,24 +21641,40 @@
                             </m:r>
                           </m:e>
                           <m:sub>
-                            <m:r>
-                              <a:rPr lang="pt-BR" b="0" i="1" smtClean="0">
-                                <a:solidFill>
-                                  <a:srgbClr val="00B050"/>
-                                </a:solidFill>
-                                <a:latin typeface="Cambria Math" panose="02040503050406030204" pitchFamily="18" charset="0"/>
-                              </a:rPr>
-                              <m:t>𝑒</m:t>
-                            </m:r>
-                            <m:r>
-                              <a:rPr lang="pt-BR" b="0" i="1" smtClean="0">
-                                <a:solidFill>
-                                  <a:srgbClr val="00B050"/>
-                                </a:solidFill>
-                                <a:latin typeface="Cambria Math" panose="02040503050406030204" pitchFamily="18" charset="0"/>
-                              </a:rPr>
-                              <m:t>3</m:t>
-                            </m:r>
+                            <m:sSub>
+                              <m:sSubPr>
+                                <m:ctrlPr>
+                                  <a:rPr lang="pt-BR" b="0" i="1" smtClean="0">
+                                    <a:solidFill>
+                                      <a:srgbClr val="00B050"/>
+                                    </a:solidFill>
+                                    <a:latin typeface="Cambria Math" panose="02040503050406030204" pitchFamily="18" charset="0"/>
+                                  </a:rPr>
+                                </m:ctrlPr>
+                              </m:sSubPr>
+                              <m:e>
+                                <m:r>
+                                  <a:rPr lang="pt-BR" b="0" i="1" smtClean="0">
+                                    <a:solidFill>
+                                      <a:srgbClr val="00B050"/>
+                                    </a:solidFill>
+                                    <a:latin typeface="Cambria Math" panose="02040503050406030204" pitchFamily="18" charset="0"/>
+                                  </a:rPr>
+                                  <m:t>𝑒</m:t>
+                                </m:r>
+                              </m:e>
+                              <m:sub>
+                                <m:r>
+                                  <a:rPr lang="pt-BR" b="0" i="1" smtClean="0">
+                                    <a:solidFill>
+                                      <a:srgbClr val="00B050"/>
+                                    </a:solidFill>
+                                    <a:latin typeface="Cambria Math" panose="02040503050406030204" pitchFamily="18" charset="0"/>
+                                  </a:rPr>
+                                  <m:t>3</m:t>
+                                </m:r>
+                              </m:sub>
+                            </m:sSub>
                           </m:sub>
                           <m:sup>
                             <m:r>
@@ -21672,24 +21720,40 @@
                             </m:r>
                           </m:e>
                           <m:sub>
-                            <m:r>
-                              <a:rPr lang="pt-BR" i="1">
-                                <a:solidFill>
-                                  <a:srgbClr val="FF0000"/>
-                                </a:solidFill>
-                                <a:latin typeface="Cambria Math" panose="02040503050406030204" pitchFamily="18" charset="0"/>
-                              </a:rPr>
-                              <m:t>𝑒</m:t>
-                            </m:r>
-                            <m:r>
-                              <a:rPr lang="pt-BR" b="0" i="1" smtClean="0">
-                                <a:solidFill>
-                                  <a:srgbClr val="FF0000"/>
-                                </a:solidFill>
-                                <a:latin typeface="Cambria Math" panose="02040503050406030204" pitchFamily="18" charset="0"/>
-                              </a:rPr>
-                              <m:t>4</m:t>
-                            </m:r>
+                            <m:sSub>
+                              <m:sSubPr>
+                                <m:ctrlPr>
+                                  <a:rPr lang="pt-BR" b="0" i="1" smtClean="0">
+                                    <a:solidFill>
+                                      <a:srgbClr val="FF0000"/>
+                                    </a:solidFill>
+                                    <a:latin typeface="Cambria Math" panose="02040503050406030204" pitchFamily="18" charset="0"/>
+                                  </a:rPr>
+                                </m:ctrlPr>
+                              </m:sSubPr>
+                              <m:e>
+                                <m:r>
+                                  <a:rPr lang="pt-BR" i="1">
+                                    <a:solidFill>
+                                      <a:srgbClr val="FF0000"/>
+                                    </a:solidFill>
+                                    <a:latin typeface="Cambria Math" panose="02040503050406030204" pitchFamily="18" charset="0"/>
+                                  </a:rPr>
+                                  <m:t>𝑒</m:t>
+                                </m:r>
+                              </m:e>
+                              <m:sub>
+                                <m:r>
+                                  <a:rPr lang="pt-BR" b="0" i="1" smtClean="0">
+                                    <a:solidFill>
+                                      <a:srgbClr val="FF0000"/>
+                                    </a:solidFill>
+                                    <a:latin typeface="Cambria Math" panose="02040503050406030204" pitchFamily="18" charset="0"/>
+                                  </a:rPr>
+                                  <m:t>4</m:t>
+                                </m:r>
+                              </m:sub>
+                            </m:sSub>
                           </m:sub>
                           <m:sup>
                             <m:r>
@@ -21715,7 +21779,7 @@
               </p:txBody>
             </p:sp>
           </mc:Choice>
-          <mc:Fallback xmlns="">
+          <mc:Fallback>
             <p:sp>
               <p:nvSpPr>
                 <p:cNvPr id="79" name="CaixaDeTexto 78"/>
@@ -21727,7 +21791,7 @@
               <p:spPr>
                 <a:xfrm>
                   <a:off x="8579295" y="4872445"/>
-                  <a:ext cx="1025220" cy="281744"/>
+                  <a:ext cx="1025220" cy="311496"/>
                 </a:xfrm>
                 <a:prstGeom prst="rect">
                   <a:avLst/>
@@ -21735,7 +21799,7 @@
                 <a:blipFill rotWithShape="0">
                   <a:blip r:embed="rId7"/>
                   <a:stretch>
-                    <a:fillRect t="-2128" b="-17021"/>
+                    <a:fillRect b="-13725"/>
                   </a:stretch>
                 </a:blipFill>
               </p:spPr>
@@ -21754,8 +21818,8 @@
             </p:sp>
           </mc:Fallback>
         </mc:AlternateContent>
-        <mc:AlternateContent xmlns:mc="http://schemas.openxmlformats.org/markup-compatibility/2006" xmlns:a14="http://schemas.microsoft.com/office/drawing/2010/main">
-          <mc:Choice Requires="a14">
+        <mc:AlternateContent xmlns:mc="http://schemas.openxmlformats.org/markup-compatibility/2006">
+          <mc:Choice xmlns:a14="http://schemas.microsoft.com/office/drawing/2010/main" Requires="a14">
             <p:sp>
               <p:nvSpPr>
                 <p:cNvPr id="80" name="CaixaDeTexto 79"/>
@@ -21765,7 +21829,7 @@
               <p:spPr>
                 <a:xfrm>
                   <a:off x="6866621" y="2770712"/>
-                  <a:ext cx="1025220" cy="286489"/>
+                  <a:ext cx="1025220" cy="312330"/>
                 </a:xfrm>
                 <a:prstGeom prst="rect">
                   <a:avLst/>
@@ -21808,24 +21872,40 @@
                             </m:r>
                           </m:e>
                           <m:sub>
-                            <m:r>
-                              <a:rPr lang="pt-BR" b="0" i="1" smtClean="0">
-                                <a:solidFill>
-                                  <a:srgbClr val="00B050"/>
-                                </a:solidFill>
-                                <a:latin typeface="Cambria Math" panose="02040503050406030204" pitchFamily="18" charset="0"/>
-                              </a:rPr>
-                              <m:t>𝑒</m:t>
-                            </m:r>
-                            <m:r>
-                              <a:rPr lang="pt-BR" b="0" i="1" smtClean="0">
-                                <a:solidFill>
-                                  <a:srgbClr val="00B050"/>
-                                </a:solidFill>
-                                <a:latin typeface="Cambria Math" panose="02040503050406030204" pitchFamily="18" charset="0"/>
-                              </a:rPr>
-                              <m:t>5</m:t>
-                            </m:r>
+                            <m:sSub>
+                              <m:sSubPr>
+                                <m:ctrlPr>
+                                  <a:rPr lang="pt-BR" b="0" i="1" smtClean="0">
+                                    <a:solidFill>
+                                      <a:srgbClr val="00B050"/>
+                                    </a:solidFill>
+                                    <a:latin typeface="Cambria Math" panose="02040503050406030204" pitchFamily="18" charset="0"/>
+                                  </a:rPr>
+                                </m:ctrlPr>
+                              </m:sSubPr>
+                              <m:e>
+                                <m:r>
+                                  <a:rPr lang="pt-BR" b="0" i="1" smtClean="0">
+                                    <a:solidFill>
+                                      <a:srgbClr val="00B050"/>
+                                    </a:solidFill>
+                                    <a:latin typeface="Cambria Math" panose="02040503050406030204" pitchFamily="18" charset="0"/>
+                                  </a:rPr>
+                                  <m:t>𝑒</m:t>
+                                </m:r>
+                              </m:e>
+                              <m:sub>
+                                <m:r>
+                                  <a:rPr lang="pt-BR" b="0" i="1" smtClean="0">
+                                    <a:solidFill>
+                                      <a:srgbClr val="00B050"/>
+                                    </a:solidFill>
+                                    <a:latin typeface="Cambria Math" panose="02040503050406030204" pitchFamily="18" charset="0"/>
+                                  </a:rPr>
+                                  <m:t>5</m:t>
+                                </m:r>
+                              </m:sub>
+                            </m:sSub>
                           </m:sub>
                           <m:sup>
                             <m:r>
@@ -21871,24 +21951,40 @@
                             </m:r>
                           </m:e>
                           <m:sub>
-                            <m:r>
-                              <a:rPr lang="pt-BR" i="1">
-                                <a:solidFill>
-                                  <a:srgbClr val="FF0000"/>
-                                </a:solidFill>
-                                <a:latin typeface="Cambria Math" panose="02040503050406030204" pitchFamily="18" charset="0"/>
-                              </a:rPr>
-                              <m:t>𝑒</m:t>
-                            </m:r>
-                            <m:r>
-                              <a:rPr lang="pt-BR" b="0" i="1" smtClean="0">
-                                <a:solidFill>
-                                  <a:srgbClr val="FF0000"/>
-                                </a:solidFill>
-                                <a:latin typeface="Cambria Math" panose="02040503050406030204" pitchFamily="18" charset="0"/>
-                              </a:rPr>
-                              <m:t>6</m:t>
-                            </m:r>
+                            <m:sSub>
+                              <m:sSubPr>
+                                <m:ctrlPr>
+                                  <a:rPr lang="pt-BR" b="0" i="1" smtClean="0">
+                                    <a:solidFill>
+                                      <a:srgbClr val="FF0000"/>
+                                    </a:solidFill>
+                                    <a:latin typeface="Cambria Math" panose="02040503050406030204" pitchFamily="18" charset="0"/>
+                                  </a:rPr>
+                                </m:ctrlPr>
+                              </m:sSubPr>
+                              <m:e>
+                                <m:r>
+                                  <a:rPr lang="pt-BR" i="1">
+                                    <a:solidFill>
+                                      <a:srgbClr val="FF0000"/>
+                                    </a:solidFill>
+                                    <a:latin typeface="Cambria Math" panose="02040503050406030204" pitchFamily="18" charset="0"/>
+                                  </a:rPr>
+                                  <m:t>𝑒</m:t>
+                                </m:r>
+                              </m:e>
+                              <m:sub>
+                                <m:r>
+                                  <a:rPr lang="pt-BR" b="0" i="1" smtClean="0">
+                                    <a:solidFill>
+                                      <a:srgbClr val="FF0000"/>
+                                    </a:solidFill>
+                                    <a:latin typeface="Cambria Math" panose="02040503050406030204" pitchFamily="18" charset="0"/>
+                                  </a:rPr>
+                                  <m:t>6</m:t>
+                                </m:r>
+                              </m:sub>
+                            </m:sSub>
                           </m:sub>
                           <m:sup>
                             <m:r>
@@ -21914,7 +22010,7 @@
               </p:txBody>
             </p:sp>
           </mc:Choice>
-          <mc:Fallback xmlns="">
+          <mc:Fallback>
             <p:sp>
               <p:nvSpPr>
                 <p:cNvPr id="80" name="CaixaDeTexto 79"/>
@@ -21926,7 +22022,7 @@
               <p:spPr>
                 <a:xfrm>
                   <a:off x="6866621" y="2770712"/>
-                  <a:ext cx="1025220" cy="286489"/>
+                  <a:ext cx="1025220" cy="312330"/>
                 </a:xfrm>
                 <a:prstGeom prst="rect">
                   <a:avLst/>
@@ -21934,7 +22030,7 @@
                 <a:blipFill rotWithShape="0">
                   <a:blip r:embed="rId8"/>
                   <a:stretch>
-                    <a:fillRect t="-2128" b="-19149"/>
+                    <a:fillRect b="-13725"/>
                   </a:stretch>
                 </a:blipFill>
               </p:spPr>
@@ -21953,8 +22049,8 @@
             </p:sp>
           </mc:Fallback>
         </mc:AlternateContent>
-        <mc:AlternateContent xmlns:mc="http://schemas.openxmlformats.org/markup-compatibility/2006" xmlns:a14="http://schemas.microsoft.com/office/drawing/2010/main">
-          <mc:Choice Requires="a14">
+        <mc:AlternateContent xmlns:mc="http://schemas.openxmlformats.org/markup-compatibility/2006">
+          <mc:Choice xmlns:a14="http://schemas.microsoft.com/office/drawing/2010/main" Requires="a14">
             <p:sp>
               <p:nvSpPr>
                 <p:cNvPr id="81" name="CaixaDeTexto 80"/>
@@ -21964,7 +22060,7 @@
               <p:spPr>
                 <a:xfrm>
                   <a:off x="5129584" y="3114561"/>
-                  <a:ext cx="1025220" cy="281744"/>
+                  <a:ext cx="1025220" cy="308226"/>
                 </a:xfrm>
                 <a:prstGeom prst="rect">
                   <a:avLst/>
@@ -22007,24 +22103,40 @@
                             </m:r>
                           </m:e>
                           <m:sub>
-                            <m:r>
-                              <a:rPr lang="pt-BR" b="0" i="1" smtClean="0">
-                                <a:solidFill>
-                                  <a:srgbClr val="00B050"/>
-                                </a:solidFill>
-                                <a:latin typeface="Cambria Math" panose="02040503050406030204" pitchFamily="18" charset="0"/>
-                              </a:rPr>
-                              <m:t>𝑒</m:t>
-                            </m:r>
-                            <m:r>
-                              <a:rPr lang="pt-BR" b="0" i="1" smtClean="0">
-                                <a:solidFill>
-                                  <a:srgbClr val="00B050"/>
-                                </a:solidFill>
-                                <a:latin typeface="Cambria Math" panose="02040503050406030204" pitchFamily="18" charset="0"/>
-                              </a:rPr>
-                              <m:t>7</m:t>
-                            </m:r>
+                            <m:sSub>
+                              <m:sSubPr>
+                                <m:ctrlPr>
+                                  <a:rPr lang="pt-BR" b="0" i="1" smtClean="0">
+                                    <a:solidFill>
+                                      <a:srgbClr val="00B050"/>
+                                    </a:solidFill>
+                                    <a:latin typeface="Cambria Math" panose="02040503050406030204" pitchFamily="18" charset="0"/>
+                                  </a:rPr>
+                                </m:ctrlPr>
+                              </m:sSubPr>
+                              <m:e>
+                                <m:r>
+                                  <a:rPr lang="pt-BR" b="0" i="1" smtClean="0">
+                                    <a:solidFill>
+                                      <a:srgbClr val="00B050"/>
+                                    </a:solidFill>
+                                    <a:latin typeface="Cambria Math" panose="02040503050406030204" pitchFamily="18" charset="0"/>
+                                  </a:rPr>
+                                  <m:t>𝑒</m:t>
+                                </m:r>
+                              </m:e>
+                              <m:sub>
+                                <m:r>
+                                  <a:rPr lang="pt-BR" b="0" i="1" smtClean="0">
+                                    <a:solidFill>
+                                      <a:srgbClr val="00B050"/>
+                                    </a:solidFill>
+                                    <a:latin typeface="Cambria Math" panose="02040503050406030204" pitchFamily="18" charset="0"/>
+                                  </a:rPr>
+                                  <m:t>7</m:t>
+                                </m:r>
+                              </m:sub>
+                            </m:sSub>
                           </m:sub>
                           <m:sup>
                             <m:r>
@@ -22070,24 +22182,40 @@
                             </m:r>
                           </m:e>
                           <m:sub>
-                            <m:r>
-                              <a:rPr lang="pt-BR" i="1">
-                                <a:solidFill>
-                                  <a:srgbClr val="FF0000"/>
-                                </a:solidFill>
-                                <a:latin typeface="Cambria Math" panose="02040503050406030204" pitchFamily="18" charset="0"/>
-                              </a:rPr>
-                              <m:t>𝑒</m:t>
-                            </m:r>
-                            <m:r>
-                              <a:rPr lang="pt-BR" b="0" i="1" smtClean="0">
-                                <a:solidFill>
-                                  <a:srgbClr val="FF0000"/>
-                                </a:solidFill>
-                                <a:latin typeface="Cambria Math" panose="02040503050406030204" pitchFamily="18" charset="0"/>
-                              </a:rPr>
-                              <m:t>8</m:t>
-                            </m:r>
+                            <m:sSub>
+                              <m:sSubPr>
+                                <m:ctrlPr>
+                                  <a:rPr lang="pt-BR" b="0" i="1" smtClean="0">
+                                    <a:solidFill>
+                                      <a:srgbClr val="FF0000"/>
+                                    </a:solidFill>
+                                    <a:latin typeface="Cambria Math" panose="02040503050406030204" pitchFamily="18" charset="0"/>
+                                  </a:rPr>
+                                </m:ctrlPr>
+                              </m:sSubPr>
+                              <m:e>
+                                <m:r>
+                                  <a:rPr lang="pt-BR" i="1">
+                                    <a:solidFill>
+                                      <a:srgbClr val="FF0000"/>
+                                    </a:solidFill>
+                                    <a:latin typeface="Cambria Math" panose="02040503050406030204" pitchFamily="18" charset="0"/>
+                                  </a:rPr>
+                                  <m:t>𝑒</m:t>
+                                </m:r>
+                              </m:e>
+                              <m:sub>
+                                <m:r>
+                                  <a:rPr lang="pt-BR" b="0" i="1" smtClean="0">
+                                    <a:solidFill>
+                                      <a:srgbClr val="FF0000"/>
+                                    </a:solidFill>
+                                    <a:latin typeface="Cambria Math" panose="02040503050406030204" pitchFamily="18" charset="0"/>
+                                  </a:rPr>
+                                  <m:t>8</m:t>
+                                </m:r>
+                              </m:sub>
+                            </m:sSub>
                           </m:sub>
                           <m:sup>
                             <m:r>
@@ -22113,7 +22241,7 @@
               </p:txBody>
             </p:sp>
           </mc:Choice>
-          <mc:Fallback xmlns="">
+          <mc:Fallback>
             <p:sp>
               <p:nvSpPr>
                 <p:cNvPr id="81" name="CaixaDeTexto 80"/>
@@ -22125,7 +22253,7 @@
               <p:spPr>
                 <a:xfrm>
                   <a:off x="5129584" y="3114561"/>
-                  <a:ext cx="1025220" cy="281744"/>
+                  <a:ext cx="1025220" cy="308226"/>
                 </a:xfrm>
                 <a:prstGeom prst="rect">
                   <a:avLst/>
@@ -22133,7 +22261,7 @@
                 <a:blipFill rotWithShape="0">
                   <a:blip r:embed="rId9"/>
                   <a:stretch>
-                    <a:fillRect t="-2174" b="-17391"/>
+                    <a:fillRect b="-16000"/>
                   </a:stretch>
                 </a:blipFill>
               </p:spPr>

</xml_diff>

<commit_message>
Atualizando figura do NNZ do prolongamento.
</commit_message>
<xml_diff>
--- a/Outros/MestradoFiguras.pptx
+++ b/Outros/MestradoFiguras.pptx
@@ -11,8 +11,9 @@
     <p:sldId id="259" r:id="rId5"/>
     <p:sldId id="260" r:id="rId6"/>
     <p:sldId id="261" r:id="rId7"/>
-    <p:sldId id="262" r:id="rId8"/>
-    <p:sldId id="263" r:id="rId9"/>
+    <p:sldId id="264" r:id="rId8"/>
+    <p:sldId id="262" r:id="rId9"/>
+    <p:sldId id="263" r:id="rId10"/>
   </p:sldIdLst>
   <p:sldSz cx="12192000" cy="6858000"/>
   <p:notesSz cx="6858000" cy="9144000"/>
@@ -11660,7 +11661,7 @@
           <p:cNvPr id="9" name="Conector de Seta Reta 30">
             <a:extLst>
               <a:ext uri="{FF2B5EF4-FFF2-40B4-BE49-F238E27FC236}">
-                <a16:creationId xmlns="" xmlns:a16="http://schemas.microsoft.com/office/drawing/2014/main" id="{F4E2726F-250A-244A-9FEF-08E332214A0E}"/>
+                <a16:creationId xmlns:a16="http://schemas.microsoft.com/office/drawing/2014/main" xmlns="" id="{F4E2726F-250A-244A-9FEF-08E332214A0E}"/>
               </a:ext>
             </a:extLst>
           </p:cNvPr>
@@ -11702,7 +11703,7 @@
           <p:cNvPr id="11" name="Conector de Seta Reta 31">
             <a:extLst>
               <a:ext uri="{FF2B5EF4-FFF2-40B4-BE49-F238E27FC236}">
-                <a16:creationId xmlns="" xmlns:a16="http://schemas.microsoft.com/office/drawing/2014/main" id="{58C6BB8A-40B7-1D44-841F-91C8117B7A12}"/>
+                <a16:creationId xmlns:a16="http://schemas.microsoft.com/office/drawing/2014/main" xmlns="" id="{58C6BB8A-40B7-1D44-841F-91C8117B7A12}"/>
               </a:ext>
             </a:extLst>
           </p:cNvPr>
@@ -11744,7 +11745,7 @@
           <p:cNvPr id="12" name="CaixaDeTexto 37">
             <a:extLst>
               <a:ext uri="{FF2B5EF4-FFF2-40B4-BE49-F238E27FC236}">
-                <a16:creationId xmlns="" xmlns:a16="http://schemas.microsoft.com/office/drawing/2014/main" id="{71091896-9F67-8847-9C2A-DE057411D085}"/>
+                <a16:creationId xmlns:a16="http://schemas.microsoft.com/office/drawing/2014/main" xmlns="" id="{71091896-9F67-8847-9C2A-DE057411D085}"/>
               </a:ext>
             </a:extLst>
           </p:cNvPr>
@@ -11779,7 +11780,7 @@
           <p:cNvPr id="13" name="CaixaDeTexto 38">
             <a:extLst>
               <a:ext uri="{FF2B5EF4-FFF2-40B4-BE49-F238E27FC236}">
-                <a16:creationId xmlns="" xmlns:a16="http://schemas.microsoft.com/office/drawing/2014/main" id="{76B8159C-42E2-4940-B7F6-6CFD8DA7CF7E}"/>
+                <a16:creationId xmlns:a16="http://schemas.microsoft.com/office/drawing/2014/main" xmlns="" id="{76B8159C-42E2-4940-B7F6-6CFD8DA7CF7E}"/>
               </a:ext>
             </a:extLst>
           </p:cNvPr>
@@ -11814,7 +11815,7 @@
           <p:cNvPr id="14" name="Conector de Seta Reta 31">
             <a:extLst>
               <a:ext uri="{FF2B5EF4-FFF2-40B4-BE49-F238E27FC236}">
-                <a16:creationId xmlns="" xmlns:a16="http://schemas.microsoft.com/office/drawing/2014/main" id="{6270ED07-5855-EB46-9509-DAAB56BDB6EE}"/>
+                <a16:creationId xmlns:a16="http://schemas.microsoft.com/office/drawing/2014/main" xmlns="" id="{6270ED07-5855-EB46-9509-DAAB56BDB6EE}"/>
               </a:ext>
             </a:extLst>
           </p:cNvPr>
@@ -11858,7 +11859,7 @@
           <p:cNvPr id="15" name="CaixaDeTexto 37">
             <a:extLst>
               <a:ext uri="{FF2B5EF4-FFF2-40B4-BE49-F238E27FC236}">
-                <a16:creationId xmlns="" xmlns:a16="http://schemas.microsoft.com/office/drawing/2014/main" id="{A883361E-6275-FD48-BBBB-CC236BA50F68}"/>
+                <a16:creationId xmlns:a16="http://schemas.microsoft.com/office/drawing/2014/main" xmlns="" id="{A883361E-6275-FD48-BBBB-CC236BA50F68}"/>
               </a:ext>
             </a:extLst>
           </p:cNvPr>
@@ -11894,7 +11895,7 @@
           <p:cNvPr id="4" name="Cube 3">
             <a:extLst>
               <a:ext uri="{FF2B5EF4-FFF2-40B4-BE49-F238E27FC236}">
-                <a16:creationId xmlns="" xmlns:a16="http://schemas.microsoft.com/office/drawing/2014/main" id="{91386F85-D730-BC4D-BFB6-86BD933FCE40}"/>
+                <a16:creationId xmlns:a16="http://schemas.microsoft.com/office/drawing/2014/main" xmlns="" id="{91386F85-D730-BC4D-BFB6-86BD933FCE40}"/>
               </a:ext>
             </a:extLst>
           </p:cNvPr>
@@ -11946,7 +11947,7 @@
           <p:cNvPr id="7" name="Straight Arrow Connector 6">
             <a:extLst>
               <a:ext uri="{FF2B5EF4-FFF2-40B4-BE49-F238E27FC236}">
-                <a16:creationId xmlns="" xmlns:a16="http://schemas.microsoft.com/office/drawing/2014/main" id="{FB5C299A-1052-4746-8710-63FF6CFD409E}"/>
+                <a16:creationId xmlns:a16="http://schemas.microsoft.com/office/drawing/2014/main" xmlns="" id="{FB5C299A-1052-4746-8710-63FF6CFD409E}"/>
               </a:ext>
             </a:extLst>
           </p:cNvPr>
@@ -11992,7 +11993,7 @@
               <p:cNvPr id="16" name="TextBox 15">
                 <a:extLst>
                   <a:ext uri="{FF2B5EF4-FFF2-40B4-BE49-F238E27FC236}">
-                    <a16:creationId xmlns="" xmlns:a16="http://schemas.microsoft.com/office/drawing/2014/main" id="{ADCB2C18-6EAD-5D4A-98EB-E29D64C0FCAF}"/>
+                    <a16:creationId xmlns:a16="http://schemas.microsoft.com/office/drawing/2014/main" xmlns="" id="{ADCB2C18-6EAD-5D4A-98EB-E29D64C0FCAF}"/>
                   </a:ext>
                 </a:extLst>
               </p:cNvPr>
@@ -12105,7 +12106,7 @@
           <p:cNvPr id="25" name="Straight Arrow Connector 24">
             <a:extLst>
               <a:ext uri="{FF2B5EF4-FFF2-40B4-BE49-F238E27FC236}">
-                <a16:creationId xmlns="" xmlns:a16="http://schemas.microsoft.com/office/drawing/2014/main" id="{ED64D3D5-6A3F-5A41-83A7-36085B488607}"/>
+                <a16:creationId xmlns:a16="http://schemas.microsoft.com/office/drawing/2014/main" xmlns="" id="{ED64D3D5-6A3F-5A41-83A7-36085B488607}"/>
               </a:ext>
             </a:extLst>
           </p:cNvPr>
@@ -12151,7 +12152,7 @@
               <p:cNvPr id="27" name="TextBox 26">
                 <a:extLst>
                   <a:ext uri="{FF2B5EF4-FFF2-40B4-BE49-F238E27FC236}">
-                    <a16:creationId xmlns="" xmlns:a16="http://schemas.microsoft.com/office/drawing/2014/main" id="{85C03481-1FBF-DF4E-96C2-CDB1991F1F7B}"/>
+                    <a16:creationId xmlns:a16="http://schemas.microsoft.com/office/drawing/2014/main" xmlns="" id="{85C03481-1FBF-DF4E-96C2-CDB1991F1F7B}"/>
                   </a:ext>
                 </a:extLst>
               </p:cNvPr>
@@ -12264,7 +12265,7 @@
           <p:cNvPr id="28" name="Straight Arrow Connector 27">
             <a:extLst>
               <a:ext uri="{FF2B5EF4-FFF2-40B4-BE49-F238E27FC236}">
-                <a16:creationId xmlns="" xmlns:a16="http://schemas.microsoft.com/office/drawing/2014/main" id="{12070AFC-2402-1041-8B48-36FB0348B700}"/>
+                <a16:creationId xmlns:a16="http://schemas.microsoft.com/office/drawing/2014/main" xmlns="" id="{12070AFC-2402-1041-8B48-36FB0348B700}"/>
               </a:ext>
             </a:extLst>
           </p:cNvPr>
@@ -12310,7 +12311,7 @@
               <p:cNvPr id="36" name="TextBox 35">
                 <a:extLst>
                   <a:ext uri="{FF2B5EF4-FFF2-40B4-BE49-F238E27FC236}">
-                    <a16:creationId xmlns="" xmlns:a16="http://schemas.microsoft.com/office/drawing/2014/main" id="{5FE8FBEA-ADFF-AB40-A54A-449E780BBA65}"/>
+                    <a16:creationId xmlns:a16="http://schemas.microsoft.com/office/drawing/2014/main" xmlns="" id="{5FE8FBEA-ADFF-AB40-A54A-449E780BBA65}"/>
                   </a:ext>
                 </a:extLst>
               </p:cNvPr>
@@ -12423,7 +12424,7 @@
           <p:cNvPr id="40" name="Conector de Seta Reta 30">
             <a:extLst>
               <a:ext uri="{FF2B5EF4-FFF2-40B4-BE49-F238E27FC236}">
-                <a16:creationId xmlns="" xmlns:a16="http://schemas.microsoft.com/office/drawing/2014/main" id="{BA2E9DFA-5E42-7A45-BAAF-990ADF7EA0D3}"/>
+                <a16:creationId xmlns:a16="http://schemas.microsoft.com/office/drawing/2014/main" xmlns="" id="{BA2E9DFA-5E42-7A45-BAAF-990ADF7EA0D3}"/>
               </a:ext>
             </a:extLst>
           </p:cNvPr>
@@ -12467,7 +12468,7 @@
           <p:cNvPr id="41" name="Conector de Seta Reta 31">
             <a:extLst>
               <a:ext uri="{FF2B5EF4-FFF2-40B4-BE49-F238E27FC236}">
-                <a16:creationId xmlns="" xmlns:a16="http://schemas.microsoft.com/office/drawing/2014/main" id="{E89DE250-B42E-074A-9B4B-D32C5B21682A}"/>
+                <a16:creationId xmlns:a16="http://schemas.microsoft.com/office/drawing/2014/main" xmlns="" id="{E89DE250-B42E-074A-9B4B-D32C5B21682A}"/>
               </a:ext>
             </a:extLst>
           </p:cNvPr>
@@ -12511,7 +12512,7 @@
           <p:cNvPr id="42" name="CaixaDeTexto 37">
             <a:extLst>
               <a:ext uri="{FF2B5EF4-FFF2-40B4-BE49-F238E27FC236}">
-                <a16:creationId xmlns="" xmlns:a16="http://schemas.microsoft.com/office/drawing/2014/main" id="{EB1519E0-5286-4349-B80E-C58B3668839D}"/>
+                <a16:creationId xmlns:a16="http://schemas.microsoft.com/office/drawing/2014/main" xmlns="" id="{EB1519E0-5286-4349-B80E-C58B3668839D}"/>
               </a:ext>
             </a:extLst>
           </p:cNvPr>
@@ -12546,7 +12547,7 @@
           <p:cNvPr id="44" name="Conector de Seta Reta 31">
             <a:extLst>
               <a:ext uri="{FF2B5EF4-FFF2-40B4-BE49-F238E27FC236}">
-                <a16:creationId xmlns="" xmlns:a16="http://schemas.microsoft.com/office/drawing/2014/main" id="{498F1A6C-5107-C140-BB57-1B5DC6F026FE}"/>
+                <a16:creationId xmlns:a16="http://schemas.microsoft.com/office/drawing/2014/main" xmlns="" id="{498F1A6C-5107-C140-BB57-1B5DC6F026FE}"/>
               </a:ext>
             </a:extLst>
           </p:cNvPr>
@@ -12590,7 +12591,7 @@
           <p:cNvPr id="45" name="CaixaDeTexto 37">
             <a:extLst>
               <a:ext uri="{FF2B5EF4-FFF2-40B4-BE49-F238E27FC236}">
-                <a16:creationId xmlns="" xmlns:a16="http://schemas.microsoft.com/office/drawing/2014/main" id="{B6B0C0B4-5D95-E046-8F05-DBA56B369AC9}"/>
+                <a16:creationId xmlns:a16="http://schemas.microsoft.com/office/drawing/2014/main" xmlns="" id="{B6B0C0B4-5D95-E046-8F05-DBA56B369AC9}"/>
               </a:ext>
             </a:extLst>
           </p:cNvPr>
@@ -12626,7 +12627,7 @@
           <p:cNvPr id="37" name="Cube 36">
             <a:extLst>
               <a:ext uri="{FF2B5EF4-FFF2-40B4-BE49-F238E27FC236}">
-                <a16:creationId xmlns="" xmlns:a16="http://schemas.microsoft.com/office/drawing/2014/main" id="{678A5E09-5210-8B4F-9C6E-687A6DAE997E}"/>
+                <a16:creationId xmlns:a16="http://schemas.microsoft.com/office/drawing/2014/main" xmlns="" id="{678A5E09-5210-8B4F-9C6E-687A6DAE997E}"/>
               </a:ext>
             </a:extLst>
           </p:cNvPr>
@@ -12678,7 +12679,7 @@
           <p:cNvPr id="54" name="Straight Connector 53">
             <a:extLst>
               <a:ext uri="{FF2B5EF4-FFF2-40B4-BE49-F238E27FC236}">
-                <a16:creationId xmlns="" xmlns:a16="http://schemas.microsoft.com/office/drawing/2014/main" id="{13538F5B-109E-414B-A880-6203A7899206}"/>
+                <a16:creationId xmlns:a16="http://schemas.microsoft.com/office/drawing/2014/main" xmlns="" id="{13538F5B-109E-414B-A880-6203A7899206}"/>
               </a:ext>
             </a:extLst>
           </p:cNvPr>
@@ -12720,7 +12721,7 @@
           <p:cNvPr id="55" name="Straight Connector 54">
             <a:extLst>
               <a:ext uri="{FF2B5EF4-FFF2-40B4-BE49-F238E27FC236}">
-                <a16:creationId xmlns="" xmlns:a16="http://schemas.microsoft.com/office/drawing/2014/main" id="{57FE85EB-0365-8045-A5A8-D95E80529B6A}"/>
+                <a16:creationId xmlns:a16="http://schemas.microsoft.com/office/drawing/2014/main" xmlns="" id="{57FE85EB-0365-8045-A5A8-D95E80529B6A}"/>
               </a:ext>
             </a:extLst>
           </p:cNvPr>
@@ -12764,7 +12765,7 @@
           <p:cNvPr id="59" name="Straight Connector 58">
             <a:extLst>
               <a:ext uri="{FF2B5EF4-FFF2-40B4-BE49-F238E27FC236}">
-                <a16:creationId xmlns="" xmlns:a16="http://schemas.microsoft.com/office/drawing/2014/main" id="{4C50B42D-6F2E-F143-8613-E77625FDA0C2}"/>
+                <a16:creationId xmlns:a16="http://schemas.microsoft.com/office/drawing/2014/main" xmlns="" id="{4C50B42D-6F2E-F143-8613-E77625FDA0C2}"/>
               </a:ext>
             </a:extLst>
           </p:cNvPr>
@@ -12808,7 +12809,7 @@
           <p:cNvPr id="61" name="Straight Arrow Connector 60">
             <a:extLst>
               <a:ext uri="{FF2B5EF4-FFF2-40B4-BE49-F238E27FC236}">
-                <a16:creationId xmlns="" xmlns:a16="http://schemas.microsoft.com/office/drawing/2014/main" id="{CF4E5FA0-002E-E44C-85C4-9D2B890C8F48}"/>
+                <a16:creationId xmlns:a16="http://schemas.microsoft.com/office/drawing/2014/main" xmlns="" id="{CF4E5FA0-002E-E44C-85C4-9D2B890C8F48}"/>
               </a:ext>
             </a:extLst>
           </p:cNvPr>
@@ -12854,7 +12855,7 @@
               <p:cNvPr id="64" name="TextBox 63">
                 <a:extLst>
                   <a:ext uri="{FF2B5EF4-FFF2-40B4-BE49-F238E27FC236}">
-                    <a16:creationId xmlns="" xmlns:a16="http://schemas.microsoft.com/office/drawing/2014/main" id="{D3DDB3F6-3863-8B40-8B0C-765B50556082}"/>
+                    <a16:creationId xmlns:a16="http://schemas.microsoft.com/office/drawing/2014/main" xmlns="" id="{D3DDB3F6-3863-8B40-8B0C-765B50556082}"/>
                   </a:ext>
                 </a:extLst>
               </p:cNvPr>
@@ -13007,7 +13008,7 @@
           <p:cNvPr id="66" name="Straight Arrow Connector 65">
             <a:extLst>
               <a:ext uri="{FF2B5EF4-FFF2-40B4-BE49-F238E27FC236}">
-                <a16:creationId xmlns="" xmlns:a16="http://schemas.microsoft.com/office/drawing/2014/main" id="{754DC28D-02DE-074B-A64E-37E346FFDEAB}"/>
+                <a16:creationId xmlns:a16="http://schemas.microsoft.com/office/drawing/2014/main" xmlns="" id="{754DC28D-02DE-074B-A64E-37E346FFDEAB}"/>
               </a:ext>
             </a:extLst>
           </p:cNvPr>
@@ -13054,7 +13055,7 @@
               <p:cNvPr id="68" name="Rectangle 67">
                 <a:extLst>
                   <a:ext uri="{FF2B5EF4-FFF2-40B4-BE49-F238E27FC236}">
-                    <a16:creationId xmlns="" xmlns:a16="http://schemas.microsoft.com/office/drawing/2014/main" id="{FE8B028E-C93E-E548-AF4F-0A464D80D063}"/>
+                    <a16:creationId xmlns:a16="http://schemas.microsoft.com/office/drawing/2014/main" xmlns="" id="{FE8B028E-C93E-E548-AF4F-0A464D80D063}"/>
                   </a:ext>
                 </a:extLst>
               </p:cNvPr>
@@ -13169,7 +13170,7 @@
           <p:cNvPr id="69" name="Straight Arrow Connector 68">
             <a:extLst>
               <a:ext uri="{FF2B5EF4-FFF2-40B4-BE49-F238E27FC236}">
-                <a16:creationId xmlns="" xmlns:a16="http://schemas.microsoft.com/office/drawing/2014/main" id="{BE0D7074-2E41-6946-A7C8-8B995652278D}"/>
+                <a16:creationId xmlns:a16="http://schemas.microsoft.com/office/drawing/2014/main" xmlns="" id="{BE0D7074-2E41-6946-A7C8-8B995652278D}"/>
               </a:ext>
             </a:extLst>
           </p:cNvPr>
@@ -13215,7 +13216,7 @@
               <p:cNvPr id="71" name="Rectangle 70">
                 <a:extLst>
                   <a:ext uri="{FF2B5EF4-FFF2-40B4-BE49-F238E27FC236}">
-                    <a16:creationId xmlns="" xmlns:a16="http://schemas.microsoft.com/office/drawing/2014/main" id="{40CC5FCB-F480-2645-BAD0-61FA0E7FE5ED}"/>
+                    <a16:creationId xmlns:a16="http://schemas.microsoft.com/office/drawing/2014/main" xmlns="" id="{40CC5FCB-F480-2645-BAD0-61FA0E7FE5ED}"/>
                   </a:ext>
                 </a:extLst>
               </p:cNvPr>
@@ -13381,7 +13382,7 @@
               <p:cNvPr id="72" name="Rectangle 71">
                 <a:extLst>
                   <a:ext uri="{FF2B5EF4-FFF2-40B4-BE49-F238E27FC236}">
-                    <a16:creationId xmlns="" xmlns:a16="http://schemas.microsoft.com/office/drawing/2014/main" id="{23629297-22E7-7441-81D1-749C3AD58B54}"/>
+                    <a16:creationId xmlns:a16="http://schemas.microsoft.com/office/drawing/2014/main" xmlns="" id="{23629297-22E7-7441-81D1-749C3AD58B54}"/>
                   </a:ext>
                 </a:extLst>
               </p:cNvPr>
@@ -13493,7 +13494,7 @@
           <p:cNvPr id="73" name="Straight Arrow Connector 72">
             <a:extLst>
               <a:ext uri="{FF2B5EF4-FFF2-40B4-BE49-F238E27FC236}">
-                <a16:creationId xmlns="" xmlns:a16="http://schemas.microsoft.com/office/drawing/2014/main" id="{46F78AF6-5B3C-564C-8FAE-8D1FD83E19D9}"/>
+                <a16:creationId xmlns:a16="http://schemas.microsoft.com/office/drawing/2014/main" xmlns="" id="{46F78AF6-5B3C-564C-8FAE-8D1FD83E19D9}"/>
               </a:ext>
             </a:extLst>
           </p:cNvPr>
@@ -13538,7 +13539,7 @@
           <p:cNvPr id="74" name="Straight Arrow Connector 73">
             <a:extLst>
               <a:ext uri="{FF2B5EF4-FFF2-40B4-BE49-F238E27FC236}">
-                <a16:creationId xmlns="" xmlns:a16="http://schemas.microsoft.com/office/drawing/2014/main" id="{DE12505A-7235-6448-B5C6-FE671E3F8A22}"/>
+                <a16:creationId xmlns:a16="http://schemas.microsoft.com/office/drawing/2014/main" xmlns="" id="{DE12505A-7235-6448-B5C6-FE671E3F8A22}"/>
               </a:ext>
             </a:extLst>
           </p:cNvPr>
@@ -13584,7 +13585,7 @@
               <p:cNvPr id="75" name="TextBox 74">
                 <a:extLst>
                   <a:ext uri="{FF2B5EF4-FFF2-40B4-BE49-F238E27FC236}">
-                    <a16:creationId xmlns="" xmlns:a16="http://schemas.microsoft.com/office/drawing/2014/main" id="{71F8CD0D-BA76-8E46-9CCA-A28143CAAB39}"/>
+                    <a16:creationId xmlns:a16="http://schemas.microsoft.com/office/drawing/2014/main" xmlns="" id="{71F8CD0D-BA76-8E46-9CCA-A28143CAAB39}"/>
                   </a:ext>
                 </a:extLst>
               </p:cNvPr>
@@ -13743,7 +13744,7 @@
           <p:cNvPr id="83" name="CaixaDeTexto 37">
             <a:extLst>
               <a:ext uri="{FF2B5EF4-FFF2-40B4-BE49-F238E27FC236}">
-                <a16:creationId xmlns="" xmlns:a16="http://schemas.microsoft.com/office/drawing/2014/main" id="{82977875-7FA0-AA40-AFC9-85EBA228660F}"/>
+                <a16:creationId xmlns:a16="http://schemas.microsoft.com/office/drawing/2014/main" xmlns="" id="{82977875-7FA0-AA40-AFC9-85EBA228660F}"/>
               </a:ext>
             </a:extLst>
           </p:cNvPr>
@@ -13778,7 +13779,7 @@
           <p:cNvPr id="84" name="Straight Arrow Connector 83">
             <a:extLst>
               <a:ext uri="{FF2B5EF4-FFF2-40B4-BE49-F238E27FC236}">
-                <a16:creationId xmlns="" xmlns:a16="http://schemas.microsoft.com/office/drawing/2014/main" id="{7B2A7D30-80F5-E04E-AF2E-46549DA5001A}"/>
+                <a16:creationId xmlns:a16="http://schemas.microsoft.com/office/drawing/2014/main" xmlns="" id="{7B2A7D30-80F5-E04E-AF2E-46549DA5001A}"/>
               </a:ext>
             </a:extLst>
           </p:cNvPr>
@@ -13824,7 +13825,7 @@
               <p:cNvPr id="85" name="TextBox 84">
                 <a:extLst>
                   <a:ext uri="{FF2B5EF4-FFF2-40B4-BE49-F238E27FC236}">
-                    <a16:creationId xmlns="" xmlns:a16="http://schemas.microsoft.com/office/drawing/2014/main" id="{9EA20542-1E02-FB4B-8965-FFAFE1DDEE71}"/>
+                    <a16:creationId xmlns:a16="http://schemas.microsoft.com/office/drawing/2014/main" xmlns="" id="{9EA20542-1E02-FB4B-8965-FFAFE1DDEE71}"/>
                   </a:ext>
                 </a:extLst>
               </p:cNvPr>
@@ -13937,7 +13938,7 @@
           <p:cNvPr id="29" name="Group 28">
             <a:extLst>
               <a:ext uri="{FF2B5EF4-FFF2-40B4-BE49-F238E27FC236}">
-                <a16:creationId xmlns="" xmlns:a16="http://schemas.microsoft.com/office/drawing/2014/main" id="{3490477F-763A-4F4D-9169-63E295F28330}"/>
+                <a16:creationId xmlns:a16="http://schemas.microsoft.com/office/drawing/2014/main" xmlns="" id="{3490477F-763A-4F4D-9169-63E295F28330}"/>
               </a:ext>
             </a:extLst>
           </p:cNvPr>
@@ -13957,7 +13958,7 @@
             <p:cNvPr id="2" name="Rectangle 1">
               <a:extLst>
                 <a:ext uri="{FF2B5EF4-FFF2-40B4-BE49-F238E27FC236}">
-                  <a16:creationId xmlns="" xmlns:a16="http://schemas.microsoft.com/office/drawing/2014/main" id="{44D1A702-3EFD-7147-9604-63E809BECA89}"/>
+                  <a16:creationId xmlns:a16="http://schemas.microsoft.com/office/drawing/2014/main" xmlns="" id="{44D1A702-3EFD-7147-9604-63E809BECA89}"/>
                 </a:ext>
               </a:extLst>
             </p:cNvPr>
@@ -14014,7 +14015,7 @@
             <p:cNvPr id="3" name="Freeform 2">
               <a:extLst>
                 <a:ext uri="{FF2B5EF4-FFF2-40B4-BE49-F238E27FC236}">
-                  <a16:creationId xmlns="" xmlns:a16="http://schemas.microsoft.com/office/drawing/2014/main" id="{B8C752B6-8936-584E-9D03-0B78FBF9796E}"/>
+                  <a16:creationId xmlns:a16="http://schemas.microsoft.com/office/drawing/2014/main" xmlns="" id="{B8C752B6-8936-584E-9D03-0B78FBF9796E}"/>
                 </a:ext>
               </a:extLst>
             </p:cNvPr>
@@ -14400,7 +14401,7 @@
             <p:cNvPr id="6" name="Oval 5">
               <a:extLst>
                 <a:ext uri="{FF2B5EF4-FFF2-40B4-BE49-F238E27FC236}">
-                  <a16:creationId xmlns="" xmlns:a16="http://schemas.microsoft.com/office/drawing/2014/main" id="{957036A3-CE44-3948-9771-2A025BF838D5}"/>
+                  <a16:creationId xmlns:a16="http://schemas.microsoft.com/office/drawing/2014/main" xmlns="" id="{957036A3-CE44-3948-9771-2A025BF838D5}"/>
                 </a:ext>
               </a:extLst>
             </p:cNvPr>
@@ -14457,7 +14458,7 @@
             <p:cNvPr id="8" name="Freeform 7">
               <a:extLst>
                 <a:ext uri="{FF2B5EF4-FFF2-40B4-BE49-F238E27FC236}">
-                  <a16:creationId xmlns="" xmlns:a16="http://schemas.microsoft.com/office/drawing/2014/main" id="{B9218790-1900-2742-B907-060A7FD7EF9D}"/>
+                  <a16:creationId xmlns:a16="http://schemas.microsoft.com/office/drawing/2014/main" xmlns="" id="{B9218790-1900-2742-B907-060A7FD7EF9D}"/>
                 </a:ext>
               </a:extLst>
             </p:cNvPr>
@@ -14787,7 +14788,7 @@
             <p:cNvPr id="17" name="Freeform 16">
               <a:extLst>
                 <a:ext uri="{FF2B5EF4-FFF2-40B4-BE49-F238E27FC236}">
-                  <a16:creationId xmlns="" xmlns:a16="http://schemas.microsoft.com/office/drawing/2014/main" id="{983FDBFF-E7D3-4A4D-9B1C-35CBBDDED5F6}"/>
+                  <a16:creationId xmlns:a16="http://schemas.microsoft.com/office/drawing/2014/main" xmlns="" id="{983FDBFF-E7D3-4A4D-9B1C-35CBBDDED5F6}"/>
                 </a:ext>
               </a:extLst>
             </p:cNvPr>
@@ -15175,7 +15176,7 @@
             <p:cNvPr id="18" name="Freeform 17">
               <a:extLst>
                 <a:ext uri="{FF2B5EF4-FFF2-40B4-BE49-F238E27FC236}">
-                  <a16:creationId xmlns="" xmlns:a16="http://schemas.microsoft.com/office/drawing/2014/main" id="{351E04E1-FCD0-664D-A440-E67F5F4D328D}"/>
+                  <a16:creationId xmlns:a16="http://schemas.microsoft.com/office/drawing/2014/main" xmlns="" id="{351E04E1-FCD0-664D-A440-E67F5F4D328D}"/>
                 </a:ext>
               </a:extLst>
             </p:cNvPr>
@@ -15397,7 +15398,7 @@
             <p:cNvPr id="20" name="Freeform 19">
               <a:extLst>
                 <a:ext uri="{FF2B5EF4-FFF2-40B4-BE49-F238E27FC236}">
-                  <a16:creationId xmlns="" xmlns:a16="http://schemas.microsoft.com/office/drawing/2014/main" id="{8DC4F329-D01C-094D-ABC3-C4DA25596C37}"/>
+                  <a16:creationId xmlns:a16="http://schemas.microsoft.com/office/drawing/2014/main" xmlns="" id="{8DC4F329-D01C-094D-ABC3-C4DA25596C37}"/>
                 </a:ext>
               </a:extLst>
             </p:cNvPr>
@@ -15647,7 +15648,7 @@
             <p:cNvPr id="22" name="Freeform 21">
               <a:extLst>
                 <a:ext uri="{FF2B5EF4-FFF2-40B4-BE49-F238E27FC236}">
-                  <a16:creationId xmlns="" xmlns:a16="http://schemas.microsoft.com/office/drawing/2014/main" id="{7E04F2F1-51C6-6A47-91BE-CA28F302B4A9}"/>
+                  <a16:creationId xmlns:a16="http://schemas.microsoft.com/office/drawing/2014/main" xmlns="" id="{7E04F2F1-51C6-6A47-91BE-CA28F302B4A9}"/>
                 </a:ext>
               </a:extLst>
             </p:cNvPr>
@@ -15891,7 +15892,7 @@
             <p:cNvPr id="53" name="Freeform 52">
               <a:extLst>
                 <a:ext uri="{FF2B5EF4-FFF2-40B4-BE49-F238E27FC236}">
-                  <a16:creationId xmlns="" xmlns:a16="http://schemas.microsoft.com/office/drawing/2014/main" id="{0147C010-60C8-9843-8796-B13BD5EB5C78}"/>
+                  <a16:creationId xmlns:a16="http://schemas.microsoft.com/office/drawing/2014/main" xmlns="" id="{0147C010-60C8-9843-8796-B13BD5EB5C78}"/>
                 </a:ext>
               </a:extLst>
             </p:cNvPr>
@@ -16279,7 +16280,7 @@
             <p:cNvPr id="56" name="Freeform 55">
               <a:extLst>
                 <a:ext uri="{FF2B5EF4-FFF2-40B4-BE49-F238E27FC236}">
-                  <a16:creationId xmlns="" xmlns:a16="http://schemas.microsoft.com/office/drawing/2014/main" id="{F0095C1D-22F3-BB4B-B94A-E1418D8828E8}"/>
+                  <a16:creationId xmlns:a16="http://schemas.microsoft.com/office/drawing/2014/main" xmlns="" id="{F0095C1D-22F3-BB4B-B94A-E1418D8828E8}"/>
                 </a:ext>
               </a:extLst>
             </p:cNvPr>
@@ -16665,7 +16666,7 @@
             <p:cNvPr id="57" name="Freeform 56">
               <a:extLst>
                 <a:ext uri="{FF2B5EF4-FFF2-40B4-BE49-F238E27FC236}">
-                  <a16:creationId xmlns="" xmlns:a16="http://schemas.microsoft.com/office/drawing/2014/main" id="{47A790B9-35EB-B644-B261-B2582C621B1A}"/>
+                  <a16:creationId xmlns:a16="http://schemas.microsoft.com/office/drawing/2014/main" xmlns="" id="{47A790B9-35EB-B644-B261-B2582C621B1A}"/>
                 </a:ext>
               </a:extLst>
             </p:cNvPr>
@@ -16915,7 +16916,7 @@
             <p:cNvPr id="58" name="Freeform 57">
               <a:extLst>
                 <a:ext uri="{FF2B5EF4-FFF2-40B4-BE49-F238E27FC236}">
-                  <a16:creationId xmlns="" xmlns:a16="http://schemas.microsoft.com/office/drawing/2014/main" id="{72AB0C17-E2D7-9E4A-8F06-5AA42B43D956}"/>
+                  <a16:creationId xmlns:a16="http://schemas.microsoft.com/office/drawing/2014/main" xmlns="" id="{72AB0C17-E2D7-9E4A-8F06-5AA42B43D956}"/>
                 </a:ext>
               </a:extLst>
             </p:cNvPr>
@@ -17301,7 +17302,7 @@
             <p:cNvPr id="60" name="Freeform 59">
               <a:extLst>
                 <a:ext uri="{FF2B5EF4-FFF2-40B4-BE49-F238E27FC236}">
-                  <a16:creationId xmlns="" xmlns:a16="http://schemas.microsoft.com/office/drawing/2014/main" id="{F8FBCBA5-8772-9141-A68A-733CD1CE40F4}"/>
+                  <a16:creationId xmlns:a16="http://schemas.microsoft.com/office/drawing/2014/main" xmlns="" id="{F8FBCBA5-8772-9141-A68A-733CD1CE40F4}"/>
                 </a:ext>
               </a:extLst>
             </p:cNvPr>
@@ -17687,7 +17688,7 @@
             <p:cNvPr id="62" name="Freeform 61">
               <a:extLst>
                 <a:ext uri="{FF2B5EF4-FFF2-40B4-BE49-F238E27FC236}">
-                  <a16:creationId xmlns="" xmlns:a16="http://schemas.microsoft.com/office/drawing/2014/main" id="{81F5B2E2-D515-5449-8565-69EB2D19B507}"/>
+                  <a16:creationId xmlns:a16="http://schemas.microsoft.com/office/drawing/2014/main" xmlns="" id="{81F5B2E2-D515-5449-8565-69EB2D19B507}"/>
                 </a:ext>
               </a:extLst>
             </p:cNvPr>
@@ -17909,7 +17910,7 @@
             <p:cNvPr id="63" name="Freeform 62">
               <a:extLst>
                 <a:ext uri="{FF2B5EF4-FFF2-40B4-BE49-F238E27FC236}">
-                  <a16:creationId xmlns="" xmlns:a16="http://schemas.microsoft.com/office/drawing/2014/main" id="{86706AD3-955C-8C40-A242-3B2625A36FDC}"/>
+                  <a16:creationId xmlns:a16="http://schemas.microsoft.com/office/drawing/2014/main" xmlns="" id="{86706AD3-955C-8C40-A242-3B2625A36FDC}"/>
                 </a:ext>
               </a:extLst>
             </p:cNvPr>
@@ -18239,7 +18240,7 @@
             <p:cNvPr id="65" name="Freeform 64">
               <a:extLst>
                 <a:ext uri="{FF2B5EF4-FFF2-40B4-BE49-F238E27FC236}">
-                  <a16:creationId xmlns="" xmlns:a16="http://schemas.microsoft.com/office/drawing/2014/main" id="{392ED72B-B593-E94B-8E3A-47A57F4EFA28}"/>
+                  <a16:creationId xmlns:a16="http://schemas.microsoft.com/office/drawing/2014/main" xmlns="" id="{392ED72B-B593-E94B-8E3A-47A57F4EFA28}"/>
                 </a:ext>
               </a:extLst>
             </p:cNvPr>
@@ -18625,7 +18626,7 @@
             <p:cNvPr id="67" name="Freeform 66">
               <a:extLst>
                 <a:ext uri="{FF2B5EF4-FFF2-40B4-BE49-F238E27FC236}">
-                  <a16:creationId xmlns="" xmlns:a16="http://schemas.microsoft.com/office/drawing/2014/main" id="{863BAA95-54EC-6648-A2E4-B92D02F843F9}"/>
+                  <a16:creationId xmlns:a16="http://schemas.microsoft.com/office/drawing/2014/main" xmlns="" id="{863BAA95-54EC-6648-A2E4-B92D02F843F9}"/>
                 </a:ext>
               </a:extLst>
             </p:cNvPr>
@@ -18847,7 +18848,7 @@
             <p:cNvPr id="70" name="Straight Arrow Connector 69">
               <a:extLst>
                 <a:ext uri="{FF2B5EF4-FFF2-40B4-BE49-F238E27FC236}">
-                  <a16:creationId xmlns="" xmlns:a16="http://schemas.microsoft.com/office/drawing/2014/main" id="{37CB2550-0B63-614F-A657-CA0C3BAD55B1}"/>
+                  <a16:creationId xmlns:a16="http://schemas.microsoft.com/office/drawing/2014/main" xmlns="" id="{37CB2550-0B63-614F-A657-CA0C3BAD55B1}"/>
                 </a:ext>
               </a:extLst>
             </p:cNvPr>
@@ -18893,7 +18894,7 @@
                 <p:cNvPr id="76" name="TextBox 75">
                   <a:extLst>
                     <a:ext uri="{FF2B5EF4-FFF2-40B4-BE49-F238E27FC236}">
-                      <a16:creationId xmlns="" xmlns:a16="http://schemas.microsoft.com/office/drawing/2014/main" id="{9855CA9B-1AE1-6F48-B19D-C1DCCFD013A6}"/>
+                      <a16:creationId xmlns:a16="http://schemas.microsoft.com/office/drawing/2014/main" xmlns="" id="{9855CA9B-1AE1-6F48-B19D-C1DCCFD013A6}"/>
                     </a:ext>
                   </a:extLst>
                 </p:cNvPr>
@@ -19006,7 +19007,7 @@
             <p:cNvPr id="79" name="Straight Arrow Connector 78">
               <a:extLst>
                 <a:ext uri="{FF2B5EF4-FFF2-40B4-BE49-F238E27FC236}">
-                  <a16:creationId xmlns="" xmlns:a16="http://schemas.microsoft.com/office/drawing/2014/main" id="{55665669-207C-A24A-BA6F-7BBB58EA34B9}"/>
+                  <a16:creationId xmlns:a16="http://schemas.microsoft.com/office/drawing/2014/main" xmlns="" id="{55665669-207C-A24A-BA6F-7BBB58EA34B9}"/>
                 </a:ext>
               </a:extLst>
             </p:cNvPr>
@@ -19052,7 +19053,7 @@
                 <p:cNvPr id="80" name="TextBox 79">
                   <a:extLst>
                     <a:ext uri="{FF2B5EF4-FFF2-40B4-BE49-F238E27FC236}">
-                      <a16:creationId xmlns="" xmlns:a16="http://schemas.microsoft.com/office/drawing/2014/main" id="{34A6CB74-D772-554F-8A10-ABD6AFE1BFFE}"/>
+                      <a16:creationId xmlns:a16="http://schemas.microsoft.com/office/drawing/2014/main" xmlns="" id="{34A6CB74-D772-554F-8A10-ABD6AFE1BFFE}"/>
                     </a:ext>
                   </a:extLst>
                 </p:cNvPr>
@@ -19165,7 +19166,7 @@
             <p:cNvPr id="81" name="Straight Arrow Connector 80">
               <a:extLst>
                 <a:ext uri="{FF2B5EF4-FFF2-40B4-BE49-F238E27FC236}">
-                  <a16:creationId xmlns="" xmlns:a16="http://schemas.microsoft.com/office/drawing/2014/main" id="{FDFE2E75-8803-D645-962C-55BE74228762}"/>
+                  <a16:creationId xmlns:a16="http://schemas.microsoft.com/office/drawing/2014/main" xmlns="" id="{FDFE2E75-8803-D645-962C-55BE74228762}"/>
                 </a:ext>
               </a:extLst>
             </p:cNvPr>
@@ -19209,7 +19210,7 @@
             <p:cNvPr id="86" name="Straight Arrow Connector 85">
               <a:extLst>
                 <a:ext uri="{FF2B5EF4-FFF2-40B4-BE49-F238E27FC236}">
-                  <a16:creationId xmlns="" xmlns:a16="http://schemas.microsoft.com/office/drawing/2014/main" id="{93DD0A17-02BB-484C-A585-78064B5351E9}"/>
+                  <a16:creationId xmlns:a16="http://schemas.microsoft.com/office/drawing/2014/main" xmlns="" id="{93DD0A17-02BB-484C-A585-78064B5351E9}"/>
                 </a:ext>
               </a:extLst>
             </p:cNvPr>
@@ -19255,7 +19256,7 @@
                 <p:cNvPr id="87" name="TextBox 86">
                   <a:extLst>
                     <a:ext uri="{FF2B5EF4-FFF2-40B4-BE49-F238E27FC236}">
-                      <a16:creationId xmlns="" xmlns:a16="http://schemas.microsoft.com/office/drawing/2014/main" id="{99094E6F-4903-FA41-A682-767C00BC8280}"/>
+                      <a16:creationId xmlns:a16="http://schemas.microsoft.com/office/drawing/2014/main" xmlns="" id="{99094E6F-4903-FA41-A682-767C00BC8280}"/>
                     </a:ext>
                   </a:extLst>
                 </p:cNvPr>
@@ -19370,7 +19371,7 @@
                 <p:cNvPr id="88" name="TextBox 87">
                   <a:extLst>
                     <a:ext uri="{FF2B5EF4-FFF2-40B4-BE49-F238E27FC236}">
-                      <a16:creationId xmlns="" xmlns:a16="http://schemas.microsoft.com/office/drawing/2014/main" id="{CA81FD42-A571-FD45-A4BD-D662E0F8144C}"/>
+                      <a16:creationId xmlns:a16="http://schemas.microsoft.com/office/drawing/2014/main" xmlns="" id="{CA81FD42-A571-FD45-A4BD-D662E0F8144C}"/>
                     </a:ext>
                   </a:extLst>
                 </p:cNvPr>
@@ -19514,7 +19515,7 @@
           <p:cNvPr id="4" name="Picture 3">
             <a:extLst>
               <a:ext uri="{FF2B5EF4-FFF2-40B4-BE49-F238E27FC236}">
-                <a16:creationId xmlns="" xmlns:a16="http://schemas.microsoft.com/office/drawing/2014/main" id="{1F46FB23-65FB-9049-9C50-43B5B6AD9EA8}"/>
+                <a16:creationId xmlns:a16="http://schemas.microsoft.com/office/drawing/2014/main" xmlns="" id="{1F46FB23-65FB-9049-9C50-43B5B6AD9EA8}"/>
               </a:ext>
             </a:extLst>
           </p:cNvPr>
@@ -19544,7 +19545,7 @@
           <p:cNvPr id="6" name="Straight Connector 5">
             <a:extLst>
               <a:ext uri="{FF2B5EF4-FFF2-40B4-BE49-F238E27FC236}">
-                <a16:creationId xmlns="" xmlns:a16="http://schemas.microsoft.com/office/drawing/2014/main" id="{3E621B72-9657-FE4E-9C41-001E2A069FE3}"/>
+                <a16:creationId xmlns:a16="http://schemas.microsoft.com/office/drawing/2014/main" xmlns="" id="{3E621B72-9657-FE4E-9C41-001E2A069FE3}"/>
               </a:ext>
             </a:extLst>
           </p:cNvPr>
@@ -21111,8 +21112,8 @@
             </a:p>
           </p:txBody>
         </p:sp>
-        <mc:AlternateContent xmlns:mc="http://schemas.openxmlformats.org/markup-compatibility/2006">
-          <mc:Choice xmlns:a14="http://schemas.microsoft.com/office/drawing/2010/main" Requires="a14">
+        <mc:AlternateContent xmlns:mc="http://schemas.openxmlformats.org/markup-compatibility/2006" xmlns:a14="http://schemas.microsoft.com/office/drawing/2010/main">
+          <mc:Choice Requires="a14">
             <p:sp>
               <p:nvSpPr>
                 <p:cNvPr id="71" name="CaixaDeTexto 70"/>
@@ -21303,7 +21304,7 @@
               </p:txBody>
             </p:sp>
           </mc:Choice>
-          <mc:Fallback>
+          <mc:Fallback xmlns="">
             <p:sp>
               <p:nvSpPr>
                 <p:cNvPr id="71" name="CaixaDeTexto 70"/>
@@ -21587,8 +21588,8 @@
             </a:fontRef>
           </p:style>
         </p:cxnSp>
-        <mc:AlternateContent xmlns:mc="http://schemas.openxmlformats.org/markup-compatibility/2006">
-          <mc:Choice xmlns:a14="http://schemas.microsoft.com/office/drawing/2010/main" Requires="a14">
+        <mc:AlternateContent xmlns:mc="http://schemas.openxmlformats.org/markup-compatibility/2006" xmlns:a14="http://schemas.microsoft.com/office/drawing/2010/main">
+          <mc:Choice Requires="a14">
             <p:sp>
               <p:nvSpPr>
                 <p:cNvPr id="79" name="CaixaDeTexto 78"/>
@@ -21779,7 +21780,7 @@
               </p:txBody>
             </p:sp>
           </mc:Choice>
-          <mc:Fallback>
+          <mc:Fallback xmlns="">
             <p:sp>
               <p:nvSpPr>
                 <p:cNvPr id="79" name="CaixaDeTexto 78"/>
@@ -21818,8 +21819,8 @@
             </p:sp>
           </mc:Fallback>
         </mc:AlternateContent>
-        <mc:AlternateContent xmlns:mc="http://schemas.openxmlformats.org/markup-compatibility/2006">
-          <mc:Choice xmlns:a14="http://schemas.microsoft.com/office/drawing/2010/main" Requires="a14">
+        <mc:AlternateContent xmlns:mc="http://schemas.openxmlformats.org/markup-compatibility/2006" xmlns:a14="http://schemas.microsoft.com/office/drawing/2010/main">
+          <mc:Choice Requires="a14">
             <p:sp>
               <p:nvSpPr>
                 <p:cNvPr id="80" name="CaixaDeTexto 79"/>
@@ -22010,7 +22011,7 @@
               </p:txBody>
             </p:sp>
           </mc:Choice>
-          <mc:Fallback>
+          <mc:Fallback xmlns="">
             <p:sp>
               <p:nvSpPr>
                 <p:cNvPr id="80" name="CaixaDeTexto 79"/>
@@ -22049,8 +22050,8 @@
             </p:sp>
           </mc:Fallback>
         </mc:AlternateContent>
-        <mc:AlternateContent xmlns:mc="http://schemas.openxmlformats.org/markup-compatibility/2006">
-          <mc:Choice xmlns:a14="http://schemas.microsoft.com/office/drawing/2010/main" Requires="a14">
+        <mc:AlternateContent xmlns:mc="http://schemas.openxmlformats.org/markup-compatibility/2006" xmlns:a14="http://schemas.microsoft.com/office/drawing/2010/main">
+          <mc:Choice Requires="a14">
             <p:sp>
               <p:nvSpPr>
                 <p:cNvPr id="81" name="CaixaDeTexto 80"/>
@@ -22241,7 +22242,7 @@
               </p:txBody>
             </p:sp>
           </mc:Choice>
-          <mc:Fallback>
+          <mc:Fallback xmlns="">
             <p:sp>
               <p:nvSpPr>
                 <p:cNvPr id="81" name="CaixaDeTexto 80"/>
@@ -22715,6 +22716,675 @@
 </file>
 
 <file path=ppt/slides/slide7.xml><?xml version="1.0" encoding="utf-8"?>
+<p:sld xmlns:a="http://schemas.openxmlformats.org/drawingml/2006/main" xmlns:r="http://schemas.openxmlformats.org/officeDocument/2006/relationships" xmlns:p="http://schemas.openxmlformats.org/presentationml/2006/main">
+  <p:cSld>
+    <p:spTree>
+      <p:nvGrpSpPr>
+        <p:cNvPr id="1" name=""/>
+        <p:cNvGrpSpPr/>
+        <p:nvPr/>
+      </p:nvGrpSpPr>
+      <p:grpSpPr>
+        <a:xfrm>
+          <a:off x="0" y="0"/>
+          <a:ext cx="0" cy="0"/>
+          <a:chOff x="0" y="0"/>
+          <a:chExt cx="0" cy="0"/>
+        </a:xfrm>
+      </p:grpSpPr>
+      <p:pic>
+        <p:nvPicPr>
+          <p:cNvPr id="4" name="Imagem 3"/>
+          <p:cNvPicPr>
+            <a:picLocks noChangeAspect="1"/>
+          </p:cNvPicPr>
+          <p:nvPr/>
+        </p:nvPicPr>
+        <p:blipFill rotWithShape="1">
+          <a:blip r:embed="rId2">
+            <a:extLst>
+              <a:ext uri="{28A0092B-C50C-407E-A947-70E740481C1C}">
+                <a14:useLocalDpi xmlns:a14="http://schemas.microsoft.com/office/drawing/2010/main" val="0"/>
+              </a:ext>
+            </a:extLst>
+          </a:blip>
+          <a:srcRect l="14560" t="14029" r="11932" b="13043"/>
+          <a:stretch/>
+        </p:blipFill>
+        <p:spPr>
+          <a:xfrm>
+            <a:off x="2218415" y="381663"/>
+            <a:ext cx="5041127" cy="5001372"/>
+          </a:xfrm>
+          <a:prstGeom prst="rect">
+            <a:avLst/>
+          </a:prstGeom>
+        </p:spPr>
+      </p:pic>
+      <p:cxnSp>
+        <p:nvCxnSpPr>
+          <p:cNvPr id="6" name="Conector de seta reta 5"/>
+          <p:cNvCxnSpPr/>
+          <p:nvPr/>
+        </p:nvCxnSpPr>
+        <p:spPr>
+          <a:xfrm>
+            <a:off x="2289976" y="5478449"/>
+            <a:ext cx="2449002" cy="0"/>
+          </a:xfrm>
+          <a:prstGeom prst="straightConnector1">
+            <a:avLst/>
+          </a:prstGeom>
+          <a:ln>
+            <a:solidFill>
+              <a:schemeClr val="tx1"/>
+            </a:solidFill>
+            <a:headEnd type="triangle"/>
+            <a:tailEnd type="triangle"/>
+          </a:ln>
+        </p:spPr>
+        <p:style>
+          <a:lnRef idx="1">
+            <a:schemeClr val="accent1"/>
+          </a:lnRef>
+          <a:fillRef idx="0">
+            <a:schemeClr val="accent1"/>
+          </a:fillRef>
+          <a:effectRef idx="0">
+            <a:schemeClr val="accent1"/>
+          </a:effectRef>
+          <a:fontRef idx="minor">
+            <a:schemeClr val="tx1"/>
+          </a:fontRef>
+        </p:style>
+      </p:cxnSp>
+      <p:cxnSp>
+        <p:nvCxnSpPr>
+          <p:cNvPr id="15" name="Conector de seta reta 14"/>
+          <p:cNvCxnSpPr/>
+          <p:nvPr/>
+        </p:nvCxnSpPr>
+        <p:spPr>
+          <a:xfrm>
+            <a:off x="2107096" y="2882349"/>
+            <a:ext cx="0" cy="2421171"/>
+          </a:xfrm>
+          <a:prstGeom prst="straightConnector1">
+            <a:avLst/>
+          </a:prstGeom>
+          <a:ln>
+            <a:solidFill>
+              <a:schemeClr val="tx1"/>
+            </a:solidFill>
+            <a:headEnd type="triangle"/>
+            <a:tailEnd type="triangle"/>
+          </a:ln>
+        </p:spPr>
+        <p:style>
+          <a:lnRef idx="1">
+            <a:schemeClr val="accent1"/>
+          </a:lnRef>
+          <a:fillRef idx="0">
+            <a:schemeClr val="accent1"/>
+          </a:fillRef>
+          <a:effectRef idx="0">
+            <a:schemeClr val="accent1"/>
+          </a:effectRef>
+          <a:fontRef idx="minor">
+            <a:schemeClr val="tx1"/>
+          </a:fontRef>
+        </p:style>
+      </p:cxnSp>
+      <p:cxnSp>
+        <p:nvCxnSpPr>
+          <p:cNvPr id="18" name="Conector de seta reta 17"/>
+          <p:cNvCxnSpPr/>
+          <p:nvPr/>
+        </p:nvCxnSpPr>
+        <p:spPr>
+          <a:xfrm>
+            <a:off x="2289976" y="5805778"/>
+            <a:ext cx="4913906" cy="0"/>
+          </a:xfrm>
+          <a:prstGeom prst="straightConnector1">
+            <a:avLst/>
+          </a:prstGeom>
+          <a:ln>
+            <a:solidFill>
+              <a:schemeClr val="tx1"/>
+            </a:solidFill>
+            <a:headEnd type="triangle"/>
+            <a:tailEnd type="triangle"/>
+          </a:ln>
+        </p:spPr>
+        <p:style>
+          <a:lnRef idx="1">
+            <a:schemeClr val="accent1"/>
+          </a:lnRef>
+          <a:fillRef idx="0">
+            <a:schemeClr val="accent1"/>
+          </a:fillRef>
+          <a:effectRef idx="0">
+            <a:schemeClr val="accent1"/>
+          </a:effectRef>
+          <a:fontRef idx="minor">
+            <a:schemeClr val="tx1"/>
+          </a:fontRef>
+        </p:style>
+      </p:cxnSp>
+      <p:cxnSp>
+        <p:nvCxnSpPr>
+          <p:cNvPr id="23" name="Conector de seta reta 22"/>
+          <p:cNvCxnSpPr/>
+          <p:nvPr/>
+        </p:nvCxnSpPr>
+        <p:spPr>
+          <a:xfrm>
+            <a:off x="1702906" y="485031"/>
+            <a:ext cx="0" cy="4818489"/>
+          </a:xfrm>
+          <a:prstGeom prst="straightConnector1">
+            <a:avLst/>
+          </a:prstGeom>
+          <a:ln>
+            <a:solidFill>
+              <a:schemeClr val="tx1"/>
+            </a:solidFill>
+            <a:headEnd type="triangle"/>
+            <a:tailEnd type="triangle"/>
+          </a:ln>
+        </p:spPr>
+        <p:style>
+          <a:lnRef idx="1">
+            <a:schemeClr val="accent1"/>
+          </a:lnRef>
+          <a:fillRef idx="0">
+            <a:schemeClr val="accent1"/>
+          </a:fillRef>
+          <a:effectRef idx="0">
+            <a:schemeClr val="accent1"/>
+          </a:effectRef>
+          <a:fontRef idx="minor">
+            <a:schemeClr val="tx1"/>
+          </a:fontRef>
+        </p:style>
+      </p:cxnSp>
+      <mc:AlternateContent xmlns:mc="http://schemas.openxmlformats.org/markup-compatibility/2006">
+        <mc:Choice xmlns:a14="http://schemas.microsoft.com/office/drawing/2010/main" Requires="a14">
+          <p:sp>
+            <p:nvSpPr>
+              <p:cNvPr id="25" name="CaixaDeTexto 24"/>
+              <p:cNvSpPr txBox="1"/>
+              <p:nvPr/>
+            </p:nvSpPr>
+            <p:spPr>
+              <a:xfrm>
+                <a:off x="4559826" y="5836851"/>
+                <a:ext cx="374205" cy="313484"/>
+              </a:xfrm>
+              <a:prstGeom prst="rect">
+                <a:avLst/>
+              </a:prstGeom>
+              <a:noFill/>
+            </p:spPr>
+            <p:txBody>
+              <a:bodyPr wrap="none" lIns="0" tIns="0" rIns="0" bIns="0" rtlCol="0">
+                <a:spAutoFit/>
+              </a:bodyPr>
+              <a:lstStyle/>
+              <a:p>
+                <a14:m>
+                  <m:oMathPara xmlns:m="http://schemas.openxmlformats.org/officeDocument/2006/math">
+                    <m:oMathParaPr>
+                      <m:jc m:val="centerGroup"/>
+                    </m:oMathParaPr>
+                    <m:oMath xmlns:m="http://schemas.openxmlformats.org/officeDocument/2006/math">
+                      <m:sSubSup>
+                        <m:sSubSupPr>
+                          <m:ctrlPr>
+                            <a:rPr lang="pt-BR" b="0" i="1" smtClean="0">
+                              <a:latin typeface="Cambria Math" panose="02040503050406030204" pitchFamily="18" charset="0"/>
+                            </a:rPr>
+                          </m:ctrlPr>
+                        </m:sSubSupPr>
+                        <m:e>
+                          <m:r>
+                            <a:rPr lang="pt-BR" b="0" i="1" smtClean="0">
+                              <a:latin typeface="Cambria Math" panose="02040503050406030204" pitchFamily="18" charset="0"/>
+                            </a:rPr>
+                            <m:t>𝑛</m:t>
+                          </m:r>
+                        </m:e>
+                        <m:sub>
+                          <m:sSub>
+                            <m:sSubPr>
+                              <m:ctrlPr>
+                                <a:rPr lang="pt-BR" b="0" i="1" smtClean="0">
+                                  <a:latin typeface="Cambria Math" panose="02040503050406030204" pitchFamily="18" charset="0"/>
+                                </a:rPr>
+                              </m:ctrlPr>
+                            </m:sSubPr>
+                            <m:e>
+                              <m:r>
+                                <a:rPr lang="pt-BR" b="0" i="1" smtClean="0">
+                                  <a:latin typeface="Cambria Math" panose="02040503050406030204" pitchFamily="18" charset="0"/>
+                                </a:rPr>
+                                <m:t>𝑒</m:t>
+                              </m:r>
+                            </m:e>
+                            <m:sub>
+                              <m:r>
+                                <a:rPr lang="pt-BR" b="0" i="1" smtClean="0">
+                                  <a:latin typeface="Cambria Math" panose="02040503050406030204" pitchFamily="18" charset="0"/>
+                                </a:rPr>
+                                <m:t>𝑥</m:t>
+                              </m:r>
+                            </m:sub>
+                          </m:sSub>
+                        </m:sub>
+                        <m:sup>
+                          <m:r>
+                            <a:rPr lang="pt-BR" b="0" i="1" smtClean="0">
+                              <a:latin typeface="Cambria Math" panose="02040503050406030204" pitchFamily="18" charset="0"/>
+                            </a:rPr>
+                            <m:t>h</m:t>
+                          </m:r>
+                        </m:sup>
+                      </m:sSubSup>
+                    </m:oMath>
+                  </m:oMathPara>
+                </a14:m>
+                <a:endParaRPr lang="pt-BR" dirty="0"/>
+              </a:p>
+            </p:txBody>
+          </p:sp>
+        </mc:Choice>
+        <mc:Fallback>
+          <p:sp>
+            <p:nvSpPr>
+              <p:cNvPr id="25" name="CaixaDeTexto 24"/>
+              <p:cNvSpPr txBox="1">
+                <a:spLocks noRot="1" noChangeAspect="1" noMove="1" noResize="1" noEditPoints="1" noAdjustHandles="1" noChangeArrowheads="1" noChangeShapeType="1" noTextEdit="1"/>
+              </p:cNvSpPr>
+              <p:nvPr/>
+            </p:nvSpPr>
+            <p:spPr>
+              <a:xfrm>
+                <a:off x="4559826" y="5836851"/>
+                <a:ext cx="374205" cy="313484"/>
+              </a:xfrm>
+              <a:prstGeom prst="rect">
+                <a:avLst/>
+              </a:prstGeom>
+              <a:blipFill rotWithShape="0">
+                <a:blip r:embed="rId3"/>
+                <a:stretch>
+                  <a:fillRect l="-8197" t="-1923" r="-1639" b="-11538"/>
+                </a:stretch>
+              </a:blipFill>
+            </p:spPr>
+            <p:txBody>
+              <a:bodyPr/>
+              <a:lstStyle/>
+              <a:p>
+                <a:r>
+                  <a:rPr lang="pt-BR">
+                    <a:noFill/>
+                  </a:rPr>
+                  <a:t> </a:t>
+                </a:r>
+              </a:p>
+            </p:txBody>
+          </p:sp>
+        </mc:Fallback>
+      </mc:AlternateContent>
+      <mc:AlternateContent xmlns:mc="http://schemas.openxmlformats.org/markup-compatibility/2006">
+        <mc:Choice xmlns:a14="http://schemas.microsoft.com/office/drawing/2010/main" Requires="a14">
+          <p:sp>
+            <p:nvSpPr>
+              <p:cNvPr id="26" name="CaixaDeTexto 25"/>
+              <p:cNvSpPr txBox="1"/>
+              <p:nvPr/>
+            </p:nvSpPr>
+            <p:spPr>
+              <a:xfrm>
+                <a:off x="1187398" y="2737533"/>
+                <a:ext cx="380617" cy="341312"/>
+              </a:xfrm>
+              <a:prstGeom prst="rect">
+                <a:avLst/>
+              </a:prstGeom>
+              <a:noFill/>
+            </p:spPr>
+            <p:txBody>
+              <a:bodyPr wrap="none" lIns="0" tIns="0" rIns="0" bIns="0" rtlCol="0">
+                <a:spAutoFit/>
+              </a:bodyPr>
+              <a:lstStyle/>
+              <a:p>
+                <a14:m>
+                  <m:oMathPara xmlns:m="http://schemas.openxmlformats.org/officeDocument/2006/math">
+                    <m:oMathParaPr>
+                      <m:jc m:val="centerGroup"/>
+                    </m:oMathParaPr>
+                    <m:oMath xmlns:m="http://schemas.openxmlformats.org/officeDocument/2006/math">
+                      <m:sSubSup>
+                        <m:sSubSupPr>
+                          <m:ctrlPr>
+                            <a:rPr lang="pt-BR" b="0" i="1" smtClean="0">
+                              <a:latin typeface="Cambria Math" panose="02040503050406030204" pitchFamily="18" charset="0"/>
+                            </a:rPr>
+                          </m:ctrlPr>
+                        </m:sSubSupPr>
+                        <m:e>
+                          <m:r>
+                            <a:rPr lang="pt-BR" b="0" i="1" smtClean="0">
+                              <a:latin typeface="Cambria Math" panose="02040503050406030204" pitchFamily="18" charset="0"/>
+                            </a:rPr>
+                            <m:t>𝑛</m:t>
+                          </m:r>
+                        </m:e>
+                        <m:sub>
+                          <m:sSub>
+                            <m:sSubPr>
+                              <m:ctrlPr>
+                                <a:rPr lang="pt-BR" b="0" i="1" smtClean="0">
+                                  <a:latin typeface="Cambria Math" panose="02040503050406030204" pitchFamily="18" charset="0"/>
+                                </a:rPr>
+                              </m:ctrlPr>
+                            </m:sSubPr>
+                            <m:e>
+                              <m:r>
+                                <a:rPr lang="pt-BR" b="0" i="1" smtClean="0">
+                                  <a:latin typeface="Cambria Math" panose="02040503050406030204" pitchFamily="18" charset="0"/>
+                                </a:rPr>
+                                <m:t>𝑒</m:t>
+                              </m:r>
+                            </m:e>
+                            <m:sub>
+                              <m:r>
+                                <a:rPr lang="pt-BR" b="0" i="1" smtClean="0">
+                                  <a:latin typeface="Cambria Math" panose="02040503050406030204" pitchFamily="18" charset="0"/>
+                                </a:rPr>
+                                <m:t>𝑦</m:t>
+                              </m:r>
+                            </m:sub>
+                          </m:sSub>
+                        </m:sub>
+                        <m:sup>
+                          <m:r>
+                            <a:rPr lang="pt-BR" b="0" i="1" smtClean="0">
+                              <a:latin typeface="Cambria Math" panose="02040503050406030204" pitchFamily="18" charset="0"/>
+                            </a:rPr>
+                            <m:t>h</m:t>
+                          </m:r>
+                        </m:sup>
+                      </m:sSubSup>
+                    </m:oMath>
+                  </m:oMathPara>
+                </a14:m>
+                <a:endParaRPr lang="pt-BR" dirty="0"/>
+              </a:p>
+            </p:txBody>
+          </p:sp>
+        </mc:Choice>
+        <mc:Fallback>
+          <p:sp>
+            <p:nvSpPr>
+              <p:cNvPr id="26" name="CaixaDeTexto 25"/>
+              <p:cNvSpPr txBox="1">
+                <a:spLocks noRot="1" noChangeAspect="1" noMove="1" noResize="1" noEditPoints="1" noAdjustHandles="1" noChangeArrowheads="1" noChangeShapeType="1" noTextEdit="1"/>
+              </p:cNvSpPr>
+              <p:nvPr/>
+            </p:nvSpPr>
+            <p:spPr>
+              <a:xfrm>
+                <a:off x="1187398" y="2737533"/>
+                <a:ext cx="380617" cy="341312"/>
+              </a:xfrm>
+              <a:prstGeom prst="rect">
+                <a:avLst/>
+              </a:prstGeom>
+              <a:blipFill rotWithShape="0">
+                <a:blip r:embed="rId4"/>
+                <a:stretch>
+                  <a:fillRect l="-8065" t="-1786" r="-4839" b="-16071"/>
+                </a:stretch>
+              </a:blipFill>
+            </p:spPr>
+            <p:txBody>
+              <a:bodyPr/>
+              <a:lstStyle/>
+              <a:p>
+                <a:r>
+                  <a:rPr lang="pt-BR">
+                    <a:noFill/>
+                  </a:rPr>
+                  <a:t> </a:t>
+                </a:r>
+              </a:p>
+            </p:txBody>
+          </p:sp>
+        </mc:Fallback>
+      </mc:AlternateContent>
+      <mc:AlternateContent xmlns:mc="http://schemas.openxmlformats.org/markup-compatibility/2006">
+        <mc:Choice xmlns:a14="http://schemas.microsoft.com/office/drawing/2010/main" Requires="a14">
+          <p:sp>
+            <p:nvSpPr>
+              <p:cNvPr id="27" name="CaixaDeTexto 26"/>
+              <p:cNvSpPr txBox="1"/>
+              <p:nvPr/>
+            </p:nvSpPr>
+            <p:spPr>
+              <a:xfrm>
+                <a:off x="3371040" y="5455907"/>
+                <a:ext cx="286873" cy="276999"/>
+              </a:xfrm>
+              <a:prstGeom prst="rect">
+                <a:avLst/>
+              </a:prstGeom>
+              <a:noFill/>
+            </p:spPr>
+            <p:txBody>
+              <a:bodyPr wrap="none" lIns="0" tIns="0" rIns="0" bIns="0" rtlCol="0">
+                <a:spAutoFit/>
+              </a:bodyPr>
+              <a:lstStyle/>
+              <a:p>
+                <a14:m>
+                  <m:oMathPara xmlns:m="http://schemas.openxmlformats.org/officeDocument/2006/math">
+                    <m:oMathParaPr>
+                      <m:jc m:val="centerGroup"/>
+                    </m:oMathParaPr>
+                    <m:oMath xmlns:m="http://schemas.openxmlformats.org/officeDocument/2006/math">
+                      <m:sSub>
+                        <m:sSubPr>
+                          <m:ctrlPr>
+                            <a:rPr lang="pt-BR" b="0" i="1" smtClean="0">
+                              <a:latin typeface="Cambria Math" panose="02040503050406030204" pitchFamily="18" charset="0"/>
+                            </a:rPr>
+                          </m:ctrlPr>
+                        </m:sSubPr>
+                        <m:e>
+                          <m:r>
+                            <a:rPr lang="pt-BR" b="0" i="1" smtClean="0">
+                              <a:latin typeface="Cambria Math" panose="02040503050406030204" pitchFamily="18" charset="0"/>
+                            </a:rPr>
+                            <m:t>𝑞</m:t>
+                          </m:r>
+                        </m:e>
+                        <m:sub>
+                          <m:r>
+                            <a:rPr lang="pt-BR" b="0" i="1" smtClean="0">
+                              <a:latin typeface="Cambria Math" panose="02040503050406030204" pitchFamily="18" charset="0"/>
+                            </a:rPr>
+                            <m:t>𝑥</m:t>
+                          </m:r>
+                        </m:sub>
+                      </m:sSub>
+                    </m:oMath>
+                  </m:oMathPara>
+                </a14:m>
+                <a:endParaRPr lang="pt-BR" dirty="0"/>
+              </a:p>
+            </p:txBody>
+          </p:sp>
+        </mc:Choice>
+        <mc:Fallback>
+          <p:sp>
+            <p:nvSpPr>
+              <p:cNvPr id="27" name="CaixaDeTexto 26"/>
+              <p:cNvSpPr txBox="1">
+                <a:spLocks noRot="1" noChangeAspect="1" noMove="1" noResize="1" noEditPoints="1" noAdjustHandles="1" noChangeArrowheads="1" noChangeShapeType="1" noTextEdit="1"/>
+              </p:cNvSpPr>
+              <p:nvPr/>
+            </p:nvSpPr>
+            <p:spPr>
+              <a:xfrm>
+                <a:off x="3371040" y="5455907"/>
+                <a:ext cx="286873" cy="276999"/>
+              </a:xfrm>
+              <a:prstGeom prst="rect">
+                <a:avLst/>
+              </a:prstGeom>
+              <a:blipFill rotWithShape="0">
+                <a:blip r:embed="rId5"/>
+                <a:stretch>
+                  <a:fillRect l="-21277" b="-26667"/>
+                </a:stretch>
+              </a:blipFill>
+            </p:spPr>
+            <p:txBody>
+              <a:bodyPr/>
+              <a:lstStyle/>
+              <a:p>
+                <a:r>
+                  <a:rPr lang="pt-BR">
+                    <a:noFill/>
+                  </a:rPr>
+                  <a:t> </a:t>
+                </a:r>
+              </a:p>
+            </p:txBody>
+          </p:sp>
+        </mc:Fallback>
+      </mc:AlternateContent>
+      <mc:AlternateContent xmlns:mc="http://schemas.openxmlformats.org/markup-compatibility/2006">
+        <mc:Choice xmlns:a14="http://schemas.microsoft.com/office/drawing/2010/main" Requires="a14">
+          <p:sp>
+            <p:nvSpPr>
+              <p:cNvPr id="28" name="CaixaDeTexto 27"/>
+              <p:cNvSpPr txBox="1"/>
+              <p:nvPr/>
+            </p:nvSpPr>
+            <p:spPr>
+              <a:xfrm>
+                <a:off x="1820223" y="3954434"/>
+                <a:ext cx="294504" cy="298928"/>
+              </a:xfrm>
+              <a:prstGeom prst="rect">
+                <a:avLst/>
+              </a:prstGeom>
+              <a:noFill/>
+            </p:spPr>
+            <p:txBody>
+              <a:bodyPr wrap="none" lIns="0" tIns="0" rIns="0" bIns="0" rtlCol="0">
+                <a:spAutoFit/>
+              </a:bodyPr>
+              <a:lstStyle/>
+              <a:p>
+                <a14:m>
+                  <m:oMathPara xmlns:m="http://schemas.openxmlformats.org/officeDocument/2006/math">
+                    <m:oMathParaPr>
+                      <m:jc m:val="centerGroup"/>
+                    </m:oMathParaPr>
+                    <m:oMath xmlns:m="http://schemas.openxmlformats.org/officeDocument/2006/math">
+                      <m:sSub>
+                        <m:sSubPr>
+                          <m:ctrlPr>
+                            <a:rPr lang="pt-BR" b="0" i="1" smtClean="0">
+                              <a:latin typeface="Cambria Math" panose="02040503050406030204" pitchFamily="18" charset="0"/>
+                            </a:rPr>
+                          </m:ctrlPr>
+                        </m:sSubPr>
+                        <m:e>
+                          <m:r>
+                            <a:rPr lang="pt-BR" b="0" i="1" smtClean="0">
+                              <a:latin typeface="Cambria Math" panose="02040503050406030204" pitchFamily="18" charset="0"/>
+                            </a:rPr>
+                            <m:t>𝑞</m:t>
+                          </m:r>
+                        </m:e>
+                        <m:sub>
+                          <m:r>
+                            <a:rPr lang="pt-BR" b="0" i="1" smtClean="0">
+                              <a:latin typeface="Cambria Math" panose="02040503050406030204" pitchFamily="18" charset="0"/>
+                            </a:rPr>
+                            <m:t>𝑦</m:t>
+                          </m:r>
+                        </m:sub>
+                      </m:sSub>
+                    </m:oMath>
+                  </m:oMathPara>
+                </a14:m>
+                <a:endParaRPr lang="pt-BR" dirty="0"/>
+              </a:p>
+            </p:txBody>
+          </p:sp>
+        </mc:Choice>
+        <mc:Fallback>
+          <p:sp>
+            <p:nvSpPr>
+              <p:cNvPr id="28" name="CaixaDeTexto 27"/>
+              <p:cNvSpPr txBox="1">
+                <a:spLocks noRot="1" noChangeAspect="1" noMove="1" noResize="1" noEditPoints="1" noAdjustHandles="1" noChangeArrowheads="1" noChangeShapeType="1" noTextEdit="1"/>
+              </p:cNvSpPr>
+              <p:nvPr/>
+            </p:nvSpPr>
+            <p:spPr>
+              <a:xfrm>
+                <a:off x="1820223" y="3954434"/>
+                <a:ext cx="294504" cy="298928"/>
+              </a:xfrm>
+              <a:prstGeom prst="rect">
+                <a:avLst/>
+              </a:prstGeom>
+              <a:blipFill rotWithShape="0">
+                <a:blip r:embed="rId6"/>
+                <a:stretch>
+                  <a:fillRect l="-20833" r="-6250" b="-20408"/>
+                </a:stretch>
+              </a:blipFill>
+            </p:spPr>
+            <p:txBody>
+              <a:bodyPr/>
+              <a:lstStyle/>
+              <a:p>
+                <a:r>
+                  <a:rPr lang="pt-BR">
+                    <a:noFill/>
+                  </a:rPr>
+                  <a:t> </a:t>
+                </a:r>
+              </a:p>
+            </p:txBody>
+          </p:sp>
+        </mc:Fallback>
+      </mc:AlternateContent>
+    </p:spTree>
+    <p:extLst>
+      <p:ext uri="{BB962C8B-B14F-4D97-AF65-F5344CB8AC3E}">
+        <p14:creationId xmlns:p14="http://schemas.microsoft.com/office/powerpoint/2010/main" val="832048981"/>
+      </p:ext>
+    </p:extLst>
+  </p:cSld>
+  <p:clrMapOvr>
+    <a:masterClrMapping/>
+  </p:clrMapOvr>
+</p:sld>
+</file>
+
+<file path=ppt/slides/slide8.xml><?xml version="1.0" encoding="utf-8"?>
 <p:sld xmlns:a="http://schemas.openxmlformats.org/drawingml/2006/main" xmlns:r="http://schemas.openxmlformats.org/officeDocument/2006/relationships" xmlns:p="http://schemas.openxmlformats.org/presentationml/2006/main">
   <p:cSld>
     <p:spTree>
@@ -24406,7 +25076,7 @@
 </p:sld>
 </file>
 
-<file path=ppt/slides/slide8.xml><?xml version="1.0" encoding="utf-8"?>
+<file path=ppt/slides/slide9.xml><?xml version="1.0" encoding="utf-8"?>
 <p:sld xmlns:a="http://schemas.openxmlformats.org/drawingml/2006/main" xmlns:r="http://schemas.openxmlformats.org/officeDocument/2006/relationships" xmlns:p="http://schemas.openxmlformats.org/presentationml/2006/main">
   <p:cSld>
     <p:spTree>

</xml_diff>

<commit_message>
Adicionando figuras de dúvidas e atualizando as figuras com os comentários do Mariano.
</commit_message>
<xml_diff>
--- a/Outros/MestradoFiguras.pptx
+++ b/Outros/MestradoFiguras.pptx
@@ -249,7 +249,7 @@
           <a:p>
             <a:fld id="{FD4AC941-A4D7-4DAA-81C3-DA9EA35F0F68}" type="datetimeFigureOut">
               <a:rPr lang="pt-BR" smtClean="0"/>
-              <a:t>08/03/2019</a:t>
+              <a:t>18/03/2019</a:t>
             </a:fld>
             <a:endParaRPr lang="pt-BR"/>
           </a:p>
@@ -417,7 +417,7 @@
           <a:p>
             <a:fld id="{FD4AC941-A4D7-4DAA-81C3-DA9EA35F0F68}" type="datetimeFigureOut">
               <a:rPr lang="pt-BR" smtClean="0"/>
-              <a:t>08/03/2019</a:t>
+              <a:t>18/03/2019</a:t>
             </a:fld>
             <a:endParaRPr lang="pt-BR"/>
           </a:p>
@@ -595,7 +595,7 @@
           <a:p>
             <a:fld id="{FD4AC941-A4D7-4DAA-81C3-DA9EA35F0F68}" type="datetimeFigureOut">
               <a:rPr lang="pt-BR" smtClean="0"/>
-              <a:t>08/03/2019</a:t>
+              <a:t>18/03/2019</a:t>
             </a:fld>
             <a:endParaRPr lang="pt-BR"/>
           </a:p>
@@ -763,7 +763,7 @@
           <a:p>
             <a:fld id="{FD4AC941-A4D7-4DAA-81C3-DA9EA35F0F68}" type="datetimeFigureOut">
               <a:rPr lang="pt-BR" smtClean="0"/>
-              <a:t>08/03/2019</a:t>
+              <a:t>18/03/2019</a:t>
             </a:fld>
             <a:endParaRPr lang="pt-BR"/>
           </a:p>
@@ -1008,7 +1008,7 @@
           <a:p>
             <a:fld id="{FD4AC941-A4D7-4DAA-81C3-DA9EA35F0F68}" type="datetimeFigureOut">
               <a:rPr lang="pt-BR" smtClean="0"/>
-              <a:t>08/03/2019</a:t>
+              <a:t>18/03/2019</a:t>
             </a:fld>
             <a:endParaRPr lang="pt-BR"/>
           </a:p>
@@ -1237,7 +1237,7 @@
           <a:p>
             <a:fld id="{FD4AC941-A4D7-4DAA-81C3-DA9EA35F0F68}" type="datetimeFigureOut">
               <a:rPr lang="pt-BR" smtClean="0"/>
-              <a:t>08/03/2019</a:t>
+              <a:t>18/03/2019</a:t>
             </a:fld>
             <a:endParaRPr lang="pt-BR"/>
           </a:p>
@@ -1601,7 +1601,7 @@
           <a:p>
             <a:fld id="{FD4AC941-A4D7-4DAA-81C3-DA9EA35F0F68}" type="datetimeFigureOut">
               <a:rPr lang="pt-BR" smtClean="0"/>
-              <a:t>08/03/2019</a:t>
+              <a:t>18/03/2019</a:t>
             </a:fld>
             <a:endParaRPr lang="pt-BR"/>
           </a:p>
@@ -1718,7 +1718,7 @@
           <a:p>
             <a:fld id="{FD4AC941-A4D7-4DAA-81C3-DA9EA35F0F68}" type="datetimeFigureOut">
               <a:rPr lang="pt-BR" smtClean="0"/>
-              <a:t>08/03/2019</a:t>
+              <a:t>18/03/2019</a:t>
             </a:fld>
             <a:endParaRPr lang="pt-BR"/>
           </a:p>
@@ -1813,7 +1813,7 @@
           <a:p>
             <a:fld id="{FD4AC941-A4D7-4DAA-81C3-DA9EA35F0F68}" type="datetimeFigureOut">
               <a:rPr lang="pt-BR" smtClean="0"/>
-              <a:t>08/03/2019</a:t>
+              <a:t>18/03/2019</a:t>
             </a:fld>
             <a:endParaRPr lang="pt-BR"/>
           </a:p>
@@ -2088,7 +2088,7 @@
           <a:p>
             <a:fld id="{FD4AC941-A4D7-4DAA-81C3-DA9EA35F0F68}" type="datetimeFigureOut">
               <a:rPr lang="pt-BR" smtClean="0"/>
-              <a:t>08/03/2019</a:t>
+              <a:t>18/03/2019</a:t>
             </a:fld>
             <a:endParaRPr lang="pt-BR"/>
           </a:p>
@@ -2340,7 +2340,7 @@
           <a:p>
             <a:fld id="{FD4AC941-A4D7-4DAA-81C3-DA9EA35F0F68}" type="datetimeFigureOut">
               <a:rPr lang="pt-BR" smtClean="0"/>
-              <a:t>08/03/2019</a:t>
+              <a:t>18/03/2019</a:t>
             </a:fld>
             <a:endParaRPr lang="pt-BR"/>
           </a:p>
@@ -2551,7 +2551,7 @@
           <a:p>
             <a:fld id="{FD4AC941-A4D7-4DAA-81C3-DA9EA35F0F68}" type="datetimeFigureOut">
               <a:rPr lang="pt-BR" smtClean="0"/>
-              <a:t>08/03/2019</a:t>
+              <a:t>18/03/2019</a:t>
             </a:fld>
             <a:endParaRPr lang="pt-BR"/>
           </a:p>
@@ -11661,7 +11661,7 @@
           <p:cNvPr id="9" name="Conector de Seta Reta 30">
             <a:extLst>
               <a:ext uri="{FF2B5EF4-FFF2-40B4-BE49-F238E27FC236}">
-                <a16:creationId xmlns:a16="http://schemas.microsoft.com/office/drawing/2014/main" xmlns="" id="{F4E2726F-250A-244A-9FEF-08E332214A0E}"/>
+                <a16:creationId xmlns:a16="http://schemas.microsoft.com/office/drawing/2014/main" id="{F4E2726F-250A-244A-9FEF-08E332214A0E}"/>
               </a:ext>
             </a:extLst>
           </p:cNvPr>
@@ -11703,7 +11703,7 @@
           <p:cNvPr id="11" name="Conector de Seta Reta 31">
             <a:extLst>
               <a:ext uri="{FF2B5EF4-FFF2-40B4-BE49-F238E27FC236}">
-                <a16:creationId xmlns:a16="http://schemas.microsoft.com/office/drawing/2014/main" xmlns="" id="{58C6BB8A-40B7-1D44-841F-91C8117B7A12}"/>
+                <a16:creationId xmlns:a16="http://schemas.microsoft.com/office/drawing/2014/main" id="{58C6BB8A-40B7-1D44-841F-91C8117B7A12}"/>
               </a:ext>
             </a:extLst>
           </p:cNvPr>
@@ -11745,7 +11745,7 @@
           <p:cNvPr id="12" name="CaixaDeTexto 37">
             <a:extLst>
               <a:ext uri="{FF2B5EF4-FFF2-40B4-BE49-F238E27FC236}">
-                <a16:creationId xmlns:a16="http://schemas.microsoft.com/office/drawing/2014/main" xmlns="" id="{71091896-9F67-8847-9C2A-DE057411D085}"/>
+                <a16:creationId xmlns:a16="http://schemas.microsoft.com/office/drawing/2014/main" id="{71091896-9F67-8847-9C2A-DE057411D085}"/>
               </a:ext>
             </a:extLst>
           </p:cNvPr>
@@ -11780,7 +11780,7 @@
           <p:cNvPr id="13" name="CaixaDeTexto 38">
             <a:extLst>
               <a:ext uri="{FF2B5EF4-FFF2-40B4-BE49-F238E27FC236}">
-                <a16:creationId xmlns:a16="http://schemas.microsoft.com/office/drawing/2014/main" xmlns="" id="{76B8159C-42E2-4940-B7F6-6CFD8DA7CF7E}"/>
+                <a16:creationId xmlns:a16="http://schemas.microsoft.com/office/drawing/2014/main" id="{76B8159C-42E2-4940-B7F6-6CFD8DA7CF7E}"/>
               </a:ext>
             </a:extLst>
           </p:cNvPr>
@@ -11815,7 +11815,7 @@
           <p:cNvPr id="14" name="Conector de Seta Reta 31">
             <a:extLst>
               <a:ext uri="{FF2B5EF4-FFF2-40B4-BE49-F238E27FC236}">
-                <a16:creationId xmlns:a16="http://schemas.microsoft.com/office/drawing/2014/main" xmlns="" id="{6270ED07-5855-EB46-9509-DAAB56BDB6EE}"/>
+                <a16:creationId xmlns:a16="http://schemas.microsoft.com/office/drawing/2014/main" id="{6270ED07-5855-EB46-9509-DAAB56BDB6EE}"/>
               </a:ext>
             </a:extLst>
           </p:cNvPr>
@@ -11859,7 +11859,7 @@
           <p:cNvPr id="15" name="CaixaDeTexto 37">
             <a:extLst>
               <a:ext uri="{FF2B5EF4-FFF2-40B4-BE49-F238E27FC236}">
-                <a16:creationId xmlns:a16="http://schemas.microsoft.com/office/drawing/2014/main" xmlns="" id="{A883361E-6275-FD48-BBBB-CC236BA50F68}"/>
+                <a16:creationId xmlns:a16="http://schemas.microsoft.com/office/drawing/2014/main" id="{A883361E-6275-FD48-BBBB-CC236BA50F68}"/>
               </a:ext>
             </a:extLst>
           </p:cNvPr>
@@ -11895,7 +11895,7 @@
           <p:cNvPr id="4" name="Cube 3">
             <a:extLst>
               <a:ext uri="{FF2B5EF4-FFF2-40B4-BE49-F238E27FC236}">
-                <a16:creationId xmlns:a16="http://schemas.microsoft.com/office/drawing/2014/main" xmlns="" id="{91386F85-D730-BC4D-BFB6-86BD933FCE40}"/>
+                <a16:creationId xmlns:a16="http://schemas.microsoft.com/office/drawing/2014/main" id="{91386F85-D730-BC4D-BFB6-86BD933FCE40}"/>
               </a:ext>
             </a:extLst>
           </p:cNvPr>
@@ -11947,7 +11947,7 @@
           <p:cNvPr id="7" name="Straight Arrow Connector 6">
             <a:extLst>
               <a:ext uri="{FF2B5EF4-FFF2-40B4-BE49-F238E27FC236}">
-                <a16:creationId xmlns:a16="http://schemas.microsoft.com/office/drawing/2014/main" xmlns="" id="{FB5C299A-1052-4746-8710-63FF6CFD409E}"/>
+                <a16:creationId xmlns:a16="http://schemas.microsoft.com/office/drawing/2014/main" id="{FB5C299A-1052-4746-8710-63FF6CFD409E}"/>
               </a:ext>
             </a:extLst>
           </p:cNvPr>
@@ -11968,6 +11968,7 @@
             <a:solidFill>
               <a:schemeClr val="tx1"/>
             </a:solidFill>
+            <a:prstDash val="dash"/>
             <a:tailEnd type="triangle"/>
           </a:ln>
         </p:spPr>
@@ -11993,7 +11994,7 @@
               <p:cNvPr id="16" name="TextBox 15">
                 <a:extLst>
                   <a:ext uri="{FF2B5EF4-FFF2-40B4-BE49-F238E27FC236}">
-                    <a16:creationId xmlns:a16="http://schemas.microsoft.com/office/drawing/2014/main" xmlns="" id="{ADCB2C18-6EAD-5D4A-98EB-E29D64C0FCAF}"/>
+                    <a16:creationId xmlns:a16="http://schemas.microsoft.com/office/drawing/2014/main" id="{ADCB2C18-6EAD-5D4A-98EB-E29D64C0FCAF}"/>
                   </a:ext>
                 </a:extLst>
               </p:cNvPr>
@@ -12106,7 +12107,7 @@
           <p:cNvPr id="25" name="Straight Arrow Connector 24">
             <a:extLst>
               <a:ext uri="{FF2B5EF4-FFF2-40B4-BE49-F238E27FC236}">
-                <a16:creationId xmlns:a16="http://schemas.microsoft.com/office/drawing/2014/main" xmlns="" id="{ED64D3D5-6A3F-5A41-83A7-36085B488607}"/>
+                <a16:creationId xmlns:a16="http://schemas.microsoft.com/office/drawing/2014/main" id="{ED64D3D5-6A3F-5A41-83A7-36085B488607}"/>
               </a:ext>
             </a:extLst>
           </p:cNvPr>
@@ -12152,7 +12153,7 @@
               <p:cNvPr id="27" name="TextBox 26">
                 <a:extLst>
                   <a:ext uri="{FF2B5EF4-FFF2-40B4-BE49-F238E27FC236}">
-                    <a16:creationId xmlns:a16="http://schemas.microsoft.com/office/drawing/2014/main" xmlns="" id="{85C03481-1FBF-DF4E-96C2-CDB1991F1F7B}"/>
+                    <a16:creationId xmlns:a16="http://schemas.microsoft.com/office/drawing/2014/main" id="{85C03481-1FBF-DF4E-96C2-CDB1991F1F7B}"/>
                   </a:ext>
                 </a:extLst>
               </p:cNvPr>
@@ -12265,7 +12266,7 @@
           <p:cNvPr id="28" name="Straight Arrow Connector 27">
             <a:extLst>
               <a:ext uri="{FF2B5EF4-FFF2-40B4-BE49-F238E27FC236}">
-                <a16:creationId xmlns:a16="http://schemas.microsoft.com/office/drawing/2014/main" xmlns="" id="{12070AFC-2402-1041-8B48-36FB0348B700}"/>
+                <a16:creationId xmlns:a16="http://schemas.microsoft.com/office/drawing/2014/main" id="{12070AFC-2402-1041-8B48-36FB0348B700}"/>
               </a:ext>
             </a:extLst>
           </p:cNvPr>
@@ -12311,7 +12312,7 @@
               <p:cNvPr id="36" name="TextBox 35">
                 <a:extLst>
                   <a:ext uri="{FF2B5EF4-FFF2-40B4-BE49-F238E27FC236}">
-                    <a16:creationId xmlns:a16="http://schemas.microsoft.com/office/drawing/2014/main" xmlns="" id="{5FE8FBEA-ADFF-AB40-A54A-449E780BBA65}"/>
+                    <a16:creationId xmlns:a16="http://schemas.microsoft.com/office/drawing/2014/main" id="{5FE8FBEA-ADFF-AB40-A54A-449E780BBA65}"/>
                   </a:ext>
                 </a:extLst>
               </p:cNvPr>
@@ -12424,7 +12425,7 @@
           <p:cNvPr id="40" name="Conector de Seta Reta 30">
             <a:extLst>
               <a:ext uri="{FF2B5EF4-FFF2-40B4-BE49-F238E27FC236}">
-                <a16:creationId xmlns:a16="http://schemas.microsoft.com/office/drawing/2014/main" xmlns="" id="{BA2E9DFA-5E42-7A45-BAAF-990ADF7EA0D3}"/>
+                <a16:creationId xmlns:a16="http://schemas.microsoft.com/office/drawing/2014/main" id="{BA2E9DFA-5E42-7A45-BAAF-990ADF7EA0D3}"/>
               </a:ext>
             </a:extLst>
           </p:cNvPr>
@@ -12468,7 +12469,7 @@
           <p:cNvPr id="41" name="Conector de Seta Reta 31">
             <a:extLst>
               <a:ext uri="{FF2B5EF4-FFF2-40B4-BE49-F238E27FC236}">
-                <a16:creationId xmlns:a16="http://schemas.microsoft.com/office/drawing/2014/main" xmlns="" id="{E89DE250-B42E-074A-9B4B-D32C5B21682A}"/>
+                <a16:creationId xmlns:a16="http://schemas.microsoft.com/office/drawing/2014/main" id="{E89DE250-B42E-074A-9B4B-D32C5B21682A}"/>
               </a:ext>
             </a:extLst>
           </p:cNvPr>
@@ -12512,7 +12513,7 @@
           <p:cNvPr id="42" name="CaixaDeTexto 37">
             <a:extLst>
               <a:ext uri="{FF2B5EF4-FFF2-40B4-BE49-F238E27FC236}">
-                <a16:creationId xmlns:a16="http://schemas.microsoft.com/office/drawing/2014/main" xmlns="" id="{EB1519E0-5286-4349-B80E-C58B3668839D}"/>
+                <a16:creationId xmlns:a16="http://schemas.microsoft.com/office/drawing/2014/main" id="{EB1519E0-5286-4349-B80E-C58B3668839D}"/>
               </a:ext>
             </a:extLst>
           </p:cNvPr>
@@ -12547,7 +12548,7 @@
           <p:cNvPr id="44" name="Conector de Seta Reta 31">
             <a:extLst>
               <a:ext uri="{FF2B5EF4-FFF2-40B4-BE49-F238E27FC236}">
-                <a16:creationId xmlns:a16="http://schemas.microsoft.com/office/drawing/2014/main" xmlns="" id="{498F1A6C-5107-C140-BB57-1B5DC6F026FE}"/>
+                <a16:creationId xmlns:a16="http://schemas.microsoft.com/office/drawing/2014/main" id="{498F1A6C-5107-C140-BB57-1B5DC6F026FE}"/>
               </a:ext>
             </a:extLst>
           </p:cNvPr>
@@ -12591,7 +12592,7 @@
           <p:cNvPr id="45" name="CaixaDeTexto 37">
             <a:extLst>
               <a:ext uri="{FF2B5EF4-FFF2-40B4-BE49-F238E27FC236}">
-                <a16:creationId xmlns:a16="http://schemas.microsoft.com/office/drawing/2014/main" xmlns="" id="{B6B0C0B4-5D95-E046-8F05-DBA56B369AC9}"/>
+                <a16:creationId xmlns:a16="http://schemas.microsoft.com/office/drawing/2014/main" id="{B6B0C0B4-5D95-E046-8F05-DBA56B369AC9}"/>
               </a:ext>
             </a:extLst>
           </p:cNvPr>
@@ -12627,7 +12628,7 @@
           <p:cNvPr id="37" name="Cube 36">
             <a:extLst>
               <a:ext uri="{FF2B5EF4-FFF2-40B4-BE49-F238E27FC236}">
-                <a16:creationId xmlns:a16="http://schemas.microsoft.com/office/drawing/2014/main" xmlns="" id="{678A5E09-5210-8B4F-9C6E-687A6DAE997E}"/>
+                <a16:creationId xmlns:a16="http://schemas.microsoft.com/office/drawing/2014/main" id="{678A5E09-5210-8B4F-9C6E-687A6DAE997E}"/>
               </a:ext>
             </a:extLst>
           </p:cNvPr>
@@ -12679,7 +12680,7 @@
           <p:cNvPr id="54" name="Straight Connector 53">
             <a:extLst>
               <a:ext uri="{FF2B5EF4-FFF2-40B4-BE49-F238E27FC236}">
-                <a16:creationId xmlns:a16="http://schemas.microsoft.com/office/drawing/2014/main" xmlns="" id="{13538F5B-109E-414B-A880-6203A7899206}"/>
+                <a16:creationId xmlns:a16="http://schemas.microsoft.com/office/drawing/2014/main" id="{13538F5B-109E-414B-A880-6203A7899206}"/>
               </a:ext>
             </a:extLst>
           </p:cNvPr>
@@ -12721,7 +12722,7 @@
           <p:cNvPr id="55" name="Straight Connector 54">
             <a:extLst>
               <a:ext uri="{FF2B5EF4-FFF2-40B4-BE49-F238E27FC236}">
-                <a16:creationId xmlns:a16="http://schemas.microsoft.com/office/drawing/2014/main" xmlns="" id="{57FE85EB-0365-8045-A5A8-D95E80529B6A}"/>
+                <a16:creationId xmlns:a16="http://schemas.microsoft.com/office/drawing/2014/main" id="{57FE85EB-0365-8045-A5A8-D95E80529B6A}"/>
               </a:ext>
             </a:extLst>
           </p:cNvPr>
@@ -12765,7 +12766,7 @@
           <p:cNvPr id="59" name="Straight Connector 58">
             <a:extLst>
               <a:ext uri="{FF2B5EF4-FFF2-40B4-BE49-F238E27FC236}">
-                <a16:creationId xmlns:a16="http://schemas.microsoft.com/office/drawing/2014/main" xmlns="" id="{4C50B42D-6F2E-F143-8613-E77625FDA0C2}"/>
+                <a16:creationId xmlns:a16="http://schemas.microsoft.com/office/drawing/2014/main" id="{4C50B42D-6F2E-F143-8613-E77625FDA0C2}"/>
               </a:ext>
             </a:extLst>
           </p:cNvPr>
@@ -12809,7 +12810,7 @@
           <p:cNvPr id="61" name="Straight Arrow Connector 60">
             <a:extLst>
               <a:ext uri="{FF2B5EF4-FFF2-40B4-BE49-F238E27FC236}">
-                <a16:creationId xmlns:a16="http://schemas.microsoft.com/office/drawing/2014/main" xmlns="" id="{CF4E5FA0-002E-E44C-85C4-9D2B890C8F48}"/>
+                <a16:creationId xmlns:a16="http://schemas.microsoft.com/office/drawing/2014/main" id="{CF4E5FA0-002E-E44C-85C4-9D2B890C8F48}"/>
               </a:ext>
             </a:extLst>
           </p:cNvPr>
@@ -12855,7 +12856,7 @@
               <p:cNvPr id="64" name="TextBox 63">
                 <a:extLst>
                   <a:ext uri="{FF2B5EF4-FFF2-40B4-BE49-F238E27FC236}">
-                    <a16:creationId xmlns:a16="http://schemas.microsoft.com/office/drawing/2014/main" xmlns="" id="{D3DDB3F6-3863-8B40-8B0C-765B50556082}"/>
+                    <a16:creationId xmlns:a16="http://schemas.microsoft.com/office/drawing/2014/main" id="{D3DDB3F6-3863-8B40-8B0C-765B50556082}"/>
                   </a:ext>
                 </a:extLst>
               </p:cNvPr>
@@ -13008,7 +13009,7 @@
           <p:cNvPr id="66" name="Straight Arrow Connector 65">
             <a:extLst>
               <a:ext uri="{FF2B5EF4-FFF2-40B4-BE49-F238E27FC236}">
-                <a16:creationId xmlns:a16="http://schemas.microsoft.com/office/drawing/2014/main" xmlns="" id="{754DC28D-02DE-074B-A64E-37E346FFDEAB}"/>
+                <a16:creationId xmlns:a16="http://schemas.microsoft.com/office/drawing/2014/main" id="{754DC28D-02DE-074B-A64E-37E346FFDEAB}"/>
               </a:ext>
             </a:extLst>
           </p:cNvPr>
@@ -13055,7 +13056,7 @@
               <p:cNvPr id="68" name="Rectangle 67">
                 <a:extLst>
                   <a:ext uri="{FF2B5EF4-FFF2-40B4-BE49-F238E27FC236}">
-                    <a16:creationId xmlns:a16="http://schemas.microsoft.com/office/drawing/2014/main" xmlns="" id="{FE8B028E-C93E-E548-AF4F-0A464D80D063}"/>
+                    <a16:creationId xmlns:a16="http://schemas.microsoft.com/office/drawing/2014/main" id="{FE8B028E-C93E-E548-AF4F-0A464D80D063}"/>
                   </a:ext>
                 </a:extLst>
               </p:cNvPr>
@@ -13170,7 +13171,7 @@
           <p:cNvPr id="69" name="Straight Arrow Connector 68">
             <a:extLst>
               <a:ext uri="{FF2B5EF4-FFF2-40B4-BE49-F238E27FC236}">
-                <a16:creationId xmlns:a16="http://schemas.microsoft.com/office/drawing/2014/main" xmlns="" id="{BE0D7074-2E41-6946-A7C8-8B995652278D}"/>
+                <a16:creationId xmlns:a16="http://schemas.microsoft.com/office/drawing/2014/main" id="{BE0D7074-2E41-6946-A7C8-8B995652278D}"/>
               </a:ext>
             </a:extLst>
           </p:cNvPr>
@@ -13216,7 +13217,7 @@
               <p:cNvPr id="71" name="Rectangle 70">
                 <a:extLst>
                   <a:ext uri="{FF2B5EF4-FFF2-40B4-BE49-F238E27FC236}">
-                    <a16:creationId xmlns:a16="http://schemas.microsoft.com/office/drawing/2014/main" xmlns="" id="{40CC5FCB-F480-2645-BAD0-61FA0E7FE5ED}"/>
+                    <a16:creationId xmlns:a16="http://schemas.microsoft.com/office/drawing/2014/main" id="{40CC5FCB-F480-2645-BAD0-61FA0E7FE5ED}"/>
                   </a:ext>
                 </a:extLst>
               </p:cNvPr>
@@ -13382,7 +13383,7 @@
               <p:cNvPr id="72" name="Rectangle 71">
                 <a:extLst>
                   <a:ext uri="{FF2B5EF4-FFF2-40B4-BE49-F238E27FC236}">
-                    <a16:creationId xmlns:a16="http://schemas.microsoft.com/office/drawing/2014/main" xmlns="" id="{23629297-22E7-7441-81D1-749C3AD58B54}"/>
+                    <a16:creationId xmlns:a16="http://schemas.microsoft.com/office/drawing/2014/main" id="{23629297-22E7-7441-81D1-749C3AD58B54}"/>
                   </a:ext>
                 </a:extLst>
               </p:cNvPr>
@@ -13494,7 +13495,7 @@
           <p:cNvPr id="73" name="Straight Arrow Connector 72">
             <a:extLst>
               <a:ext uri="{FF2B5EF4-FFF2-40B4-BE49-F238E27FC236}">
-                <a16:creationId xmlns:a16="http://schemas.microsoft.com/office/drawing/2014/main" xmlns="" id="{46F78AF6-5B3C-564C-8FAE-8D1FD83E19D9}"/>
+                <a16:creationId xmlns:a16="http://schemas.microsoft.com/office/drawing/2014/main" id="{46F78AF6-5B3C-564C-8FAE-8D1FD83E19D9}"/>
               </a:ext>
             </a:extLst>
           </p:cNvPr>
@@ -13539,7 +13540,7 @@
           <p:cNvPr id="74" name="Straight Arrow Connector 73">
             <a:extLst>
               <a:ext uri="{FF2B5EF4-FFF2-40B4-BE49-F238E27FC236}">
-                <a16:creationId xmlns:a16="http://schemas.microsoft.com/office/drawing/2014/main" xmlns="" id="{DE12505A-7235-6448-B5C6-FE671E3F8A22}"/>
+                <a16:creationId xmlns:a16="http://schemas.microsoft.com/office/drawing/2014/main" id="{DE12505A-7235-6448-B5C6-FE671E3F8A22}"/>
               </a:ext>
             </a:extLst>
           </p:cNvPr>
@@ -13585,7 +13586,7 @@
               <p:cNvPr id="75" name="TextBox 74">
                 <a:extLst>
                   <a:ext uri="{FF2B5EF4-FFF2-40B4-BE49-F238E27FC236}">
-                    <a16:creationId xmlns:a16="http://schemas.microsoft.com/office/drawing/2014/main" xmlns="" id="{71F8CD0D-BA76-8E46-9CCA-A28143CAAB39}"/>
+                    <a16:creationId xmlns:a16="http://schemas.microsoft.com/office/drawing/2014/main" id="{71F8CD0D-BA76-8E46-9CCA-A28143CAAB39}"/>
                   </a:ext>
                 </a:extLst>
               </p:cNvPr>
@@ -13744,7 +13745,7 @@
           <p:cNvPr id="83" name="CaixaDeTexto 37">
             <a:extLst>
               <a:ext uri="{FF2B5EF4-FFF2-40B4-BE49-F238E27FC236}">
-                <a16:creationId xmlns:a16="http://schemas.microsoft.com/office/drawing/2014/main" xmlns="" id="{82977875-7FA0-AA40-AFC9-85EBA228660F}"/>
+                <a16:creationId xmlns:a16="http://schemas.microsoft.com/office/drawing/2014/main" id="{82977875-7FA0-AA40-AFC9-85EBA228660F}"/>
               </a:ext>
             </a:extLst>
           </p:cNvPr>
@@ -13779,7 +13780,7 @@
           <p:cNvPr id="84" name="Straight Arrow Connector 83">
             <a:extLst>
               <a:ext uri="{FF2B5EF4-FFF2-40B4-BE49-F238E27FC236}">
-                <a16:creationId xmlns:a16="http://schemas.microsoft.com/office/drawing/2014/main" xmlns="" id="{7B2A7D30-80F5-E04E-AF2E-46549DA5001A}"/>
+                <a16:creationId xmlns:a16="http://schemas.microsoft.com/office/drawing/2014/main" id="{7B2A7D30-80F5-E04E-AF2E-46549DA5001A}"/>
               </a:ext>
             </a:extLst>
           </p:cNvPr>
@@ -13825,7 +13826,7 @@
               <p:cNvPr id="85" name="TextBox 84">
                 <a:extLst>
                   <a:ext uri="{FF2B5EF4-FFF2-40B4-BE49-F238E27FC236}">
-                    <a16:creationId xmlns:a16="http://schemas.microsoft.com/office/drawing/2014/main" xmlns="" id="{9EA20542-1E02-FB4B-8965-FFAFE1DDEE71}"/>
+                    <a16:creationId xmlns:a16="http://schemas.microsoft.com/office/drawing/2014/main" id="{9EA20542-1E02-FB4B-8965-FFAFE1DDEE71}"/>
                   </a:ext>
                 </a:extLst>
               </p:cNvPr>
@@ -13938,7 +13939,7 @@
           <p:cNvPr id="29" name="Group 28">
             <a:extLst>
               <a:ext uri="{FF2B5EF4-FFF2-40B4-BE49-F238E27FC236}">
-                <a16:creationId xmlns:a16="http://schemas.microsoft.com/office/drawing/2014/main" xmlns="" id="{3490477F-763A-4F4D-9169-63E295F28330}"/>
+                <a16:creationId xmlns:a16="http://schemas.microsoft.com/office/drawing/2014/main" id="{3490477F-763A-4F4D-9169-63E295F28330}"/>
               </a:ext>
             </a:extLst>
           </p:cNvPr>
@@ -13948,9 +13949,9 @@
         <p:grpSpPr>
           <a:xfrm>
             <a:off x="1207347" y="3397611"/>
-            <a:ext cx="3910890" cy="3125623"/>
+            <a:ext cx="4259203" cy="3125623"/>
             <a:chOff x="1207347" y="3397611"/>
-            <a:chExt cx="3910890" cy="3125623"/>
+            <a:chExt cx="4259203" cy="3125623"/>
           </a:xfrm>
         </p:grpSpPr>
         <p:sp>
@@ -13958,7 +13959,7 @@
             <p:cNvPr id="2" name="Rectangle 1">
               <a:extLst>
                 <a:ext uri="{FF2B5EF4-FFF2-40B4-BE49-F238E27FC236}">
-                  <a16:creationId xmlns:a16="http://schemas.microsoft.com/office/drawing/2014/main" xmlns="" id="{44D1A702-3EFD-7147-9604-63E809BECA89}"/>
+                  <a16:creationId xmlns:a16="http://schemas.microsoft.com/office/drawing/2014/main" id="{44D1A702-3EFD-7147-9604-63E809BECA89}"/>
                 </a:ext>
               </a:extLst>
             </p:cNvPr>
@@ -14015,7 +14016,7 @@
             <p:cNvPr id="3" name="Freeform 2">
               <a:extLst>
                 <a:ext uri="{FF2B5EF4-FFF2-40B4-BE49-F238E27FC236}">
-                  <a16:creationId xmlns:a16="http://schemas.microsoft.com/office/drawing/2014/main" xmlns="" id="{B8C752B6-8936-584E-9D03-0B78FBF9796E}"/>
+                  <a16:creationId xmlns:a16="http://schemas.microsoft.com/office/drawing/2014/main" id="{B8C752B6-8936-584E-9D03-0B78FBF9796E}"/>
                 </a:ext>
               </a:extLst>
             </p:cNvPr>
@@ -14401,7 +14402,7 @@
             <p:cNvPr id="6" name="Oval 5">
               <a:extLst>
                 <a:ext uri="{FF2B5EF4-FFF2-40B4-BE49-F238E27FC236}">
-                  <a16:creationId xmlns:a16="http://schemas.microsoft.com/office/drawing/2014/main" xmlns="" id="{957036A3-CE44-3948-9771-2A025BF838D5}"/>
+                  <a16:creationId xmlns:a16="http://schemas.microsoft.com/office/drawing/2014/main" id="{957036A3-CE44-3948-9771-2A025BF838D5}"/>
                 </a:ext>
               </a:extLst>
             </p:cNvPr>
@@ -14458,7 +14459,7 @@
             <p:cNvPr id="8" name="Freeform 7">
               <a:extLst>
                 <a:ext uri="{FF2B5EF4-FFF2-40B4-BE49-F238E27FC236}">
-                  <a16:creationId xmlns:a16="http://schemas.microsoft.com/office/drawing/2014/main" xmlns="" id="{B9218790-1900-2742-B907-060A7FD7EF9D}"/>
+                  <a16:creationId xmlns:a16="http://schemas.microsoft.com/office/drawing/2014/main" id="{B9218790-1900-2742-B907-060A7FD7EF9D}"/>
                 </a:ext>
               </a:extLst>
             </p:cNvPr>
@@ -14788,7 +14789,7 @@
             <p:cNvPr id="17" name="Freeform 16">
               <a:extLst>
                 <a:ext uri="{FF2B5EF4-FFF2-40B4-BE49-F238E27FC236}">
-                  <a16:creationId xmlns:a16="http://schemas.microsoft.com/office/drawing/2014/main" xmlns="" id="{983FDBFF-E7D3-4A4D-9B1C-35CBBDDED5F6}"/>
+                  <a16:creationId xmlns:a16="http://schemas.microsoft.com/office/drawing/2014/main" id="{983FDBFF-E7D3-4A4D-9B1C-35CBBDDED5F6}"/>
                 </a:ext>
               </a:extLst>
             </p:cNvPr>
@@ -15176,7 +15177,7 @@
             <p:cNvPr id="18" name="Freeform 17">
               <a:extLst>
                 <a:ext uri="{FF2B5EF4-FFF2-40B4-BE49-F238E27FC236}">
-                  <a16:creationId xmlns:a16="http://schemas.microsoft.com/office/drawing/2014/main" xmlns="" id="{351E04E1-FCD0-664D-A440-E67F5F4D328D}"/>
+                  <a16:creationId xmlns:a16="http://schemas.microsoft.com/office/drawing/2014/main" id="{351E04E1-FCD0-664D-A440-E67F5F4D328D}"/>
                 </a:ext>
               </a:extLst>
             </p:cNvPr>
@@ -15398,7 +15399,7 @@
             <p:cNvPr id="20" name="Freeform 19">
               <a:extLst>
                 <a:ext uri="{FF2B5EF4-FFF2-40B4-BE49-F238E27FC236}">
-                  <a16:creationId xmlns:a16="http://schemas.microsoft.com/office/drawing/2014/main" xmlns="" id="{8DC4F329-D01C-094D-ABC3-C4DA25596C37}"/>
+                  <a16:creationId xmlns:a16="http://schemas.microsoft.com/office/drawing/2014/main" id="{8DC4F329-D01C-094D-ABC3-C4DA25596C37}"/>
                 </a:ext>
               </a:extLst>
             </p:cNvPr>
@@ -15648,7 +15649,7 @@
             <p:cNvPr id="22" name="Freeform 21">
               <a:extLst>
                 <a:ext uri="{FF2B5EF4-FFF2-40B4-BE49-F238E27FC236}">
-                  <a16:creationId xmlns:a16="http://schemas.microsoft.com/office/drawing/2014/main" xmlns="" id="{7E04F2F1-51C6-6A47-91BE-CA28F302B4A9}"/>
+                  <a16:creationId xmlns:a16="http://schemas.microsoft.com/office/drawing/2014/main" id="{7E04F2F1-51C6-6A47-91BE-CA28F302B4A9}"/>
                 </a:ext>
               </a:extLst>
             </p:cNvPr>
@@ -15892,7 +15893,7 @@
             <p:cNvPr id="53" name="Freeform 52">
               <a:extLst>
                 <a:ext uri="{FF2B5EF4-FFF2-40B4-BE49-F238E27FC236}">
-                  <a16:creationId xmlns:a16="http://schemas.microsoft.com/office/drawing/2014/main" xmlns="" id="{0147C010-60C8-9843-8796-B13BD5EB5C78}"/>
+                  <a16:creationId xmlns:a16="http://schemas.microsoft.com/office/drawing/2014/main" id="{0147C010-60C8-9843-8796-B13BD5EB5C78}"/>
                 </a:ext>
               </a:extLst>
             </p:cNvPr>
@@ -16280,7 +16281,7 @@
             <p:cNvPr id="56" name="Freeform 55">
               <a:extLst>
                 <a:ext uri="{FF2B5EF4-FFF2-40B4-BE49-F238E27FC236}">
-                  <a16:creationId xmlns:a16="http://schemas.microsoft.com/office/drawing/2014/main" xmlns="" id="{F0095C1D-22F3-BB4B-B94A-E1418D8828E8}"/>
+                  <a16:creationId xmlns:a16="http://schemas.microsoft.com/office/drawing/2014/main" id="{F0095C1D-22F3-BB4B-B94A-E1418D8828E8}"/>
                 </a:ext>
               </a:extLst>
             </p:cNvPr>
@@ -16666,7 +16667,7 @@
             <p:cNvPr id="57" name="Freeform 56">
               <a:extLst>
                 <a:ext uri="{FF2B5EF4-FFF2-40B4-BE49-F238E27FC236}">
-                  <a16:creationId xmlns:a16="http://schemas.microsoft.com/office/drawing/2014/main" xmlns="" id="{47A790B9-35EB-B644-B261-B2582C621B1A}"/>
+                  <a16:creationId xmlns:a16="http://schemas.microsoft.com/office/drawing/2014/main" id="{47A790B9-35EB-B644-B261-B2582C621B1A}"/>
                 </a:ext>
               </a:extLst>
             </p:cNvPr>
@@ -16916,7 +16917,7 @@
             <p:cNvPr id="58" name="Freeform 57">
               <a:extLst>
                 <a:ext uri="{FF2B5EF4-FFF2-40B4-BE49-F238E27FC236}">
-                  <a16:creationId xmlns:a16="http://schemas.microsoft.com/office/drawing/2014/main" xmlns="" id="{72AB0C17-E2D7-9E4A-8F06-5AA42B43D956}"/>
+                  <a16:creationId xmlns:a16="http://schemas.microsoft.com/office/drawing/2014/main" id="{72AB0C17-E2D7-9E4A-8F06-5AA42B43D956}"/>
                 </a:ext>
               </a:extLst>
             </p:cNvPr>
@@ -17302,7 +17303,7 @@
             <p:cNvPr id="60" name="Freeform 59">
               <a:extLst>
                 <a:ext uri="{FF2B5EF4-FFF2-40B4-BE49-F238E27FC236}">
-                  <a16:creationId xmlns:a16="http://schemas.microsoft.com/office/drawing/2014/main" xmlns="" id="{F8FBCBA5-8772-9141-A68A-733CD1CE40F4}"/>
+                  <a16:creationId xmlns:a16="http://schemas.microsoft.com/office/drawing/2014/main" id="{F8FBCBA5-8772-9141-A68A-733CD1CE40F4}"/>
                 </a:ext>
               </a:extLst>
             </p:cNvPr>
@@ -17688,7 +17689,7 @@
             <p:cNvPr id="62" name="Freeform 61">
               <a:extLst>
                 <a:ext uri="{FF2B5EF4-FFF2-40B4-BE49-F238E27FC236}">
-                  <a16:creationId xmlns:a16="http://schemas.microsoft.com/office/drawing/2014/main" xmlns="" id="{81F5B2E2-D515-5449-8565-69EB2D19B507}"/>
+                  <a16:creationId xmlns:a16="http://schemas.microsoft.com/office/drawing/2014/main" id="{81F5B2E2-D515-5449-8565-69EB2D19B507}"/>
                 </a:ext>
               </a:extLst>
             </p:cNvPr>
@@ -17910,7 +17911,7 @@
             <p:cNvPr id="63" name="Freeform 62">
               <a:extLst>
                 <a:ext uri="{FF2B5EF4-FFF2-40B4-BE49-F238E27FC236}">
-                  <a16:creationId xmlns:a16="http://schemas.microsoft.com/office/drawing/2014/main" xmlns="" id="{86706AD3-955C-8C40-A242-3B2625A36FDC}"/>
+                  <a16:creationId xmlns:a16="http://schemas.microsoft.com/office/drawing/2014/main" id="{86706AD3-955C-8C40-A242-3B2625A36FDC}"/>
                 </a:ext>
               </a:extLst>
             </p:cNvPr>
@@ -18240,7 +18241,7 @@
             <p:cNvPr id="65" name="Freeform 64">
               <a:extLst>
                 <a:ext uri="{FF2B5EF4-FFF2-40B4-BE49-F238E27FC236}">
-                  <a16:creationId xmlns:a16="http://schemas.microsoft.com/office/drawing/2014/main" xmlns="" id="{392ED72B-B593-E94B-8E3A-47A57F4EFA28}"/>
+                  <a16:creationId xmlns:a16="http://schemas.microsoft.com/office/drawing/2014/main" id="{392ED72B-B593-E94B-8E3A-47A57F4EFA28}"/>
                 </a:ext>
               </a:extLst>
             </p:cNvPr>
@@ -18626,7 +18627,7 @@
             <p:cNvPr id="67" name="Freeform 66">
               <a:extLst>
                 <a:ext uri="{FF2B5EF4-FFF2-40B4-BE49-F238E27FC236}">
-                  <a16:creationId xmlns:a16="http://schemas.microsoft.com/office/drawing/2014/main" xmlns="" id="{863BAA95-54EC-6648-A2E4-B92D02F843F9}"/>
+                  <a16:creationId xmlns:a16="http://schemas.microsoft.com/office/drawing/2014/main" id="{863BAA95-54EC-6648-A2E4-B92D02F843F9}"/>
                 </a:ext>
               </a:extLst>
             </p:cNvPr>
@@ -18848,7 +18849,7 @@
             <p:cNvPr id="70" name="Straight Arrow Connector 69">
               <a:extLst>
                 <a:ext uri="{FF2B5EF4-FFF2-40B4-BE49-F238E27FC236}">
-                  <a16:creationId xmlns:a16="http://schemas.microsoft.com/office/drawing/2014/main" xmlns="" id="{37CB2550-0B63-614F-A657-CA0C3BAD55B1}"/>
+                  <a16:creationId xmlns:a16="http://schemas.microsoft.com/office/drawing/2014/main" id="{37CB2550-0B63-614F-A657-CA0C3BAD55B1}"/>
                 </a:ext>
               </a:extLst>
             </p:cNvPr>
@@ -18894,7 +18895,7 @@
                 <p:cNvPr id="76" name="TextBox 75">
                   <a:extLst>
                     <a:ext uri="{FF2B5EF4-FFF2-40B4-BE49-F238E27FC236}">
-                      <a16:creationId xmlns:a16="http://schemas.microsoft.com/office/drawing/2014/main" xmlns="" id="{9855CA9B-1AE1-6F48-B19D-C1DCCFD013A6}"/>
+                      <a16:creationId xmlns:a16="http://schemas.microsoft.com/office/drawing/2014/main" id="{9855CA9B-1AE1-6F48-B19D-C1DCCFD013A6}"/>
                     </a:ext>
                   </a:extLst>
                 </p:cNvPr>
@@ -19007,7 +19008,7 @@
             <p:cNvPr id="79" name="Straight Arrow Connector 78">
               <a:extLst>
                 <a:ext uri="{FF2B5EF4-FFF2-40B4-BE49-F238E27FC236}">
-                  <a16:creationId xmlns:a16="http://schemas.microsoft.com/office/drawing/2014/main" xmlns="" id="{55665669-207C-A24A-BA6F-7BBB58EA34B9}"/>
+                  <a16:creationId xmlns:a16="http://schemas.microsoft.com/office/drawing/2014/main" id="{55665669-207C-A24A-BA6F-7BBB58EA34B9}"/>
                 </a:ext>
               </a:extLst>
             </p:cNvPr>
@@ -19046,14 +19047,14 @@
             </a:fontRef>
           </p:style>
         </p:cxnSp>
-        <mc:AlternateContent xmlns:mc="http://schemas.openxmlformats.org/markup-compatibility/2006" xmlns:a14="http://schemas.microsoft.com/office/drawing/2010/main">
-          <mc:Choice Requires="a14">
+        <mc:AlternateContent xmlns:mc="http://schemas.openxmlformats.org/markup-compatibility/2006">
+          <mc:Choice xmlns:a14="http://schemas.microsoft.com/office/drawing/2010/main" Requires="a14">
             <p:sp>
               <p:nvSpPr>
                 <p:cNvPr id="80" name="TextBox 79">
                   <a:extLst>
                     <a:ext uri="{FF2B5EF4-FFF2-40B4-BE49-F238E27FC236}">
-                      <a16:creationId xmlns:a16="http://schemas.microsoft.com/office/drawing/2014/main" xmlns="" id="{34A6CB74-D772-554F-8A10-ABD6AFE1BFFE}"/>
+                      <a16:creationId xmlns:a16="http://schemas.microsoft.com/office/drawing/2014/main" id="{34A6CB74-D772-554F-8A10-ABD6AFE1BFFE}"/>
                     </a:ext>
                   </a:extLst>
                 </p:cNvPr>
@@ -19062,8 +19063,8 @@
               </p:nvSpPr>
               <p:spPr>
                 <a:xfrm>
-                  <a:off x="4498353" y="4661900"/>
-                  <a:ext cx="384592" cy="276999"/>
+                  <a:off x="4299820" y="4646321"/>
+                  <a:ext cx="1166730" cy="276999"/>
                 </a:xfrm>
                 <a:prstGeom prst="rect">
                   <a:avLst/>
@@ -19108,6 +19109,52 @@
                             </m:r>
                           </m:sub>
                         </m:sSub>
+                        <m:r>
+                          <a:rPr lang="pt-BR" b="0" i="1" smtClean="0">
+                            <a:latin typeface="Cambria Math" panose="02040503050406030204" pitchFamily="18" charset="0"/>
+                          </a:rPr>
+                          <m:t>+</m:t>
+                        </m:r>
+                        <m:r>
+                          <m:rPr>
+                            <m:sty m:val="p"/>
+                          </m:rPr>
+                          <a:rPr lang="pt-BR" b="0" i="0" smtClean="0">
+                            <a:latin typeface="Cambria Math" panose="02040503050406030204" pitchFamily="18" charset="0"/>
+                          </a:rPr>
+                          <m:t>Δ</m:t>
+                        </m:r>
+                        <m:sSub>
+                          <m:sSubPr>
+                            <m:ctrlPr>
+                              <a:rPr lang="pt-BR" b="0" i="1" smtClean="0">
+                                <a:latin typeface="Cambria Math" panose="02040503050406030204" pitchFamily="18" charset="0"/>
+                              </a:rPr>
+                            </m:ctrlPr>
+                          </m:sSubPr>
+                          <m:e>
+                            <m:r>
+                              <a:rPr lang="pt-BR" b="0" i="1" smtClean="0">
+                                <a:latin typeface="Cambria Math" panose="02040503050406030204" pitchFamily="18" charset="0"/>
+                              </a:rPr>
+                              <m:t>𝜎</m:t>
+                            </m:r>
+                          </m:e>
+                          <m:sub>
+                            <m:r>
+                              <a:rPr lang="pt-BR" b="0" i="1" smtClean="0">
+                                <a:latin typeface="Cambria Math" panose="02040503050406030204" pitchFamily="18" charset="0"/>
+                              </a:rPr>
+                              <m:t>𝑥𝑥</m:t>
+                            </m:r>
+                            <m:r>
+                              <a:rPr lang="pt-BR" b="0" i="1" smtClean="0">
+                                <a:latin typeface="Cambria Math" panose="02040503050406030204" pitchFamily="18" charset="0"/>
+                              </a:rPr>
+                              <m:t> </m:t>
+                            </m:r>
+                          </m:sub>
+                        </m:sSub>
                       </m:oMath>
                     </m:oMathPara>
                   </a14:m>
@@ -19116,7 +19163,7 @@
               </p:txBody>
             </p:sp>
           </mc:Choice>
-          <mc:Fallback xmlns="">
+          <mc:Fallback>
             <p:sp>
               <p:nvSpPr>
                 <p:cNvPr id="80" name="TextBox 79">
@@ -19133,8 +19180,8 @@
               </p:nvSpPr>
               <p:spPr>
                 <a:xfrm>
-                  <a:off x="4498353" y="4661900"/>
-                  <a:ext cx="384592" cy="276999"/>
+                  <a:off x="4299820" y="4646321"/>
+                  <a:ext cx="1166730" cy="276999"/>
                 </a:xfrm>
                 <a:prstGeom prst="rect">
                   <a:avLst/>
@@ -19142,7 +19189,7 @@
                 <a:blipFill>
                   <a:blip r:embed="rId12"/>
                   <a:stretch>
-                    <a:fillRect l="-3226" b="-8696"/>
+                    <a:fillRect l="-2604" b="-10870"/>
                   </a:stretch>
                 </a:blipFill>
               </p:spPr>
@@ -19151,7 +19198,7 @@
                 <a:lstStyle/>
                 <a:p>
                   <a:r>
-                    <a:rPr lang="en-US">
+                    <a:rPr lang="pt-BR">
                       <a:noFill/>
                     </a:rPr>
                     <a:t> </a:t>
@@ -19166,7 +19213,7 @@
             <p:cNvPr id="81" name="Straight Arrow Connector 80">
               <a:extLst>
                 <a:ext uri="{FF2B5EF4-FFF2-40B4-BE49-F238E27FC236}">
-                  <a16:creationId xmlns:a16="http://schemas.microsoft.com/office/drawing/2014/main" xmlns="" id="{FDFE2E75-8803-D645-962C-55BE74228762}"/>
+                  <a16:creationId xmlns:a16="http://schemas.microsoft.com/office/drawing/2014/main" id="{FDFE2E75-8803-D645-962C-55BE74228762}"/>
                 </a:ext>
               </a:extLst>
             </p:cNvPr>
@@ -19210,7 +19257,7 @@
             <p:cNvPr id="86" name="Straight Arrow Connector 85">
               <a:extLst>
                 <a:ext uri="{FF2B5EF4-FFF2-40B4-BE49-F238E27FC236}">
-                  <a16:creationId xmlns:a16="http://schemas.microsoft.com/office/drawing/2014/main" xmlns="" id="{93DD0A17-02BB-484C-A585-78064B5351E9}"/>
+                  <a16:creationId xmlns:a16="http://schemas.microsoft.com/office/drawing/2014/main" id="{93DD0A17-02BB-484C-A585-78064B5351E9}"/>
                 </a:ext>
               </a:extLst>
             </p:cNvPr>
@@ -19249,14 +19296,14 @@
             </a:fontRef>
           </p:style>
         </p:cxnSp>
-        <mc:AlternateContent xmlns:mc="http://schemas.openxmlformats.org/markup-compatibility/2006" xmlns:a14="http://schemas.microsoft.com/office/drawing/2010/main">
-          <mc:Choice Requires="a14">
+        <mc:AlternateContent xmlns:mc="http://schemas.openxmlformats.org/markup-compatibility/2006">
+          <mc:Choice xmlns:a14="http://schemas.microsoft.com/office/drawing/2010/main" Requires="a14">
             <p:sp>
               <p:nvSpPr>
                 <p:cNvPr id="87" name="TextBox 86">
                   <a:extLst>
                     <a:ext uri="{FF2B5EF4-FFF2-40B4-BE49-F238E27FC236}">
-                      <a16:creationId xmlns:a16="http://schemas.microsoft.com/office/drawing/2014/main" xmlns="" id="{99094E6F-4903-FA41-A682-767C00BC8280}"/>
+                      <a16:creationId xmlns:a16="http://schemas.microsoft.com/office/drawing/2014/main" id="{99094E6F-4903-FA41-A682-767C00BC8280}"/>
                     </a:ext>
                   </a:extLst>
                 </p:cNvPr>
@@ -19266,7 +19313,7 @@
               <p:spPr>
                 <a:xfrm>
                   <a:off x="3284875" y="3537357"/>
-                  <a:ext cx="400238" cy="298928"/>
+                  <a:ext cx="1161152" cy="298928"/>
                 </a:xfrm>
                 <a:prstGeom prst="rect">
                   <a:avLst/>
@@ -19311,6 +19358,46 @@
                             </m:r>
                           </m:sub>
                         </m:sSub>
+                        <m:r>
+                          <a:rPr lang="pt-BR" b="0" i="1" smtClean="0">
+                            <a:latin typeface="Cambria Math" panose="02040503050406030204" pitchFamily="18" charset="0"/>
+                          </a:rPr>
+                          <m:t>+</m:t>
+                        </m:r>
+                        <m:r>
+                          <m:rPr>
+                            <m:sty m:val="p"/>
+                          </m:rPr>
+                          <a:rPr lang="pt-BR" b="0" i="0" smtClean="0">
+                            <a:latin typeface="Cambria Math" panose="02040503050406030204" pitchFamily="18" charset="0"/>
+                          </a:rPr>
+                          <m:t>Δ</m:t>
+                        </m:r>
+                        <m:sSub>
+                          <m:sSubPr>
+                            <m:ctrlPr>
+                              <a:rPr lang="pt-BR" b="0" i="1" smtClean="0">
+                                <a:latin typeface="Cambria Math" panose="02040503050406030204" pitchFamily="18" charset="0"/>
+                              </a:rPr>
+                            </m:ctrlPr>
+                          </m:sSubPr>
+                          <m:e>
+                            <m:r>
+                              <a:rPr lang="pt-BR" b="0" i="1" smtClean="0">
+                                <a:latin typeface="Cambria Math" panose="02040503050406030204" pitchFamily="18" charset="0"/>
+                              </a:rPr>
+                              <m:t>𝜎</m:t>
+                            </m:r>
+                          </m:e>
+                          <m:sub>
+                            <m:r>
+                              <a:rPr lang="pt-BR" b="0" i="1" smtClean="0">
+                                <a:latin typeface="Cambria Math" panose="02040503050406030204" pitchFamily="18" charset="0"/>
+                              </a:rPr>
+                              <m:t>𝑦𝑦</m:t>
+                            </m:r>
+                          </m:sub>
+                        </m:sSub>
                       </m:oMath>
                     </m:oMathPara>
                   </a14:m>
@@ -19319,7 +19406,7 @@
               </p:txBody>
             </p:sp>
           </mc:Choice>
-          <mc:Fallback xmlns="">
+          <mc:Fallback>
             <p:sp>
               <p:nvSpPr>
                 <p:cNvPr id="87" name="TextBox 86">
@@ -19337,7 +19424,7 @@
               <p:spPr>
                 <a:xfrm>
                   <a:off x="3284875" y="3537357"/>
-                  <a:ext cx="400238" cy="298928"/>
+                  <a:ext cx="1161152" cy="298928"/>
                 </a:xfrm>
                 <a:prstGeom prst="rect">
                   <a:avLst/>
@@ -19345,7 +19432,7 @@
                 <a:blipFill>
                   <a:blip r:embed="rId13"/>
                   <a:stretch>
-                    <a:fillRect l="-6250" r="-3125" b="-16667"/>
+                    <a:fillRect l="-2632" r="-2105" b="-20408"/>
                   </a:stretch>
                 </a:blipFill>
               </p:spPr>
@@ -19354,7 +19441,7 @@
                 <a:lstStyle/>
                 <a:p>
                   <a:r>
-                    <a:rPr lang="en-US">
+                    <a:rPr lang="pt-BR">
                       <a:noFill/>
                     </a:rPr>
                     <a:t> </a:t>
@@ -19371,7 +19458,7 @@
                 <p:cNvPr id="88" name="TextBox 87">
                   <a:extLst>
                     <a:ext uri="{FF2B5EF4-FFF2-40B4-BE49-F238E27FC236}">
-                      <a16:creationId xmlns:a16="http://schemas.microsoft.com/office/drawing/2014/main" xmlns="" id="{CA81FD42-A571-FD45-A4BD-D662E0F8144C}"/>
+                      <a16:creationId xmlns:a16="http://schemas.microsoft.com/office/drawing/2014/main" id="{CA81FD42-A571-FD45-A4BD-D662E0F8144C}"/>
                     </a:ext>
                   </a:extLst>
                 </p:cNvPr>
@@ -19480,6 +19567,41 @@
           </mc:Fallback>
         </mc:AlternateContent>
       </p:grpSp>
+      <p:cxnSp>
+        <p:nvCxnSpPr>
+          <p:cNvPr id="23" name="Conector reto 22"/>
+          <p:cNvCxnSpPr/>
+          <p:nvPr/>
+        </p:nvCxnSpPr>
+        <p:spPr>
+          <a:xfrm flipV="1">
+            <a:off x="6228917" y="4369977"/>
+            <a:ext cx="731205" cy="2"/>
+          </a:xfrm>
+          <a:prstGeom prst="line">
+            <a:avLst/>
+          </a:prstGeom>
+          <a:ln>
+            <a:solidFill>
+              <a:schemeClr val="tx1"/>
+            </a:solidFill>
+          </a:ln>
+        </p:spPr>
+        <p:style>
+          <a:lnRef idx="1">
+            <a:schemeClr val="accent1"/>
+          </a:lnRef>
+          <a:fillRef idx="0">
+            <a:schemeClr val="accent1"/>
+          </a:fillRef>
+          <a:effectRef idx="0">
+            <a:schemeClr val="accent1"/>
+          </a:effectRef>
+          <a:fontRef idx="minor">
+            <a:schemeClr val="tx1"/>
+          </a:fontRef>
+        </p:style>
+      </p:cxnSp>
     </p:spTree>
     <p:extLst>
       <p:ext uri="{BB962C8B-B14F-4D97-AF65-F5344CB8AC3E}">
@@ -19515,7 +19637,7 @@
           <p:cNvPr id="4" name="Picture 3">
             <a:extLst>
               <a:ext uri="{FF2B5EF4-FFF2-40B4-BE49-F238E27FC236}">
-                <a16:creationId xmlns:a16="http://schemas.microsoft.com/office/drawing/2014/main" xmlns="" id="{1F46FB23-65FB-9049-9C50-43B5B6AD9EA8}"/>
+                <a16:creationId xmlns:a16="http://schemas.microsoft.com/office/drawing/2014/main" id="{1F46FB23-65FB-9049-9C50-43B5B6AD9EA8}"/>
               </a:ext>
             </a:extLst>
           </p:cNvPr>
@@ -19545,7 +19667,7 @@
           <p:cNvPr id="6" name="Straight Connector 5">
             <a:extLst>
               <a:ext uri="{FF2B5EF4-FFF2-40B4-BE49-F238E27FC236}">
-                <a16:creationId xmlns:a16="http://schemas.microsoft.com/office/drawing/2014/main" xmlns="" id="{3E621B72-9657-FE4E-9C41-001E2A069FE3}"/>
+                <a16:creationId xmlns:a16="http://schemas.microsoft.com/office/drawing/2014/main" id="{3E621B72-9657-FE4E-9C41-001E2A069FE3}"/>
               </a:ext>
             </a:extLst>
           </p:cNvPr>
@@ -22909,8 +23031,8 @@
           </a:fontRef>
         </p:style>
       </p:cxnSp>
-      <mc:AlternateContent xmlns:mc="http://schemas.openxmlformats.org/markup-compatibility/2006">
-        <mc:Choice xmlns:a14="http://schemas.microsoft.com/office/drawing/2010/main" Requires="a14">
+      <mc:AlternateContent xmlns:mc="http://schemas.openxmlformats.org/markup-compatibility/2006" xmlns:a14="http://schemas.microsoft.com/office/drawing/2010/main">
+        <mc:Choice Requires="a14">
           <p:sp>
             <p:nvSpPr>
               <p:cNvPr id="25" name="CaixaDeTexto 24"/>
@@ -22933,6 +23055,7 @@
               </a:bodyPr>
               <a:lstStyle/>
               <a:p>
+                <a:pPr/>
                 <a14:m>
                   <m:oMathPara xmlns:m="http://schemas.openxmlformats.org/officeDocument/2006/math">
                     <m:oMathParaPr>
@@ -22999,7 +23122,7 @@
             </p:txBody>
           </p:sp>
         </mc:Choice>
-        <mc:Fallback>
+        <mc:Fallback xmlns="">
           <p:sp>
             <p:nvSpPr>
               <p:cNvPr id="25" name="CaixaDeTexto 24"/>
@@ -23038,8 +23161,8 @@
           </p:sp>
         </mc:Fallback>
       </mc:AlternateContent>
-      <mc:AlternateContent xmlns:mc="http://schemas.openxmlformats.org/markup-compatibility/2006">
-        <mc:Choice xmlns:a14="http://schemas.microsoft.com/office/drawing/2010/main" Requires="a14">
+      <mc:AlternateContent xmlns:mc="http://schemas.openxmlformats.org/markup-compatibility/2006" xmlns:a14="http://schemas.microsoft.com/office/drawing/2010/main">
+        <mc:Choice Requires="a14">
           <p:sp>
             <p:nvSpPr>
               <p:cNvPr id="26" name="CaixaDeTexto 25"/>
@@ -23062,6 +23185,7 @@
               </a:bodyPr>
               <a:lstStyle/>
               <a:p>
+                <a:pPr/>
                 <a14:m>
                   <m:oMathPara xmlns:m="http://schemas.openxmlformats.org/officeDocument/2006/math">
                     <m:oMathParaPr>
@@ -23128,7 +23252,7 @@
             </p:txBody>
           </p:sp>
         </mc:Choice>
-        <mc:Fallback>
+        <mc:Fallback xmlns="">
           <p:sp>
             <p:nvSpPr>
               <p:cNvPr id="26" name="CaixaDeTexto 25"/>
@@ -23167,8 +23291,8 @@
           </p:sp>
         </mc:Fallback>
       </mc:AlternateContent>
-      <mc:AlternateContent xmlns:mc="http://schemas.openxmlformats.org/markup-compatibility/2006">
-        <mc:Choice xmlns:a14="http://schemas.microsoft.com/office/drawing/2010/main" Requires="a14">
+      <mc:AlternateContent xmlns:mc="http://schemas.openxmlformats.org/markup-compatibility/2006" xmlns:a14="http://schemas.microsoft.com/office/drawing/2010/main">
+        <mc:Choice Requires="a14">
           <p:sp>
             <p:nvSpPr>
               <p:cNvPr id="27" name="CaixaDeTexto 26"/>
@@ -23191,6 +23315,7 @@
               </a:bodyPr>
               <a:lstStyle/>
               <a:p>
+                <a:pPr/>
                 <a14:m>
                   <m:oMathPara xmlns:m="http://schemas.openxmlformats.org/officeDocument/2006/math">
                     <m:oMathParaPr>
@@ -23230,7 +23355,7 @@
             </p:txBody>
           </p:sp>
         </mc:Choice>
-        <mc:Fallback>
+        <mc:Fallback xmlns="">
           <p:sp>
             <p:nvSpPr>
               <p:cNvPr id="27" name="CaixaDeTexto 26"/>
@@ -23269,8 +23394,8 @@
           </p:sp>
         </mc:Fallback>
       </mc:AlternateContent>
-      <mc:AlternateContent xmlns:mc="http://schemas.openxmlformats.org/markup-compatibility/2006">
-        <mc:Choice xmlns:a14="http://schemas.microsoft.com/office/drawing/2010/main" Requires="a14">
+      <mc:AlternateContent xmlns:mc="http://schemas.openxmlformats.org/markup-compatibility/2006" xmlns:a14="http://schemas.microsoft.com/office/drawing/2010/main">
+        <mc:Choice Requires="a14">
           <p:sp>
             <p:nvSpPr>
               <p:cNvPr id="28" name="CaixaDeTexto 27"/>
@@ -23293,6 +23418,7 @@
               </a:bodyPr>
               <a:lstStyle/>
               <a:p>
+                <a:pPr/>
                 <a14:m>
                   <m:oMathPara xmlns:m="http://schemas.openxmlformats.org/officeDocument/2006/math">
                     <m:oMathParaPr>
@@ -23332,7 +23458,7 @@
             </p:txBody>
           </p:sp>
         </mc:Choice>
-        <mc:Fallback>
+        <mc:Fallback xmlns="">
           <p:sp>
             <p:nvSpPr>
               <p:cNvPr id="28" name="CaixaDeTexto 27"/>
@@ -25152,14 +25278,62 @@
                 <a:tableStyleId>{5940675A-B579-460E-94D1-54222C63F5DA}</a:tableStyleId>
               </a:tblPr>
               <a:tblGrid>
-                <a:gridCol w="521749"/>
-                <a:gridCol w="521749"/>
-                <a:gridCol w="521749"/>
-                <a:gridCol w="521749"/>
-                <a:gridCol w="521749"/>
-                <a:gridCol w="521749"/>
-                <a:gridCol w="521749"/>
-                <a:gridCol w="521749"/>
+                <a:gridCol w="521749">
+                  <a:extLst>
+                    <a:ext uri="{9D8B030D-6E8A-4147-A177-3AD203B41FA5}">
+                      <a16:colId xmlns:a16="http://schemas.microsoft.com/office/drawing/2014/main" val="20000"/>
+                    </a:ext>
+                  </a:extLst>
+                </a:gridCol>
+                <a:gridCol w="521749">
+                  <a:extLst>
+                    <a:ext uri="{9D8B030D-6E8A-4147-A177-3AD203B41FA5}">
+                      <a16:colId xmlns:a16="http://schemas.microsoft.com/office/drawing/2014/main" val="20001"/>
+                    </a:ext>
+                  </a:extLst>
+                </a:gridCol>
+                <a:gridCol w="521749">
+                  <a:extLst>
+                    <a:ext uri="{9D8B030D-6E8A-4147-A177-3AD203B41FA5}">
+                      <a16:colId xmlns:a16="http://schemas.microsoft.com/office/drawing/2014/main" val="20002"/>
+                    </a:ext>
+                  </a:extLst>
+                </a:gridCol>
+                <a:gridCol w="521749">
+                  <a:extLst>
+                    <a:ext uri="{9D8B030D-6E8A-4147-A177-3AD203B41FA5}">
+                      <a16:colId xmlns:a16="http://schemas.microsoft.com/office/drawing/2014/main" val="20003"/>
+                    </a:ext>
+                  </a:extLst>
+                </a:gridCol>
+                <a:gridCol w="521749">
+                  <a:extLst>
+                    <a:ext uri="{9D8B030D-6E8A-4147-A177-3AD203B41FA5}">
+                      <a16:colId xmlns:a16="http://schemas.microsoft.com/office/drawing/2014/main" val="20004"/>
+                    </a:ext>
+                  </a:extLst>
+                </a:gridCol>
+                <a:gridCol w="521749">
+                  <a:extLst>
+                    <a:ext uri="{9D8B030D-6E8A-4147-A177-3AD203B41FA5}">
+                      <a16:colId xmlns:a16="http://schemas.microsoft.com/office/drawing/2014/main" val="20005"/>
+                    </a:ext>
+                  </a:extLst>
+                </a:gridCol>
+                <a:gridCol w="521749">
+                  <a:extLst>
+                    <a:ext uri="{9D8B030D-6E8A-4147-A177-3AD203B41FA5}">
+                      <a16:colId xmlns:a16="http://schemas.microsoft.com/office/drawing/2014/main" val="20006"/>
+                    </a:ext>
+                  </a:extLst>
+                </a:gridCol>
+                <a:gridCol w="521749">
+                  <a:extLst>
+                    <a:ext uri="{9D8B030D-6E8A-4147-A177-3AD203B41FA5}">
+                      <a16:colId xmlns:a16="http://schemas.microsoft.com/office/drawing/2014/main" val="20007"/>
+                    </a:ext>
+                  </a:extLst>
+                </a:gridCol>
               </a:tblGrid>
               <a:tr h="370840">
                 <a:tc>
@@ -25282,6 +25456,11 @@
                   </a:txBody>
                   <a:tcPr anchor="ctr"/>
                 </a:tc>
+                <a:extLst>
+                  <a:ext uri="{0D108BD9-81ED-4DB2-BD59-A6C34878D82A}">
+                    <a16:rowId xmlns:a16="http://schemas.microsoft.com/office/drawing/2014/main" val="10000"/>
+                  </a:ext>
+                </a:extLst>
               </a:tr>
               <a:tr h="370840">
                 <a:tc>
@@ -25414,6 +25593,11 @@
                   </a:txBody>
                   <a:tcPr anchor="ctr"/>
                 </a:tc>
+                <a:extLst>
+                  <a:ext uri="{0D108BD9-81ED-4DB2-BD59-A6C34878D82A}">
+                    <a16:rowId xmlns:a16="http://schemas.microsoft.com/office/drawing/2014/main" val="10001"/>
+                  </a:ext>
+                </a:extLst>
               </a:tr>
               <a:tr h="370840">
                 <a:tc gridSpan="2">
@@ -25606,6 +25790,11 @@
                   </a:txBody>
                   <a:tcPr/>
                 </a:tc>
+                <a:extLst>
+                  <a:ext uri="{0D108BD9-81ED-4DB2-BD59-A6C34878D82A}">
+                    <a16:rowId xmlns:a16="http://schemas.microsoft.com/office/drawing/2014/main" val="10002"/>
+                  </a:ext>
+                </a:extLst>
               </a:tr>
               <a:tr h="370840">
                 <a:tc>
@@ -25847,6 +26036,11 @@
                   </a:txBody>
                   <a:tcPr anchor="ctr"/>
                 </a:tc>
+                <a:extLst>
+                  <a:ext uri="{0D108BD9-81ED-4DB2-BD59-A6C34878D82A}">
+                    <a16:rowId xmlns:a16="http://schemas.microsoft.com/office/drawing/2014/main" val="10003"/>
+                  </a:ext>
+                </a:extLst>
               </a:tr>
               <a:tr h="370840">
                 <a:tc>
@@ -26041,6 +26235,11 @@
                   </a:txBody>
                   <a:tcPr anchor="ctr"/>
                 </a:tc>
+                <a:extLst>
+                  <a:ext uri="{0D108BD9-81ED-4DB2-BD59-A6C34878D82A}">
+                    <a16:rowId xmlns:a16="http://schemas.microsoft.com/office/drawing/2014/main" val="10004"/>
+                  </a:ext>
+                </a:extLst>
               </a:tr>
               <a:tr h="370840">
                 <a:tc gridSpan="2">
@@ -26146,6 +26345,11 @@
                   </a:txBody>
                   <a:tcPr/>
                 </a:tc>
+                <a:extLst>
+                  <a:ext uri="{0D108BD9-81ED-4DB2-BD59-A6C34878D82A}">
+                    <a16:rowId xmlns:a16="http://schemas.microsoft.com/office/drawing/2014/main" val="10005"/>
+                  </a:ext>
+                </a:extLst>
               </a:tr>
               <a:tr h="370840">
                 <a:tc>
@@ -26276,6 +26480,11 @@
                   </a:txBody>
                   <a:tcPr anchor="ctr"/>
                 </a:tc>
+                <a:extLst>
+                  <a:ext uri="{0D108BD9-81ED-4DB2-BD59-A6C34878D82A}">
+                    <a16:rowId xmlns:a16="http://schemas.microsoft.com/office/drawing/2014/main" val="10006"/>
+                  </a:ext>
+                </a:extLst>
               </a:tr>
               <a:tr h="370840">
                 <a:tc>
@@ -26406,6 +26615,11 @@
                   </a:txBody>
                   <a:tcPr anchor="ctr"/>
                 </a:tc>
+                <a:extLst>
+                  <a:ext uri="{0D108BD9-81ED-4DB2-BD59-A6C34878D82A}">
+                    <a16:rowId xmlns:a16="http://schemas.microsoft.com/office/drawing/2014/main" val="10007"/>
+                  </a:ext>
+                </a:extLst>
               </a:tr>
             </a:tbl>
           </a:graphicData>
@@ -26509,14 +26723,62 @@
                 <a:tableStyleId>{5940675A-B579-460E-94D1-54222C63F5DA}</a:tableStyleId>
               </a:tblPr>
               <a:tblGrid>
-                <a:gridCol w="521749"/>
-                <a:gridCol w="521749"/>
-                <a:gridCol w="521749"/>
-                <a:gridCol w="521749"/>
-                <a:gridCol w="521749"/>
-                <a:gridCol w="521749"/>
-                <a:gridCol w="521749"/>
-                <a:gridCol w="521749"/>
+                <a:gridCol w="521749">
+                  <a:extLst>
+                    <a:ext uri="{9D8B030D-6E8A-4147-A177-3AD203B41FA5}">
+                      <a16:colId xmlns:a16="http://schemas.microsoft.com/office/drawing/2014/main" val="20000"/>
+                    </a:ext>
+                  </a:extLst>
+                </a:gridCol>
+                <a:gridCol w="521749">
+                  <a:extLst>
+                    <a:ext uri="{9D8B030D-6E8A-4147-A177-3AD203B41FA5}">
+                      <a16:colId xmlns:a16="http://schemas.microsoft.com/office/drawing/2014/main" val="20001"/>
+                    </a:ext>
+                  </a:extLst>
+                </a:gridCol>
+                <a:gridCol w="521749">
+                  <a:extLst>
+                    <a:ext uri="{9D8B030D-6E8A-4147-A177-3AD203B41FA5}">
+                      <a16:colId xmlns:a16="http://schemas.microsoft.com/office/drawing/2014/main" val="20002"/>
+                    </a:ext>
+                  </a:extLst>
+                </a:gridCol>
+                <a:gridCol w="521749">
+                  <a:extLst>
+                    <a:ext uri="{9D8B030D-6E8A-4147-A177-3AD203B41FA5}">
+                      <a16:colId xmlns:a16="http://schemas.microsoft.com/office/drawing/2014/main" val="20003"/>
+                    </a:ext>
+                  </a:extLst>
+                </a:gridCol>
+                <a:gridCol w="521749">
+                  <a:extLst>
+                    <a:ext uri="{9D8B030D-6E8A-4147-A177-3AD203B41FA5}">
+                      <a16:colId xmlns:a16="http://schemas.microsoft.com/office/drawing/2014/main" val="20004"/>
+                    </a:ext>
+                  </a:extLst>
+                </a:gridCol>
+                <a:gridCol w="521749">
+                  <a:extLst>
+                    <a:ext uri="{9D8B030D-6E8A-4147-A177-3AD203B41FA5}">
+                      <a16:colId xmlns:a16="http://schemas.microsoft.com/office/drawing/2014/main" val="20005"/>
+                    </a:ext>
+                  </a:extLst>
+                </a:gridCol>
+                <a:gridCol w="521749">
+                  <a:extLst>
+                    <a:ext uri="{9D8B030D-6E8A-4147-A177-3AD203B41FA5}">
+                      <a16:colId xmlns:a16="http://schemas.microsoft.com/office/drawing/2014/main" val="20006"/>
+                    </a:ext>
+                  </a:extLst>
+                </a:gridCol>
+                <a:gridCol w="521749">
+                  <a:extLst>
+                    <a:ext uri="{9D8B030D-6E8A-4147-A177-3AD203B41FA5}">
+                      <a16:colId xmlns:a16="http://schemas.microsoft.com/office/drawing/2014/main" val="20007"/>
+                    </a:ext>
+                  </a:extLst>
+                </a:gridCol>
               </a:tblGrid>
               <a:tr h="370840">
                 <a:tc>
@@ -26639,6 +26901,11 @@
                   </a:txBody>
                   <a:tcPr anchor="ctr"/>
                 </a:tc>
+                <a:extLst>
+                  <a:ext uri="{0D108BD9-81ED-4DB2-BD59-A6C34878D82A}">
+                    <a16:rowId xmlns:a16="http://schemas.microsoft.com/office/drawing/2014/main" val="10000"/>
+                  </a:ext>
+                </a:extLst>
               </a:tr>
               <a:tr h="370840">
                 <a:tc>
@@ -26771,6 +27038,11 @@
                   </a:txBody>
                   <a:tcPr anchor="ctr"/>
                 </a:tc>
+                <a:extLst>
+                  <a:ext uri="{0D108BD9-81ED-4DB2-BD59-A6C34878D82A}">
+                    <a16:rowId xmlns:a16="http://schemas.microsoft.com/office/drawing/2014/main" val="10001"/>
+                  </a:ext>
+                </a:extLst>
               </a:tr>
               <a:tr h="370840">
                 <a:tc gridSpan="2">
@@ -26963,6 +27235,11 @@
                   </a:txBody>
                   <a:tcPr/>
                 </a:tc>
+                <a:extLst>
+                  <a:ext uri="{0D108BD9-81ED-4DB2-BD59-A6C34878D82A}">
+                    <a16:rowId xmlns:a16="http://schemas.microsoft.com/office/drawing/2014/main" val="10002"/>
+                  </a:ext>
+                </a:extLst>
               </a:tr>
               <a:tr h="370840">
                 <a:tc>
@@ -27204,6 +27481,11 @@
                   </a:txBody>
                   <a:tcPr anchor="ctr"/>
                 </a:tc>
+                <a:extLst>
+                  <a:ext uri="{0D108BD9-81ED-4DB2-BD59-A6C34878D82A}">
+                    <a16:rowId xmlns:a16="http://schemas.microsoft.com/office/drawing/2014/main" val="10003"/>
+                  </a:ext>
+                </a:extLst>
               </a:tr>
               <a:tr h="370840">
                 <a:tc>
@@ -27398,6 +27680,11 @@
                   </a:txBody>
                   <a:tcPr anchor="ctr"/>
                 </a:tc>
+                <a:extLst>
+                  <a:ext uri="{0D108BD9-81ED-4DB2-BD59-A6C34878D82A}">
+                    <a16:rowId xmlns:a16="http://schemas.microsoft.com/office/drawing/2014/main" val="10004"/>
+                  </a:ext>
+                </a:extLst>
               </a:tr>
               <a:tr h="370840">
                 <a:tc gridSpan="2">
@@ -27503,6 +27790,11 @@
                   </a:txBody>
                   <a:tcPr/>
                 </a:tc>
+                <a:extLst>
+                  <a:ext uri="{0D108BD9-81ED-4DB2-BD59-A6C34878D82A}">
+                    <a16:rowId xmlns:a16="http://schemas.microsoft.com/office/drawing/2014/main" val="10005"/>
+                  </a:ext>
+                </a:extLst>
               </a:tr>
               <a:tr h="370840">
                 <a:tc>
@@ -27633,6 +27925,11 @@
                   </a:txBody>
                   <a:tcPr anchor="ctr"/>
                 </a:tc>
+                <a:extLst>
+                  <a:ext uri="{0D108BD9-81ED-4DB2-BD59-A6C34878D82A}">
+                    <a16:rowId xmlns:a16="http://schemas.microsoft.com/office/drawing/2014/main" val="10006"/>
+                  </a:ext>
+                </a:extLst>
               </a:tr>
               <a:tr h="370840">
                 <a:tc>
@@ -27763,6 +28060,11 @@
                   </a:txBody>
                   <a:tcPr anchor="ctr"/>
                 </a:tc>
+                <a:extLst>
+                  <a:ext uri="{0D108BD9-81ED-4DB2-BD59-A6C34878D82A}">
+                    <a16:rowId xmlns:a16="http://schemas.microsoft.com/office/drawing/2014/main" val="10007"/>
+                  </a:ext>
+                </a:extLst>
               </a:tr>
             </a:tbl>
           </a:graphicData>

</xml_diff>